<commit_message>
121623 | Fixing Snap Mechanic
- Updated Documentation
- Currently fixing snapping mechanic
- Improved Debugging Engine
- Fixed Inheritance
- Fixed names of Autoloads
- Moved code to proper classes
</commit_message>
<xml_diff>
--- a/assets/dev/documentation/vblox_documentation_figs.pptx
+++ b/assets/dev/documentation/vblox_documentation_figs.pptx
@@ -104,6 +104,11 @@
       </a:defRPr>
     </a:lvl9pPr>
   </p:defaultTextStyle>
+  <p:extLst>
+    <p:ext uri="{EFAFB233-063F-42B5-8137-9DF3F51BA10A}">
+      <p15:sldGuideLst xmlns:p15="http://schemas.microsoft.com/office/powerpoint/2012/main"/>
+    </p:ext>
+  </p:extLst>
 </p:presentation>
 </file>
 
@@ -3342,103 +3347,31 @@
           <a:chExt cx="0" cy="0"/>
         </a:xfrm>
       </p:grpSpPr>
-      <p:pic>
-        <p:nvPicPr>
-          <p:cNvPr id="5" name="image19.png">
-            <a:extLst>
-              <a:ext uri="{FF2B5EF4-FFF2-40B4-BE49-F238E27FC236}">
-                <a16:creationId xmlns:a16="http://schemas.microsoft.com/office/drawing/2014/main" id="{D030A13E-45B0-97B1-4436-B97483A5924B}"/>
-              </a:ext>
-            </a:extLst>
-          </p:cNvPr>
-          <p:cNvPicPr/>
+      <p:sp>
+        <p:nvSpPr>
+          <p:cNvPr id="21" name="Rectangle 20">
+            <a:extLst>
+              <a:ext uri="{FF2B5EF4-FFF2-40B4-BE49-F238E27FC236}">
+                <a16:creationId xmlns:a16="http://schemas.microsoft.com/office/drawing/2014/main" id="{8785B6EB-DBE3-F963-3E9F-452644FAF6E9}"/>
+              </a:ext>
+            </a:extLst>
+          </p:cNvPr>
+          <p:cNvSpPr/>
           <p:nvPr/>
-        </p:nvPicPr>
-        <p:blipFill>
-          <a:blip r:embed="rId2"/>
-          <a:srcRect/>
-          <a:stretch>
-            <a:fillRect/>
-          </a:stretch>
-        </p:blipFill>
+        </p:nvSpPr>
         <p:spPr>
           <a:xfrm>
-            <a:off x="171087" y="159214"/>
-            <a:ext cx="433787" cy="535594"/>
+            <a:off x="0" y="5714471"/>
+            <a:ext cx="12192000" cy="1143529"/>
           </a:xfrm>
           <a:prstGeom prst="rect">
             <a:avLst/>
           </a:prstGeom>
-          <a:ln/>
-        </p:spPr>
-      </p:pic>
-      <p:sp>
-        <p:nvSpPr>
-          <p:cNvPr id="8" name="TextBox 7">
-            <a:extLst>
-              <a:ext uri="{FF2B5EF4-FFF2-40B4-BE49-F238E27FC236}">
-                <a16:creationId xmlns:a16="http://schemas.microsoft.com/office/drawing/2014/main" id="{53D0D9A2-5D23-F07E-BB11-B443848493DF}"/>
-              </a:ext>
-            </a:extLst>
-          </p:cNvPr>
-          <p:cNvSpPr txBox="1"/>
-          <p:nvPr/>
-        </p:nvSpPr>
-        <p:spPr>
-          <a:xfrm>
-            <a:off x="9069788" y="6336921"/>
-            <a:ext cx="2951125" cy="369332"/>
-          </a:xfrm>
-          <a:prstGeom prst="rect">
-            <a:avLst/>
-          </a:prstGeom>
-          <a:noFill/>
-        </p:spPr>
-        <p:txBody>
-          <a:bodyPr wrap="square">
-            <a:spAutoFit/>
-          </a:bodyPr>
-          <a:lstStyle/>
-          <a:p>
-            <a:pPr algn="r"/>
-            <a:r>
-              <a:rPr lang="en-PH" sz="1800" dirty="0">
-                <a:effectLst/>
-                <a:latin typeface="Aptos Display" panose="020B0004020202020204" pitchFamily="34" charset="0"/>
-                <a:ea typeface="Lexend" pitchFamily="2" charset="0"/>
-                <a:cs typeface="Lexend" pitchFamily="2" charset="0"/>
-              </a:rPr>
-              <a:t>Simulation Engine Tree</a:t>
-            </a:r>
-            <a:endParaRPr lang="en-PH" dirty="0"/>
-          </a:p>
-        </p:txBody>
-      </p:sp>
-      <p:sp>
-        <p:nvSpPr>
-          <p:cNvPr id="10" name="Rectangle 9">
-            <a:extLst>
-              <a:ext uri="{FF2B5EF4-FFF2-40B4-BE49-F238E27FC236}">
-                <a16:creationId xmlns:a16="http://schemas.microsoft.com/office/drawing/2014/main" id="{0719FD7B-8949-4BC4-1F13-33BB039C2AD0}"/>
-              </a:ext>
-            </a:extLst>
-          </p:cNvPr>
-          <p:cNvSpPr/>
-          <p:nvPr/>
-        </p:nvSpPr>
-        <p:spPr>
-          <a:xfrm>
-            <a:off x="2703830" y="1553944"/>
-            <a:ext cx="2206172" cy="449943"/>
-          </a:xfrm>
-          <a:prstGeom prst="rect">
-            <a:avLst/>
-          </a:prstGeom>
-          <a:noFill/>
+          <a:solidFill>
+            <a:srgbClr val="00B0F0"/>
+          </a:solidFill>
           <a:ln>
-            <a:solidFill>
-              <a:srgbClr val="00B0F0"/>
-            </a:solidFill>
+            <a:noFill/>
           </a:ln>
         </p:spPr>
         <p:style>
@@ -3462,30 +3395,95 @@
           <a:lstStyle/>
           <a:p>
             <a:pPr algn="ctr"/>
-            <a:r>
-              <a:rPr lang="en-US" dirty="0">
+            <a:endParaRPr lang="en-PH"/>
+          </a:p>
+        </p:txBody>
+      </p:sp>
+      <p:pic>
+        <p:nvPicPr>
+          <p:cNvPr id="5" name="image19.png">
+            <a:extLst>
+              <a:ext uri="{FF2B5EF4-FFF2-40B4-BE49-F238E27FC236}">
+                <a16:creationId xmlns:a16="http://schemas.microsoft.com/office/drawing/2014/main" id="{D030A13E-45B0-97B1-4436-B97483A5924B}"/>
+              </a:ext>
+            </a:extLst>
+          </p:cNvPr>
+          <p:cNvPicPr/>
+          <p:nvPr/>
+        </p:nvPicPr>
+        <p:blipFill>
+          <a:blip r:embed="rId2"/>
+          <a:srcRect/>
+          <a:stretch>
+            <a:fillRect/>
+          </a:stretch>
+        </p:blipFill>
+        <p:spPr>
+          <a:xfrm>
+            <a:off x="171087" y="159214"/>
+            <a:ext cx="433787" cy="535594"/>
+          </a:xfrm>
+          <a:prstGeom prst="rect">
+            <a:avLst/>
+          </a:prstGeom>
+          <a:ln/>
+        </p:spPr>
+      </p:pic>
+      <p:sp>
+        <p:nvSpPr>
+          <p:cNvPr id="8" name="TextBox 7">
+            <a:extLst>
+              <a:ext uri="{FF2B5EF4-FFF2-40B4-BE49-F238E27FC236}">
+                <a16:creationId xmlns:a16="http://schemas.microsoft.com/office/drawing/2014/main" id="{53D0D9A2-5D23-F07E-BB11-B443848493DF}"/>
+              </a:ext>
+            </a:extLst>
+          </p:cNvPr>
+          <p:cNvSpPr txBox="1"/>
+          <p:nvPr/>
+        </p:nvSpPr>
+        <p:spPr>
+          <a:xfrm>
+            <a:off x="9069788" y="6101569"/>
+            <a:ext cx="2951125" cy="369332"/>
+          </a:xfrm>
+          <a:prstGeom prst="rect">
+            <a:avLst/>
+          </a:prstGeom>
+          <a:noFill/>
+        </p:spPr>
+        <p:txBody>
+          <a:bodyPr wrap="square">
+            <a:spAutoFit/>
+          </a:bodyPr>
+          <a:lstStyle/>
+          <a:p>
+            <a:pPr algn="r"/>
+            <a:r>
+              <a:rPr lang="en-PH" sz="1800" b="1" dirty="0">
                 <a:solidFill>
-                  <a:srgbClr val="00B0F0"/>
+                  <a:schemeClr val="bg1"/>
                 </a:solidFill>
+                <a:effectLst/>
                 <a:latin typeface="Aptos Display" panose="020B0004020202020204" pitchFamily="34" charset="0"/>
+                <a:ea typeface="Lexend" pitchFamily="2" charset="0"/>
+                <a:cs typeface="Lexend" pitchFamily="2" charset="0"/>
               </a:rPr>
-              <a:t>Simulation Engine</a:t>
-            </a:r>
-            <a:endParaRPr lang="en-PH" dirty="0">
+              <a:t>Simulation Engine Tree</a:t>
+            </a:r>
+            <a:endParaRPr lang="en-PH" b="1" dirty="0">
               <a:solidFill>
-                <a:srgbClr val="00B0F0"/>
+                <a:schemeClr val="bg1"/>
               </a:solidFill>
-              <a:latin typeface="Aptos Display" panose="020B0004020202020204" pitchFamily="34" charset="0"/>
             </a:endParaRPr>
           </a:p>
         </p:txBody>
       </p:sp>
       <p:sp>
         <p:nvSpPr>
-          <p:cNvPr id="15" name="Rectangle 14">
-            <a:extLst>
-              <a:ext uri="{FF2B5EF4-FFF2-40B4-BE49-F238E27FC236}">
-                <a16:creationId xmlns:a16="http://schemas.microsoft.com/office/drawing/2014/main" id="{6F4D38B1-C5C6-EBA3-C3BA-2C7E7A9FA359}"/>
+          <p:cNvPr id="10" name="Rectangle 9">
+            <a:extLst>
+              <a:ext uri="{FF2B5EF4-FFF2-40B4-BE49-F238E27FC236}">
+                <a16:creationId xmlns:a16="http://schemas.microsoft.com/office/drawing/2014/main" id="{0719FD7B-8949-4BC4-1F13-33BB039C2AD0}"/>
               </a:ext>
             </a:extLst>
           </p:cNvPr>
@@ -3494,7 +3492,7 @@
         </p:nvSpPr>
         <p:spPr>
           <a:xfrm>
-            <a:off x="4809940" y="2462840"/>
+            <a:off x="2703830" y="1723763"/>
             <a:ext cx="2206172" cy="449943"/>
           </a:xfrm>
           <a:prstGeom prst="rect">
@@ -3503,7 +3501,7 @@
           <a:noFill/>
           <a:ln>
             <a:solidFill>
-              <a:schemeClr val="tx1"/>
+              <a:srgbClr val="00B0F0"/>
             </a:solidFill>
           </a:ln>
         </p:spPr>
@@ -3531,72 +3529,27 @@
             <a:r>
               <a:rPr lang="en-US" dirty="0">
                 <a:solidFill>
-                  <a:schemeClr val="tx1"/>
+                  <a:srgbClr val="00B0F0"/>
                 </a:solidFill>
                 <a:latin typeface="Aptos Display" panose="020B0004020202020204" pitchFamily="34" charset="0"/>
               </a:rPr>
-              <a:t>Interactable Class</a:t>
+              <a:t>Simulation Engine</a:t>
             </a:r>
             <a:endParaRPr lang="en-PH" dirty="0">
               <a:solidFill>
-                <a:schemeClr val="tx1"/>
+                <a:srgbClr val="00B0F0"/>
               </a:solidFill>
               <a:latin typeface="Aptos Display" panose="020B0004020202020204" pitchFamily="34" charset="0"/>
             </a:endParaRPr>
           </a:p>
         </p:txBody>
       </p:sp>
-      <p:cxnSp>
-        <p:nvCxnSpPr>
-          <p:cNvPr id="17" name="Straight Arrow Connector 16">
-            <a:extLst>
-              <a:ext uri="{FF2B5EF4-FFF2-40B4-BE49-F238E27FC236}">
-                <a16:creationId xmlns:a16="http://schemas.microsoft.com/office/drawing/2014/main" id="{057E8F38-006A-6D6F-FC1C-BFA4E2689B6D}"/>
-              </a:ext>
-            </a:extLst>
-          </p:cNvPr>
-          <p:cNvCxnSpPr>
-            <a:cxnSpLocks/>
-            <a:endCxn id="15" idx="0"/>
-          </p:cNvCxnSpPr>
-          <p:nvPr/>
-        </p:nvCxnSpPr>
-        <p:spPr>
-          <a:xfrm>
-            <a:off x="5913026" y="2203040"/>
-            <a:ext cx="0" cy="259800"/>
-          </a:xfrm>
-          <a:prstGeom prst="straightConnector1">
-            <a:avLst/>
-          </a:prstGeom>
-          <a:ln>
-            <a:solidFill>
-              <a:schemeClr val="tx1"/>
-            </a:solidFill>
-            <a:tailEnd type="triangle"/>
-          </a:ln>
-        </p:spPr>
-        <p:style>
-          <a:lnRef idx="1">
-            <a:schemeClr val="accent1"/>
-          </a:lnRef>
-          <a:fillRef idx="0">
-            <a:schemeClr val="accent1"/>
-          </a:fillRef>
-          <a:effectRef idx="0">
-            <a:schemeClr val="accent1"/>
-          </a:effectRef>
-          <a:fontRef idx="minor">
-            <a:schemeClr val="tx1"/>
-          </a:fontRef>
-        </p:style>
-      </p:cxnSp>
-      <p:sp>
-        <p:nvSpPr>
-          <p:cNvPr id="18" name="Rectangle 17">
-            <a:extLst>
-              <a:ext uri="{FF2B5EF4-FFF2-40B4-BE49-F238E27FC236}">
-                <a16:creationId xmlns:a16="http://schemas.microsoft.com/office/drawing/2014/main" id="{A8EE9D69-B969-2797-5FF1-DC290564E0A7}"/>
+      <p:sp>
+        <p:nvSpPr>
+          <p:cNvPr id="15" name="Rectangle 14">
+            <a:extLst>
+              <a:ext uri="{FF2B5EF4-FFF2-40B4-BE49-F238E27FC236}">
+                <a16:creationId xmlns:a16="http://schemas.microsoft.com/office/drawing/2014/main" id="{6F4D38B1-C5C6-EBA3-C3BA-2C7E7A9FA359}"/>
               </a:ext>
             </a:extLst>
           </p:cNvPr>
@@ -3605,7 +3558,7 @@
         </p:nvSpPr>
         <p:spPr>
           <a:xfrm>
-            <a:off x="171087" y="2471493"/>
+            <a:off x="5136511" y="2632659"/>
             <a:ext cx="2206172" cy="449943"/>
           </a:xfrm>
           <a:prstGeom prst="rect">
@@ -3646,7 +3599,7 @@
                 </a:solidFill>
                 <a:latin typeface="Aptos Display" panose="020B0004020202020204" pitchFamily="34" charset="0"/>
               </a:rPr>
-              <a:t>Camera Class</a:t>
+              <a:t>Interactable Class</a:t>
             </a:r>
             <a:endParaRPr lang="en-PH" dirty="0">
               <a:solidFill>
@@ -3657,141 +3610,12 @@
           </a:p>
         </p:txBody>
       </p:sp>
-      <p:cxnSp>
-        <p:nvCxnSpPr>
-          <p:cNvPr id="19" name="Straight Arrow Connector 18">
-            <a:extLst>
-              <a:ext uri="{FF2B5EF4-FFF2-40B4-BE49-F238E27FC236}">
-                <a16:creationId xmlns:a16="http://schemas.microsoft.com/office/drawing/2014/main" id="{A337EA0C-06AC-E5C0-ADE5-0CA39EDB77E3}"/>
-              </a:ext>
-            </a:extLst>
-          </p:cNvPr>
-          <p:cNvCxnSpPr>
-            <a:cxnSpLocks/>
-            <a:endCxn id="18" idx="0"/>
-          </p:cNvCxnSpPr>
-          <p:nvPr/>
-        </p:nvCxnSpPr>
-        <p:spPr>
-          <a:xfrm>
-            <a:off x="1274173" y="2203040"/>
-            <a:ext cx="0" cy="268453"/>
-          </a:xfrm>
-          <a:prstGeom prst="straightConnector1">
-            <a:avLst/>
-          </a:prstGeom>
-          <a:ln>
-            <a:solidFill>
-              <a:schemeClr val="tx1"/>
-            </a:solidFill>
-            <a:tailEnd type="triangle"/>
-          </a:ln>
-        </p:spPr>
-        <p:style>
-          <a:lnRef idx="1">
-            <a:schemeClr val="accent1"/>
-          </a:lnRef>
-          <a:fillRef idx="0">
-            <a:schemeClr val="accent1"/>
-          </a:fillRef>
-          <a:effectRef idx="0">
-            <a:schemeClr val="accent1"/>
-          </a:effectRef>
-          <a:fontRef idx="minor">
-            <a:schemeClr val="tx1"/>
-          </a:fontRef>
-        </p:style>
-      </p:cxnSp>
-      <p:sp>
-        <p:nvSpPr>
-          <p:cNvPr id="22" name="TextBox 21">
-            <a:extLst>
-              <a:ext uri="{FF2B5EF4-FFF2-40B4-BE49-F238E27FC236}">
-                <a16:creationId xmlns:a16="http://schemas.microsoft.com/office/drawing/2014/main" id="{74B4F58A-4FFD-968E-4B34-1DDC44DD53F6}"/>
-              </a:ext>
-            </a:extLst>
-          </p:cNvPr>
-          <p:cNvSpPr txBox="1"/>
-          <p:nvPr/>
-        </p:nvSpPr>
-        <p:spPr>
-          <a:xfrm>
-            <a:off x="171087" y="2942789"/>
-            <a:ext cx="2206172" cy="830997"/>
-          </a:xfrm>
-          <a:prstGeom prst="rect">
-            <a:avLst/>
-          </a:prstGeom>
-          <a:noFill/>
-        </p:spPr>
-        <p:txBody>
-          <a:bodyPr wrap="square">
-            <a:spAutoFit/>
-          </a:bodyPr>
-          <a:lstStyle/>
-          <a:p>
-            <a:pPr algn="ctr"/>
-            <a:r>
-              <a:rPr lang="en-PH" sz="1200" dirty="0">
-                <a:effectLst/>
-                <a:latin typeface="Aptos Display" panose="020B0004020202020204" pitchFamily="34" charset="0"/>
-                <a:ea typeface="Lexend" pitchFamily="2" charset="0"/>
-                <a:cs typeface="Lexend" pitchFamily="2" charset="0"/>
-              </a:rPr>
-              <a:t>Where user can see the simulation environment, also the responsible for movement of the player</a:t>
-            </a:r>
-            <a:endParaRPr lang="en-PH" sz="1200" dirty="0"/>
-          </a:p>
-        </p:txBody>
-      </p:sp>
-      <p:sp>
-        <p:nvSpPr>
-          <p:cNvPr id="23" name="TextBox 22">
-            <a:extLst>
-              <a:ext uri="{FF2B5EF4-FFF2-40B4-BE49-F238E27FC236}">
-                <a16:creationId xmlns:a16="http://schemas.microsoft.com/office/drawing/2014/main" id="{A11F700B-2315-F509-DB98-D07ED705AF91}"/>
-              </a:ext>
-            </a:extLst>
-          </p:cNvPr>
-          <p:cNvSpPr txBox="1"/>
-          <p:nvPr/>
-        </p:nvSpPr>
-        <p:spPr>
-          <a:xfrm>
-            <a:off x="4809940" y="2921436"/>
-            <a:ext cx="2206172" cy="646331"/>
-          </a:xfrm>
-          <a:prstGeom prst="rect">
-            <a:avLst/>
-          </a:prstGeom>
-          <a:noFill/>
-        </p:spPr>
-        <p:txBody>
-          <a:bodyPr wrap="square">
-            <a:spAutoFit/>
-          </a:bodyPr>
-          <a:lstStyle/>
-          <a:p>
-            <a:pPr algn="ctr"/>
-            <a:r>
-              <a:rPr lang="en-PH" sz="1200" dirty="0">
-                <a:effectLst/>
-                <a:latin typeface="Aptos Display" panose="020B0004020202020204" pitchFamily="34" charset="0"/>
-                <a:ea typeface="Lexend" pitchFamily="2" charset="0"/>
-                <a:cs typeface="Lexend" pitchFamily="2" charset="0"/>
-              </a:rPr>
-              <a:t>Where all kinds of interactable have in common. From being hovered and dragged mechanics.</a:t>
-            </a:r>
-            <a:endParaRPr lang="en-PH" sz="1200" dirty="0"/>
-          </a:p>
-        </p:txBody>
-      </p:sp>
-      <p:sp>
-        <p:nvSpPr>
-          <p:cNvPr id="24" name="Rectangle 23">
-            <a:extLst>
-              <a:ext uri="{FF2B5EF4-FFF2-40B4-BE49-F238E27FC236}">
-                <a16:creationId xmlns:a16="http://schemas.microsoft.com/office/drawing/2014/main" id="{3AD11A1A-EF9B-77E0-2D16-C85EF5663134}"/>
+      <p:sp>
+        <p:nvSpPr>
+          <p:cNvPr id="18" name="Rectangle 17">
+            <a:extLst>
+              <a:ext uri="{FF2B5EF4-FFF2-40B4-BE49-F238E27FC236}">
+                <a16:creationId xmlns:a16="http://schemas.microsoft.com/office/drawing/2014/main" id="{A8EE9D69-B969-2797-5FF1-DC290564E0A7}"/>
               </a:ext>
             </a:extLst>
           </p:cNvPr>
@@ -3800,7 +3624,7 @@
         </p:nvSpPr>
         <p:spPr>
           <a:xfrm>
-            <a:off x="2703830" y="159214"/>
+            <a:off x="355224" y="2639682"/>
             <a:ext cx="2206172" cy="449943"/>
           </a:xfrm>
           <a:prstGeom prst="rect">
@@ -3811,7 +3635,6 @@
             <a:solidFill>
               <a:schemeClr val="tx1"/>
             </a:solidFill>
-            <a:prstDash val="dash"/>
           </a:ln>
         </p:spPr>
         <p:style>
@@ -3842,7 +3665,7 @@
                 </a:solidFill>
                 <a:latin typeface="Aptos Display" panose="020B0004020202020204" pitchFamily="34" charset="0"/>
               </a:rPr>
-              <a:t>Configuration Class</a:t>
+              <a:t>Camera Class</a:t>
             </a:r>
             <a:endParaRPr lang="en-PH" dirty="0">
               <a:solidFill>
@@ -3853,59 +3676,12 @@
           </a:p>
         </p:txBody>
       </p:sp>
-      <p:cxnSp>
-        <p:nvCxnSpPr>
-          <p:cNvPr id="25" name="Straight Arrow Connector 24">
-            <a:extLst>
-              <a:ext uri="{FF2B5EF4-FFF2-40B4-BE49-F238E27FC236}">
-                <a16:creationId xmlns:a16="http://schemas.microsoft.com/office/drawing/2014/main" id="{62222434-B9E6-9318-228B-2BFFD134B1EA}"/>
-              </a:ext>
-            </a:extLst>
-          </p:cNvPr>
-          <p:cNvCxnSpPr>
-            <a:cxnSpLocks/>
-            <a:stCxn id="29" idx="2"/>
-            <a:endCxn id="10" idx="0"/>
-          </p:cNvCxnSpPr>
-          <p:nvPr/>
-        </p:nvCxnSpPr>
-        <p:spPr>
-          <a:xfrm>
-            <a:off x="3806916" y="1264141"/>
-            <a:ext cx="0" cy="289803"/>
-          </a:xfrm>
-          <a:prstGeom prst="straightConnector1">
-            <a:avLst/>
-          </a:prstGeom>
-          <a:ln>
-            <a:solidFill>
-              <a:schemeClr val="tx1"/>
-            </a:solidFill>
-            <a:prstDash val="dash"/>
-            <a:tailEnd type="triangle"/>
-          </a:ln>
-        </p:spPr>
-        <p:style>
-          <a:lnRef idx="1">
-            <a:schemeClr val="accent1"/>
-          </a:lnRef>
-          <a:fillRef idx="0">
-            <a:schemeClr val="accent1"/>
-          </a:fillRef>
-          <a:effectRef idx="0">
-            <a:schemeClr val="accent1"/>
-          </a:effectRef>
-          <a:fontRef idx="minor">
-            <a:schemeClr val="tx1"/>
-          </a:fontRef>
-        </p:style>
-      </p:cxnSp>
-      <p:sp>
-        <p:nvSpPr>
-          <p:cNvPr id="29" name="TextBox 28">
-            <a:extLst>
-              <a:ext uri="{FF2B5EF4-FFF2-40B4-BE49-F238E27FC236}">
-                <a16:creationId xmlns:a16="http://schemas.microsoft.com/office/drawing/2014/main" id="{3F92984F-01D8-487B-200D-BDAEF57F2887}"/>
+      <p:sp>
+        <p:nvSpPr>
+          <p:cNvPr id="22" name="TextBox 21">
+            <a:extLst>
+              <a:ext uri="{FF2B5EF4-FFF2-40B4-BE49-F238E27FC236}">
+                <a16:creationId xmlns:a16="http://schemas.microsoft.com/office/drawing/2014/main" id="{74B4F58A-4FFD-968E-4B34-1DDC44DD53F6}"/>
               </a:ext>
             </a:extLst>
           </p:cNvPr>
@@ -3914,8 +3690,8 @@
         </p:nvSpPr>
         <p:spPr>
           <a:xfrm>
-            <a:off x="2703830" y="617810"/>
-            <a:ext cx="2206172" cy="646331"/>
+            <a:off x="355224" y="3110978"/>
+            <a:ext cx="2206172" cy="830997"/>
           </a:xfrm>
           <a:prstGeom prst="rect">
             <a:avLst/>
@@ -3936,7 +3712,7 @@
                 <a:ea typeface="Lexend" pitchFamily="2" charset="0"/>
                 <a:cs typeface="Lexend" pitchFamily="2" charset="0"/>
               </a:rPr>
-              <a:t>Where the default configuration of the game is used such as default camera speed etc.</a:t>
+              <a:t>Where user can see the simulation environment, also the responsible for movement of the player</a:t>
             </a:r>
             <a:endParaRPr lang="en-PH" sz="1200" dirty="0"/>
           </a:p>
@@ -3944,10 +3720,52 @@
       </p:sp>
       <p:sp>
         <p:nvSpPr>
-          <p:cNvPr id="31" name="Rectangle 30">
-            <a:extLst>
-              <a:ext uri="{FF2B5EF4-FFF2-40B4-BE49-F238E27FC236}">
-                <a16:creationId xmlns:a16="http://schemas.microsoft.com/office/drawing/2014/main" id="{23192239-78AE-740E-31DB-5E4AD6381A3F}"/>
+          <p:cNvPr id="23" name="TextBox 22">
+            <a:extLst>
+              <a:ext uri="{FF2B5EF4-FFF2-40B4-BE49-F238E27FC236}">
+                <a16:creationId xmlns:a16="http://schemas.microsoft.com/office/drawing/2014/main" id="{A11F700B-2315-F509-DB98-D07ED705AF91}"/>
+              </a:ext>
+            </a:extLst>
+          </p:cNvPr>
+          <p:cNvSpPr txBox="1"/>
+          <p:nvPr/>
+        </p:nvSpPr>
+        <p:spPr>
+          <a:xfrm>
+            <a:off x="5136511" y="3091255"/>
+            <a:ext cx="2206172" cy="646331"/>
+          </a:xfrm>
+          <a:prstGeom prst="rect">
+            <a:avLst/>
+          </a:prstGeom>
+          <a:noFill/>
+        </p:spPr>
+        <p:txBody>
+          <a:bodyPr wrap="square">
+            <a:spAutoFit/>
+          </a:bodyPr>
+          <a:lstStyle/>
+          <a:p>
+            <a:pPr algn="ctr"/>
+            <a:r>
+              <a:rPr lang="en-PH" sz="1200" dirty="0">
+                <a:effectLst/>
+                <a:latin typeface="Aptos Display" panose="020B0004020202020204" pitchFamily="34" charset="0"/>
+                <a:ea typeface="Lexend" pitchFamily="2" charset="0"/>
+                <a:cs typeface="Lexend" pitchFamily="2" charset="0"/>
+              </a:rPr>
+              <a:t>Where all kinds of interactable have in common. From being hovered and dragged mechanics.</a:t>
+            </a:r>
+            <a:endParaRPr lang="en-PH" sz="1200" dirty="0"/>
+          </a:p>
+        </p:txBody>
+      </p:sp>
+      <p:sp>
+        <p:nvSpPr>
+          <p:cNvPr id="24" name="Rectangle 23">
+            <a:extLst>
+              <a:ext uri="{FF2B5EF4-FFF2-40B4-BE49-F238E27FC236}">
+                <a16:creationId xmlns:a16="http://schemas.microsoft.com/office/drawing/2014/main" id="{3AD11A1A-EF9B-77E0-2D16-C85EF5663134}"/>
               </a:ext>
             </a:extLst>
           </p:cNvPr>
@@ -3956,7 +3774,7 @@
         </p:nvSpPr>
         <p:spPr>
           <a:xfrm>
-            <a:off x="171087" y="4060438"/>
+            <a:off x="2703830" y="329033"/>
             <a:ext cx="2206172" cy="449943"/>
           </a:xfrm>
           <a:prstGeom prst="rect">
@@ -3967,6 +3785,7 @@
             <a:solidFill>
               <a:schemeClr val="tx1"/>
             </a:solidFill>
+            <a:prstDash val="dash"/>
           </a:ln>
         </p:spPr>
         <p:style>
@@ -3997,7 +3816,7 @@
                 </a:solidFill>
                 <a:latin typeface="Aptos Display" panose="020B0004020202020204" pitchFamily="34" charset="0"/>
               </a:rPr>
-              <a:t>Interactor Class</a:t>
+              <a:t>Configuration Class</a:t>
             </a:r>
             <a:endParaRPr lang="en-PH" dirty="0">
               <a:solidFill>
@@ -4008,58 +3827,12 @@
           </a:p>
         </p:txBody>
       </p:sp>
-      <p:cxnSp>
-        <p:nvCxnSpPr>
-          <p:cNvPr id="32" name="Straight Arrow Connector 31">
-            <a:extLst>
-              <a:ext uri="{FF2B5EF4-FFF2-40B4-BE49-F238E27FC236}">
-                <a16:creationId xmlns:a16="http://schemas.microsoft.com/office/drawing/2014/main" id="{1C566A00-DB64-8865-A62E-CF7A0B397764}"/>
-              </a:ext>
-            </a:extLst>
-          </p:cNvPr>
-          <p:cNvCxnSpPr>
-            <a:cxnSpLocks/>
-            <a:stCxn id="22" idx="2"/>
-            <a:endCxn id="31" idx="0"/>
-          </p:cNvCxnSpPr>
-          <p:nvPr/>
-        </p:nvCxnSpPr>
-        <p:spPr>
-          <a:xfrm>
-            <a:off x="1274173" y="3773786"/>
-            <a:ext cx="0" cy="286652"/>
-          </a:xfrm>
-          <a:prstGeom prst="straightConnector1">
-            <a:avLst/>
-          </a:prstGeom>
-          <a:ln>
-            <a:solidFill>
-              <a:schemeClr val="tx1"/>
-            </a:solidFill>
-            <a:tailEnd type="triangle"/>
-          </a:ln>
-        </p:spPr>
-        <p:style>
-          <a:lnRef idx="1">
-            <a:schemeClr val="accent1"/>
-          </a:lnRef>
-          <a:fillRef idx="0">
-            <a:schemeClr val="accent1"/>
-          </a:fillRef>
-          <a:effectRef idx="0">
-            <a:schemeClr val="accent1"/>
-          </a:effectRef>
-          <a:fontRef idx="minor">
-            <a:schemeClr val="tx1"/>
-          </a:fontRef>
-        </p:style>
-      </p:cxnSp>
-      <p:sp>
-        <p:nvSpPr>
-          <p:cNvPr id="36" name="TextBox 35">
-            <a:extLst>
-              <a:ext uri="{FF2B5EF4-FFF2-40B4-BE49-F238E27FC236}">
-                <a16:creationId xmlns:a16="http://schemas.microsoft.com/office/drawing/2014/main" id="{25B34238-0F35-7201-AF79-A47F433CEB70}"/>
+      <p:sp>
+        <p:nvSpPr>
+          <p:cNvPr id="29" name="TextBox 28">
+            <a:extLst>
+              <a:ext uri="{FF2B5EF4-FFF2-40B4-BE49-F238E27FC236}">
+                <a16:creationId xmlns:a16="http://schemas.microsoft.com/office/drawing/2014/main" id="{3F92984F-01D8-487B-200D-BDAEF57F2887}"/>
               </a:ext>
             </a:extLst>
           </p:cNvPr>
@@ -4068,7 +3841,7 @@
         </p:nvSpPr>
         <p:spPr>
           <a:xfrm>
-            <a:off x="171087" y="4510381"/>
+            <a:off x="2703830" y="787629"/>
             <a:ext cx="2206172" cy="646331"/>
           </a:xfrm>
           <a:prstGeom prst="rect">
@@ -4090,61 +3863,18 @@
                 <a:ea typeface="Lexend" pitchFamily="2" charset="0"/>
                 <a:cs typeface="Lexend" pitchFamily="2" charset="0"/>
               </a:rPr>
-              <a:t>Responsible for interacting with the interactable class. Dragging and Hovering them.</a:t>
+              <a:t>Where the default configuration of the game is used such as default camera speed etc.</a:t>
             </a:r>
             <a:endParaRPr lang="en-PH" sz="1200" dirty="0"/>
           </a:p>
         </p:txBody>
       </p:sp>
-      <p:cxnSp>
-        <p:nvCxnSpPr>
-          <p:cNvPr id="70" name="Straight Connector 69">
-            <a:extLst>
-              <a:ext uri="{FF2B5EF4-FFF2-40B4-BE49-F238E27FC236}">
-                <a16:creationId xmlns:a16="http://schemas.microsoft.com/office/drawing/2014/main" id="{C5257E55-E9B4-AF30-A43C-2BC47988C042}"/>
-              </a:ext>
-            </a:extLst>
-          </p:cNvPr>
-          <p:cNvCxnSpPr>
-            <a:cxnSpLocks/>
-          </p:cNvCxnSpPr>
-          <p:nvPr/>
-        </p:nvCxnSpPr>
-        <p:spPr>
-          <a:xfrm>
-            <a:off x="1274173" y="2203040"/>
-            <a:ext cx="4638853" cy="0"/>
-          </a:xfrm>
-          <a:prstGeom prst="line">
-            <a:avLst/>
-          </a:prstGeom>
-          <a:ln>
-            <a:solidFill>
-              <a:schemeClr val="tx1"/>
-            </a:solidFill>
-          </a:ln>
-        </p:spPr>
-        <p:style>
-          <a:lnRef idx="1">
-            <a:schemeClr val="accent1"/>
-          </a:lnRef>
-          <a:fillRef idx="0">
-            <a:schemeClr val="accent1"/>
-          </a:fillRef>
-          <a:effectRef idx="0">
-            <a:schemeClr val="accent1"/>
-          </a:effectRef>
-          <a:fontRef idx="minor">
-            <a:schemeClr val="tx1"/>
-          </a:fontRef>
-        </p:style>
-      </p:cxnSp>
-      <p:sp>
-        <p:nvSpPr>
-          <p:cNvPr id="71" name="Rectangle 70">
-            <a:extLst>
-              <a:ext uri="{FF2B5EF4-FFF2-40B4-BE49-F238E27FC236}">
-                <a16:creationId xmlns:a16="http://schemas.microsoft.com/office/drawing/2014/main" id="{6848D709-11A3-37D1-495A-BDE9A94578D5}"/>
+      <p:sp>
+        <p:nvSpPr>
+          <p:cNvPr id="31" name="Rectangle 30">
+            <a:extLst>
+              <a:ext uri="{FF2B5EF4-FFF2-40B4-BE49-F238E27FC236}">
+                <a16:creationId xmlns:a16="http://schemas.microsoft.com/office/drawing/2014/main" id="{23192239-78AE-740E-31DB-5E4AD6381A3F}"/>
               </a:ext>
             </a:extLst>
           </p:cNvPr>
@@ -4153,7 +3883,7 @@
         </p:nvSpPr>
         <p:spPr>
           <a:xfrm>
-            <a:off x="9814741" y="2692948"/>
+            <a:off x="355224" y="4228627"/>
             <a:ext cx="2206172" cy="449943"/>
           </a:xfrm>
           <a:prstGeom prst="rect">
@@ -4194,7 +3924,7 @@
                 </a:solidFill>
                 <a:latin typeface="Aptos Display" panose="020B0004020202020204" pitchFamily="34" charset="0"/>
               </a:rPr>
-              <a:t>Interface</a:t>
+              <a:t>Interactor Class</a:t>
             </a:r>
             <a:endParaRPr lang="en-PH" dirty="0">
               <a:solidFill>
@@ -4205,35 +3935,74 @@
           </a:p>
         </p:txBody>
       </p:sp>
+      <p:sp>
+        <p:nvSpPr>
+          <p:cNvPr id="36" name="TextBox 35">
+            <a:extLst>
+              <a:ext uri="{FF2B5EF4-FFF2-40B4-BE49-F238E27FC236}">
+                <a16:creationId xmlns:a16="http://schemas.microsoft.com/office/drawing/2014/main" id="{25B34238-0F35-7201-AF79-A47F433CEB70}"/>
+              </a:ext>
+            </a:extLst>
+          </p:cNvPr>
+          <p:cNvSpPr txBox="1"/>
+          <p:nvPr/>
+        </p:nvSpPr>
+        <p:spPr>
+          <a:xfrm>
+            <a:off x="355224" y="4678570"/>
+            <a:ext cx="2206172" cy="646331"/>
+          </a:xfrm>
+          <a:prstGeom prst="rect">
+            <a:avLst/>
+          </a:prstGeom>
+          <a:noFill/>
+        </p:spPr>
+        <p:txBody>
+          <a:bodyPr wrap="square">
+            <a:spAutoFit/>
+          </a:bodyPr>
+          <a:lstStyle/>
+          <a:p>
+            <a:pPr algn="ctr"/>
+            <a:r>
+              <a:rPr lang="en-PH" sz="1200" dirty="0">
+                <a:effectLst/>
+                <a:latin typeface="Aptos Display" panose="020B0004020202020204" pitchFamily="34" charset="0"/>
+                <a:ea typeface="Lexend" pitchFamily="2" charset="0"/>
+                <a:cs typeface="Lexend" pitchFamily="2" charset="0"/>
+              </a:rPr>
+              <a:t>Responsible for interacting with the interactable class. Dragging and Hovering them.</a:t>
+            </a:r>
+            <a:endParaRPr lang="en-PH" sz="1200" dirty="0"/>
+          </a:p>
+        </p:txBody>
+      </p:sp>
       <p:cxnSp>
         <p:nvCxnSpPr>
-          <p:cNvPr id="74" name="Straight Arrow Connector 73">
-            <a:extLst>
-              <a:ext uri="{FF2B5EF4-FFF2-40B4-BE49-F238E27FC236}">
-                <a16:creationId xmlns:a16="http://schemas.microsoft.com/office/drawing/2014/main" id="{E90E9BBA-9465-307C-CD5C-945426A24B2F}"/>
+          <p:cNvPr id="70" name="Straight Connector 69">
+            <a:extLst>
+              <a:ext uri="{FF2B5EF4-FFF2-40B4-BE49-F238E27FC236}">
+                <a16:creationId xmlns:a16="http://schemas.microsoft.com/office/drawing/2014/main" id="{C5257E55-E9B4-AF30-A43C-2BC47988C042}"/>
               </a:ext>
             </a:extLst>
           </p:cNvPr>
           <p:cNvCxnSpPr>
             <a:cxnSpLocks/>
-            <a:stCxn id="10" idx="3"/>
-            <a:endCxn id="83" idx="1"/>
           </p:cNvCxnSpPr>
           <p:nvPr/>
         </p:nvCxnSpPr>
         <p:spPr>
           <a:xfrm>
-            <a:off x="4910002" y="1778916"/>
-            <a:ext cx="4904739" cy="0"/>
-          </a:xfrm>
-          <a:prstGeom prst="straightConnector1">
+            <a:off x="1458310" y="2371229"/>
+            <a:ext cx="4781287" cy="1630"/>
+          </a:xfrm>
+          <a:prstGeom prst="line">
             <a:avLst/>
           </a:prstGeom>
           <a:ln>
             <a:solidFill>
               <a:schemeClr val="tx1"/>
             </a:solidFill>
-            <a:tailEnd type="triangle"/>
           </a:ln>
         </p:spPr>
         <p:style>
@@ -4253,52 +4022,10 @@
       </p:cxnSp>
       <p:sp>
         <p:nvSpPr>
-          <p:cNvPr id="77" name="TextBox 76">
-            <a:extLst>
-              <a:ext uri="{FF2B5EF4-FFF2-40B4-BE49-F238E27FC236}">
-                <a16:creationId xmlns:a16="http://schemas.microsoft.com/office/drawing/2014/main" id="{B8657331-3559-AE8C-E731-D82ED1A37C69}"/>
-              </a:ext>
-            </a:extLst>
-          </p:cNvPr>
-          <p:cNvSpPr txBox="1"/>
-          <p:nvPr/>
-        </p:nvSpPr>
-        <p:spPr>
-          <a:xfrm>
-            <a:off x="9814741" y="3142891"/>
-            <a:ext cx="2206172" cy="646331"/>
-          </a:xfrm>
-          <a:prstGeom prst="rect">
-            <a:avLst/>
-          </a:prstGeom>
-          <a:noFill/>
-        </p:spPr>
-        <p:txBody>
-          <a:bodyPr wrap="square">
-            <a:spAutoFit/>
-          </a:bodyPr>
-          <a:lstStyle/>
-          <a:p>
-            <a:pPr algn="ctr"/>
-            <a:r>
-              <a:rPr lang="en-PH" sz="1200" dirty="0">
-                <a:effectLst/>
-                <a:latin typeface="Aptos Display" panose="020B0004020202020204" pitchFamily="34" charset="0"/>
-                <a:ea typeface="Lexend" pitchFamily="2" charset="0"/>
-                <a:cs typeface="Lexend" pitchFamily="2" charset="0"/>
-              </a:rPr>
-              <a:t>Communicating what is happening on the engine to the screen.</a:t>
-            </a:r>
-            <a:endParaRPr lang="en-PH" sz="1200" dirty="0"/>
-          </a:p>
-        </p:txBody>
-      </p:sp>
-      <p:sp>
-        <p:nvSpPr>
-          <p:cNvPr id="83" name="Rectangle 82">
-            <a:extLst>
-              <a:ext uri="{FF2B5EF4-FFF2-40B4-BE49-F238E27FC236}">
-                <a16:creationId xmlns:a16="http://schemas.microsoft.com/office/drawing/2014/main" id="{BC020DE6-27ED-317D-7BE1-730678EDEBFB}"/>
+          <p:cNvPr id="71" name="Rectangle 70">
+            <a:extLst>
+              <a:ext uri="{FF2B5EF4-FFF2-40B4-BE49-F238E27FC236}">
+                <a16:creationId xmlns:a16="http://schemas.microsoft.com/office/drawing/2014/main" id="{6848D709-11A3-37D1-495A-BDE9A94578D5}"/>
               </a:ext>
             </a:extLst>
           </p:cNvPr>
@@ -4307,7 +4034,7 @@
         </p:nvSpPr>
         <p:spPr>
           <a:xfrm>
-            <a:off x="9814741" y="1553944"/>
+            <a:off x="9651456" y="2862767"/>
             <a:ext cx="2206172" cy="449943"/>
           </a:xfrm>
           <a:prstGeom prst="rect">
@@ -4348,7 +4075,7 @@
                 </a:solidFill>
                 <a:latin typeface="Aptos Display" panose="020B0004020202020204" pitchFamily="34" charset="0"/>
               </a:rPr>
-              <a:t>Debugging Engine</a:t>
+              <a:t>Interface</a:t>
             </a:r>
             <a:endParaRPr lang="en-PH" dirty="0">
               <a:solidFill>
@@ -4359,58 +4086,12 @@
           </a:p>
         </p:txBody>
       </p:sp>
-      <p:cxnSp>
-        <p:nvCxnSpPr>
-          <p:cNvPr id="84" name="Straight Arrow Connector 83">
-            <a:extLst>
-              <a:ext uri="{FF2B5EF4-FFF2-40B4-BE49-F238E27FC236}">
-                <a16:creationId xmlns:a16="http://schemas.microsoft.com/office/drawing/2014/main" id="{18723BE3-4FC8-C93C-8FB2-E69639BD0889}"/>
-              </a:ext>
-            </a:extLst>
-          </p:cNvPr>
-          <p:cNvCxnSpPr>
-            <a:cxnSpLocks/>
-            <a:stCxn id="85" idx="2"/>
-            <a:endCxn id="71" idx="0"/>
-          </p:cNvCxnSpPr>
-          <p:nvPr/>
-        </p:nvCxnSpPr>
-        <p:spPr>
-          <a:xfrm>
-            <a:off x="10917827" y="2465552"/>
-            <a:ext cx="0" cy="227396"/>
-          </a:xfrm>
-          <a:prstGeom prst="straightConnector1">
-            <a:avLst/>
-          </a:prstGeom>
-          <a:ln>
-            <a:solidFill>
-              <a:schemeClr val="tx1"/>
-            </a:solidFill>
-            <a:tailEnd type="triangle"/>
-          </a:ln>
-        </p:spPr>
-        <p:style>
-          <a:lnRef idx="1">
-            <a:schemeClr val="accent1"/>
-          </a:lnRef>
-          <a:fillRef idx="0">
-            <a:schemeClr val="accent1"/>
-          </a:fillRef>
-          <a:effectRef idx="0">
-            <a:schemeClr val="accent1"/>
-          </a:effectRef>
-          <a:fontRef idx="minor">
-            <a:schemeClr val="tx1"/>
-          </a:fontRef>
-        </p:style>
-      </p:cxnSp>
-      <p:sp>
-        <p:nvSpPr>
-          <p:cNvPr id="85" name="TextBox 84">
-            <a:extLst>
-              <a:ext uri="{FF2B5EF4-FFF2-40B4-BE49-F238E27FC236}">
-                <a16:creationId xmlns:a16="http://schemas.microsoft.com/office/drawing/2014/main" id="{CB7756BD-129D-8094-E3F0-8446A34C190D}"/>
+      <p:sp>
+        <p:nvSpPr>
+          <p:cNvPr id="77" name="TextBox 76">
+            <a:extLst>
+              <a:ext uri="{FF2B5EF4-FFF2-40B4-BE49-F238E27FC236}">
+                <a16:creationId xmlns:a16="http://schemas.microsoft.com/office/drawing/2014/main" id="{B8657331-3559-AE8C-E731-D82ED1A37C69}"/>
               </a:ext>
             </a:extLst>
           </p:cNvPr>
@@ -4419,8 +4100,8 @@
         </p:nvSpPr>
         <p:spPr>
           <a:xfrm>
-            <a:off x="9814741" y="2003887"/>
-            <a:ext cx="2206172" cy="461665"/>
+            <a:off x="9651456" y="3312710"/>
+            <a:ext cx="2206172" cy="646331"/>
           </a:xfrm>
           <a:prstGeom prst="rect">
             <a:avLst/>
@@ -4441,7 +4122,7 @@
                 <a:ea typeface="Lexend" pitchFamily="2" charset="0"/>
                 <a:cs typeface="Lexend" pitchFamily="2" charset="0"/>
               </a:rPr>
-              <a:t>Responsible for checking values and finding faults in the engine.</a:t>
+              <a:t>Communicating what is happening on the engine to the screen.</a:t>
             </a:r>
             <a:endParaRPr lang="en-PH" sz="1200" dirty="0"/>
           </a:p>
@@ -4449,10 +4130,10 @@
       </p:sp>
       <p:sp>
         <p:nvSpPr>
-          <p:cNvPr id="104" name="Rectangle 103">
-            <a:extLst>
-              <a:ext uri="{FF2B5EF4-FFF2-40B4-BE49-F238E27FC236}">
-                <a16:creationId xmlns:a16="http://schemas.microsoft.com/office/drawing/2014/main" id="{C4B2B3D0-3C20-9182-D626-2AEE03DF67C5}"/>
+          <p:cNvPr id="83" name="Rectangle 82">
+            <a:extLst>
+              <a:ext uri="{FF2B5EF4-FFF2-40B4-BE49-F238E27FC236}">
+                <a16:creationId xmlns:a16="http://schemas.microsoft.com/office/drawing/2014/main" id="{BC020DE6-27ED-317D-7BE1-730678EDEBFB}"/>
               </a:ext>
             </a:extLst>
           </p:cNvPr>
@@ -4461,8 +4142,8 @@
         </p:nvSpPr>
         <p:spPr>
           <a:xfrm>
-            <a:off x="2540544" y="4060438"/>
-            <a:ext cx="1679478" cy="449943"/>
+            <a:off x="9651456" y="1723763"/>
+            <a:ext cx="2206172" cy="449943"/>
           </a:xfrm>
           <a:prstGeom prst="rect">
             <a:avLst/>
@@ -4470,7 +4151,7 @@
           <a:noFill/>
           <a:ln>
             <a:solidFill>
-              <a:schemeClr val="tx1"/>
+              <a:srgbClr val="00B0F0"/>
             </a:solidFill>
           </a:ln>
         </p:spPr>
@@ -4496,17 +4177,17 @@
           <a:p>
             <a:pPr algn="ctr"/>
             <a:r>
-              <a:rPr lang="en-US" sz="1400" dirty="0">
+              <a:rPr lang="en-US" dirty="0">
                 <a:solidFill>
-                  <a:schemeClr val="tx1"/>
+                  <a:srgbClr val="00B0F0"/>
                 </a:solidFill>
                 <a:latin typeface="Aptos Display" panose="020B0004020202020204" pitchFamily="34" charset="0"/>
               </a:rPr>
-              <a:t>Bracket Class</a:t>
-            </a:r>
-            <a:endParaRPr lang="en-PH" sz="1400" dirty="0">
+              <a:t>Debugging Engine</a:t>
+            </a:r>
+            <a:endParaRPr lang="en-PH" dirty="0">
               <a:solidFill>
-                <a:schemeClr val="tx1"/>
+                <a:srgbClr val="00B0F0"/>
               </a:solidFill>
               <a:latin typeface="Aptos Display" panose="020B0004020202020204" pitchFamily="34" charset="0"/>
             </a:endParaRPr>
@@ -4515,10 +4196,10 @@
       </p:sp>
       <p:sp>
         <p:nvSpPr>
-          <p:cNvPr id="105" name="TextBox 104">
-            <a:extLst>
-              <a:ext uri="{FF2B5EF4-FFF2-40B4-BE49-F238E27FC236}">
-                <a16:creationId xmlns:a16="http://schemas.microsoft.com/office/drawing/2014/main" id="{6B6FBD12-40EC-7A84-31CE-0696DD8FD84E}"/>
+          <p:cNvPr id="85" name="TextBox 84">
+            <a:extLst>
+              <a:ext uri="{FF2B5EF4-FFF2-40B4-BE49-F238E27FC236}">
+                <a16:creationId xmlns:a16="http://schemas.microsoft.com/office/drawing/2014/main" id="{CB7756BD-129D-8094-E3F0-8446A34C190D}"/>
               </a:ext>
             </a:extLst>
           </p:cNvPr>
@@ -4527,8 +4208,8 @@
         </p:nvSpPr>
         <p:spPr>
           <a:xfrm>
-            <a:off x="2540544" y="4510381"/>
-            <a:ext cx="1679478" cy="577081"/>
+            <a:off x="9651456" y="2173706"/>
+            <a:ext cx="2206172" cy="461665"/>
           </a:xfrm>
           <a:prstGeom prst="rect">
             <a:avLst/>
@@ -4543,200 +4224,24 @@
           <a:p>
             <a:pPr algn="ctr"/>
             <a:r>
-              <a:rPr lang="en-PH" sz="1050" dirty="0">
+              <a:rPr lang="en-PH" sz="1200" dirty="0">
                 <a:effectLst/>
                 <a:latin typeface="Aptos Display" panose="020B0004020202020204" pitchFamily="34" charset="0"/>
                 <a:ea typeface="Lexend" pitchFamily="2" charset="0"/>
                 <a:cs typeface="Lexend" pitchFamily="2" charset="0"/>
               </a:rPr>
-              <a:t>Attaching of parts to build larger structures and attach other important parts.</a:t>
-            </a:r>
-            <a:endParaRPr lang="en-PH" sz="1050" dirty="0"/>
-          </a:p>
-        </p:txBody>
-      </p:sp>
-      <p:cxnSp>
-        <p:nvCxnSpPr>
-          <p:cNvPr id="106" name="Straight Arrow Connector 105">
-            <a:extLst>
-              <a:ext uri="{FF2B5EF4-FFF2-40B4-BE49-F238E27FC236}">
-                <a16:creationId xmlns:a16="http://schemas.microsoft.com/office/drawing/2014/main" id="{1B8F3A67-4C90-9032-FDA1-8223A42E3AB4}"/>
-              </a:ext>
-            </a:extLst>
-          </p:cNvPr>
-          <p:cNvCxnSpPr>
-            <a:cxnSpLocks/>
-            <a:endCxn id="104" idx="0"/>
-          </p:cNvCxnSpPr>
-          <p:nvPr/>
-        </p:nvCxnSpPr>
-        <p:spPr>
-          <a:xfrm>
-            <a:off x="3380283" y="3727943"/>
-            <a:ext cx="0" cy="332495"/>
-          </a:xfrm>
-          <a:prstGeom prst="straightConnector1">
-            <a:avLst/>
-          </a:prstGeom>
-          <a:ln>
-            <a:solidFill>
-              <a:schemeClr val="tx1"/>
-            </a:solidFill>
-            <a:tailEnd type="triangle"/>
-          </a:ln>
-        </p:spPr>
-        <p:style>
-          <a:lnRef idx="1">
-            <a:schemeClr val="accent1"/>
-          </a:lnRef>
-          <a:fillRef idx="0">
-            <a:schemeClr val="accent1"/>
-          </a:fillRef>
-          <a:effectRef idx="0">
-            <a:schemeClr val="accent1"/>
-          </a:effectRef>
-          <a:fontRef idx="minor">
-            <a:schemeClr val="tx1"/>
-          </a:fontRef>
-        </p:style>
-      </p:cxnSp>
-      <p:cxnSp>
-        <p:nvCxnSpPr>
-          <p:cNvPr id="112" name="Straight Connector 111">
-            <a:extLst>
-              <a:ext uri="{FF2B5EF4-FFF2-40B4-BE49-F238E27FC236}">
-                <a16:creationId xmlns:a16="http://schemas.microsoft.com/office/drawing/2014/main" id="{13D199EF-49BE-E48D-5772-AC41E666FA6F}"/>
-              </a:ext>
-            </a:extLst>
-          </p:cNvPr>
-          <p:cNvCxnSpPr>
-            <a:cxnSpLocks/>
-          </p:cNvCxnSpPr>
-          <p:nvPr/>
-        </p:nvCxnSpPr>
-        <p:spPr>
-          <a:xfrm flipV="1">
-            <a:off x="3380283" y="3727942"/>
-            <a:ext cx="2532743" cy="1"/>
-          </a:xfrm>
-          <a:prstGeom prst="line">
-            <a:avLst/>
-          </a:prstGeom>
-          <a:ln>
-            <a:solidFill>
-              <a:schemeClr val="tx1"/>
-            </a:solidFill>
-          </a:ln>
-        </p:spPr>
-        <p:style>
-          <a:lnRef idx="1">
-            <a:schemeClr val="accent1"/>
-          </a:lnRef>
-          <a:fillRef idx="0">
-            <a:schemeClr val="accent1"/>
-          </a:fillRef>
-          <a:effectRef idx="0">
-            <a:schemeClr val="accent1"/>
-          </a:effectRef>
-          <a:fontRef idx="minor">
-            <a:schemeClr val="tx1"/>
-          </a:fontRef>
-        </p:style>
-      </p:cxnSp>
-      <p:cxnSp>
-        <p:nvCxnSpPr>
-          <p:cNvPr id="119" name="Straight Arrow Connector 118">
-            <a:extLst>
-              <a:ext uri="{FF2B5EF4-FFF2-40B4-BE49-F238E27FC236}">
-                <a16:creationId xmlns:a16="http://schemas.microsoft.com/office/drawing/2014/main" id="{6A6DC49D-2A68-665B-B568-E3B3639D0C48}"/>
-              </a:ext>
-            </a:extLst>
-          </p:cNvPr>
-          <p:cNvCxnSpPr>
-            <a:cxnSpLocks/>
-          </p:cNvCxnSpPr>
-          <p:nvPr/>
-        </p:nvCxnSpPr>
-        <p:spPr>
-          <a:xfrm>
-            <a:off x="3795392" y="2003887"/>
-            <a:ext cx="0" cy="199153"/>
-          </a:xfrm>
-          <a:prstGeom prst="straightConnector1">
-            <a:avLst/>
-          </a:prstGeom>
-          <a:ln>
-            <a:solidFill>
-              <a:schemeClr val="tx1"/>
-            </a:solidFill>
-            <a:tailEnd type="triangle"/>
-          </a:ln>
-        </p:spPr>
-        <p:style>
-          <a:lnRef idx="1">
-            <a:schemeClr val="accent1"/>
-          </a:lnRef>
-          <a:fillRef idx="0">
-            <a:schemeClr val="accent1"/>
-          </a:fillRef>
-          <a:effectRef idx="0">
-            <a:schemeClr val="accent1"/>
-          </a:effectRef>
-          <a:fontRef idx="minor">
-            <a:schemeClr val="tx1"/>
-          </a:fontRef>
-        </p:style>
-      </p:cxnSp>
-      <p:cxnSp>
-        <p:nvCxnSpPr>
-          <p:cNvPr id="121" name="Straight Arrow Connector 120">
-            <a:extLst>
-              <a:ext uri="{FF2B5EF4-FFF2-40B4-BE49-F238E27FC236}">
-                <a16:creationId xmlns:a16="http://schemas.microsoft.com/office/drawing/2014/main" id="{44CE1130-84C6-72A0-E1C8-17196A35EBFA}"/>
-              </a:ext>
-            </a:extLst>
-          </p:cNvPr>
-          <p:cNvCxnSpPr>
-            <a:cxnSpLocks/>
-          </p:cNvCxnSpPr>
-          <p:nvPr/>
-        </p:nvCxnSpPr>
-        <p:spPr>
-          <a:xfrm>
-            <a:off x="5913026" y="3542636"/>
-            <a:ext cx="0" cy="199153"/>
-          </a:xfrm>
-          <a:prstGeom prst="straightConnector1">
-            <a:avLst/>
-          </a:prstGeom>
-          <a:ln>
-            <a:solidFill>
-              <a:schemeClr val="tx1"/>
-            </a:solidFill>
-            <a:tailEnd type="triangle"/>
-          </a:ln>
-        </p:spPr>
-        <p:style>
-          <a:lnRef idx="1">
-            <a:schemeClr val="accent1"/>
-          </a:lnRef>
-          <a:fillRef idx="0">
-            <a:schemeClr val="accent1"/>
-          </a:fillRef>
-          <a:effectRef idx="0">
-            <a:schemeClr val="accent1"/>
-          </a:effectRef>
-          <a:fontRef idx="minor">
-            <a:schemeClr val="tx1"/>
-          </a:fontRef>
-        </p:style>
-      </p:cxnSp>
-      <p:sp>
-        <p:nvSpPr>
-          <p:cNvPr id="124" name="Rectangle 123">
-            <a:extLst>
-              <a:ext uri="{FF2B5EF4-FFF2-40B4-BE49-F238E27FC236}">
-                <a16:creationId xmlns:a16="http://schemas.microsoft.com/office/drawing/2014/main" id="{3B9FE3B8-D884-FAD8-FE9D-DB83F13D592B}"/>
+              <a:t>Responsible for checking values and finding faults in the engine.</a:t>
+            </a:r>
+            <a:endParaRPr lang="en-PH" sz="1200" dirty="0"/>
+          </a:p>
+        </p:txBody>
+      </p:sp>
+      <p:sp>
+        <p:nvSpPr>
+          <p:cNvPr id="104" name="Rectangle 103">
+            <a:extLst>
+              <a:ext uri="{FF2B5EF4-FFF2-40B4-BE49-F238E27FC236}">
+                <a16:creationId xmlns:a16="http://schemas.microsoft.com/office/drawing/2014/main" id="{C4B2B3D0-3C20-9182-D626-2AEE03DF67C5}"/>
               </a:ext>
             </a:extLst>
           </p:cNvPr>
@@ -4745,8 +4250,8 @@
         </p:nvSpPr>
         <p:spPr>
           <a:xfrm>
-            <a:off x="2540544" y="5319034"/>
-            <a:ext cx="1679478" cy="577082"/>
+            <a:off x="3292252" y="4225867"/>
+            <a:ext cx="1679478" cy="449943"/>
           </a:xfrm>
           <a:prstGeom prst="rect">
             <a:avLst/>
@@ -4786,19 +4291,7 @@
                 </a:solidFill>
                 <a:latin typeface="Aptos Display" panose="020B0004020202020204" pitchFamily="34" charset="0"/>
               </a:rPr>
-              <a:t>Two-slot bracket to </a:t>
-            </a:r>
-          </a:p>
-          <a:p>
-            <a:pPr algn="ctr"/>
-            <a:r>
-              <a:rPr lang="en-US" sz="1400" dirty="0">
-                <a:solidFill>
-                  <a:schemeClr val="tx1"/>
-                </a:solidFill>
-                <a:latin typeface="Aptos Display" panose="020B0004020202020204" pitchFamily="34" charset="0"/>
-              </a:rPr>
-              <a:t>Ten-slot bracket</a:t>
+              <a:t>Bracket Class</a:t>
             </a:r>
             <a:endParaRPr lang="en-PH" sz="1400" dirty="0">
               <a:solidFill>
@@ -4809,35 +4302,74 @@
           </a:p>
         </p:txBody>
       </p:sp>
+      <p:sp>
+        <p:nvSpPr>
+          <p:cNvPr id="105" name="TextBox 104">
+            <a:extLst>
+              <a:ext uri="{FF2B5EF4-FFF2-40B4-BE49-F238E27FC236}">
+                <a16:creationId xmlns:a16="http://schemas.microsoft.com/office/drawing/2014/main" id="{6B6FBD12-40EC-7A84-31CE-0696DD8FD84E}"/>
+              </a:ext>
+            </a:extLst>
+          </p:cNvPr>
+          <p:cNvSpPr txBox="1"/>
+          <p:nvPr/>
+        </p:nvSpPr>
+        <p:spPr>
+          <a:xfrm>
+            <a:off x="3292252" y="4675810"/>
+            <a:ext cx="1679478" cy="577081"/>
+          </a:xfrm>
+          <a:prstGeom prst="rect">
+            <a:avLst/>
+          </a:prstGeom>
+          <a:noFill/>
+        </p:spPr>
+        <p:txBody>
+          <a:bodyPr wrap="square">
+            <a:spAutoFit/>
+          </a:bodyPr>
+          <a:lstStyle/>
+          <a:p>
+            <a:pPr algn="ctr"/>
+            <a:r>
+              <a:rPr lang="en-PH" sz="1050" dirty="0">
+                <a:effectLst/>
+                <a:latin typeface="Aptos Display" panose="020B0004020202020204" pitchFamily="34" charset="0"/>
+                <a:ea typeface="Lexend" pitchFamily="2" charset="0"/>
+                <a:cs typeface="Lexend" pitchFamily="2" charset="0"/>
+              </a:rPr>
+              <a:t>Attaching of parts to build larger structures and attach other important parts.</a:t>
+            </a:r>
+            <a:endParaRPr lang="en-PH" sz="1050" dirty="0"/>
+          </a:p>
+        </p:txBody>
+      </p:sp>
       <p:cxnSp>
         <p:nvCxnSpPr>
-          <p:cNvPr id="125" name="Straight Arrow Connector 124">
-            <a:extLst>
-              <a:ext uri="{FF2B5EF4-FFF2-40B4-BE49-F238E27FC236}">
-                <a16:creationId xmlns:a16="http://schemas.microsoft.com/office/drawing/2014/main" id="{A0FA77FD-7B25-B7AF-E066-86EFCE249591}"/>
+          <p:cNvPr id="112" name="Straight Connector 111">
+            <a:extLst>
+              <a:ext uri="{FF2B5EF4-FFF2-40B4-BE49-F238E27FC236}">
+                <a16:creationId xmlns:a16="http://schemas.microsoft.com/office/drawing/2014/main" id="{13D199EF-49BE-E48D-5772-AC41E666FA6F}"/>
               </a:ext>
             </a:extLst>
           </p:cNvPr>
           <p:cNvCxnSpPr>
             <a:cxnSpLocks/>
-            <a:stCxn id="105" idx="2"/>
-            <a:endCxn id="124" idx="0"/>
           </p:cNvCxnSpPr>
           <p:nvPr/>
         </p:nvCxnSpPr>
         <p:spPr>
           <a:xfrm>
-            <a:off x="3380283" y="5087462"/>
-            <a:ext cx="0" cy="231572"/>
-          </a:xfrm>
-          <a:prstGeom prst="straightConnector1">
+            <a:off x="4131991" y="3897762"/>
+            <a:ext cx="4353157" cy="0"/>
+          </a:xfrm>
+          <a:prstGeom prst="line">
             <a:avLst/>
           </a:prstGeom>
           <a:ln>
             <a:solidFill>
               <a:schemeClr val="tx1"/>
             </a:solidFill>
-            <a:tailEnd type="triangle"/>
           </a:ln>
         </p:spPr>
         <p:style>
@@ -4857,10 +4389,76 @@
       </p:cxnSp>
       <p:sp>
         <p:nvSpPr>
-          <p:cNvPr id="131" name="TextBox 130">
-            <a:extLst>
-              <a:ext uri="{FF2B5EF4-FFF2-40B4-BE49-F238E27FC236}">
-                <a16:creationId xmlns:a16="http://schemas.microsoft.com/office/drawing/2014/main" id="{5B753C8E-E651-D739-A062-598574BB7551}"/>
+          <p:cNvPr id="6" name="Rectangle 5">
+            <a:extLst>
+              <a:ext uri="{FF2B5EF4-FFF2-40B4-BE49-F238E27FC236}">
+                <a16:creationId xmlns:a16="http://schemas.microsoft.com/office/drawing/2014/main" id="{164A8A63-6FB5-9D59-1CBE-E05E23BE48EC}"/>
+              </a:ext>
+            </a:extLst>
+          </p:cNvPr>
+          <p:cNvSpPr/>
+          <p:nvPr/>
+        </p:nvSpPr>
+        <p:spPr>
+          <a:xfrm>
+            <a:off x="7645409" y="4230855"/>
+            <a:ext cx="1679478" cy="449943"/>
+          </a:xfrm>
+          <a:prstGeom prst="rect">
+            <a:avLst/>
+          </a:prstGeom>
+          <a:noFill/>
+          <a:ln>
+            <a:solidFill>
+              <a:schemeClr val="tx1"/>
+            </a:solidFill>
+          </a:ln>
+        </p:spPr>
+        <p:style>
+          <a:lnRef idx="2">
+            <a:schemeClr val="accent1">
+              <a:shade val="15000"/>
+            </a:schemeClr>
+          </a:lnRef>
+          <a:fillRef idx="1">
+            <a:schemeClr val="accent1"/>
+          </a:fillRef>
+          <a:effectRef idx="0">
+            <a:schemeClr val="accent1"/>
+          </a:effectRef>
+          <a:fontRef idx="minor">
+            <a:schemeClr val="lt1"/>
+          </a:fontRef>
+        </p:style>
+        <p:txBody>
+          <a:bodyPr rtlCol="0" anchor="ctr"/>
+          <a:lstStyle/>
+          <a:p>
+            <a:pPr algn="ctr"/>
+            <a:r>
+              <a:rPr lang="en-US" sz="1400" dirty="0">
+                <a:solidFill>
+                  <a:schemeClr val="tx1"/>
+                </a:solidFill>
+                <a:latin typeface="Aptos Display" panose="020B0004020202020204" pitchFamily="34" charset="0"/>
+              </a:rPr>
+              <a:t>Miscellaneous</a:t>
+            </a:r>
+            <a:endParaRPr lang="en-PH" sz="1400" dirty="0">
+              <a:solidFill>
+                <a:schemeClr val="tx1"/>
+              </a:solidFill>
+              <a:latin typeface="Aptos Display" panose="020B0004020202020204" pitchFamily="34" charset="0"/>
+            </a:endParaRPr>
+          </a:p>
+        </p:txBody>
+      </p:sp>
+      <p:sp>
+        <p:nvSpPr>
+          <p:cNvPr id="14" name="TextBox 13">
+            <a:extLst>
+              <a:ext uri="{FF2B5EF4-FFF2-40B4-BE49-F238E27FC236}">
+                <a16:creationId xmlns:a16="http://schemas.microsoft.com/office/drawing/2014/main" id="{A7C660AC-4D2C-4837-21B8-FE05C9832AA1}"/>
               </a:ext>
             </a:extLst>
           </p:cNvPr>
@@ -4869,7 +4467,7 @@
         </p:nvSpPr>
         <p:spPr>
           <a:xfrm>
-            <a:off x="2540544" y="5900339"/>
+            <a:off x="7645409" y="4690744"/>
             <a:ext cx="1679478" cy="415498"/>
           </a:xfrm>
           <a:prstGeom prst="rect">
@@ -4891,12 +4489,578 @@
                 <a:ea typeface="Lexend" pitchFamily="2" charset="0"/>
                 <a:cs typeface="Lexend" pitchFamily="2" charset="0"/>
               </a:rPr>
-              <a:t>The planned number of brackets to be used.</a:t>
+              <a:t>Decorator objects that are mostly aesthetics. </a:t>
             </a:r>
             <a:endParaRPr lang="en-PH" sz="1050" dirty="0"/>
           </a:p>
         </p:txBody>
       </p:sp>
+      <p:sp>
+        <p:nvSpPr>
+          <p:cNvPr id="20" name="TextBox 19">
+            <a:extLst>
+              <a:ext uri="{FF2B5EF4-FFF2-40B4-BE49-F238E27FC236}">
+                <a16:creationId xmlns:a16="http://schemas.microsoft.com/office/drawing/2014/main" id="{EB8FADBE-CE25-C242-FA0D-60AE80B7062B}"/>
+              </a:ext>
+            </a:extLst>
+          </p:cNvPr>
+          <p:cNvSpPr txBox="1"/>
+          <p:nvPr/>
+        </p:nvSpPr>
+        <p:spPr>
+          <a:xfrm>
+            <a:off x="171087" y="5814943"/>
+            <a:ext cx="8202206" cy="900246"/>
+          </a:xfrm>
+          <a:prstGeom prst="rect">
+            <a:avLst/>
+          </a:prstGeom>
+          <a:noFill/>
+        </p:spPr>
+        <p:txBody>
+          <a:bodyPr wrap="square">
+            <a:spAutoFit/>
+          </a:bodyPr>
+          <a:lstStyle/>
+          <a:p>
+            <a:r>
+              <a:rPr lang="en-PH" sz="1050" b="1" dirty="0">
+                <a:solidFill>
+                  <a:schemeClr val="bg1"/>
+                </a:solidFill>
+                <a:effectLst/>
+                <a:latin typeface="Aptos Display" panose="020B0004020202020204" pitchFamily="34" charset="0"/>
+                <a:ea typeface="Lexend" pitchFamily="2" charset="0"/>
+                <a:cs typeface="Lexend" pitchFamily="2" charset="0"/>
+              </a:rPr>
+              <a:t>Figure 1.  Simulation Engine Class</a:t>
+            </a:r>
+          </a:p>
+          <a:p>
+            <a:r>
+              <a:rPr lang="en-PH" sz="1050" dirty="0">
+                <a:solidFill>
+                  <a:schemeClr val="bg1"/>
+                </a:solidFill>
+                <a:latin typeface="Aptos Display" panose="020B0004020202020204" pitchFamily="34" charset="0"/>
+                <a:ea typeface="Lexend" pitchFamily="2" charset="0"/>
+                <a:cs typeface="Lexend" pitchFamily="2" charset="0"/>
+              </a:rPr>
+              <a:t>The figure above describes how the current simulation engine of Vblox works.</a:t>
+            </a:r>
+          </a:p>
+          <a:p>
+            <a:endParaRPr lang="en-PH" sz="1050" dirty="0">
+              <a:solidFill>
+                <a:schemeClr val="bg1"/>
+              </a:solidFill>
+              <a:effectLst/>
+              <a:latin typeface="Aptos Display" panose="020B0004020202020204" pitchFamily="34" charset="0"/>
+              <a:ea typeface="Lexend" pitchFamily="2" charset="0"/>
+              <a:cs typeface="Lexend" pitchFamily="2" charset="0"/>
+            </a:endParaRPr>
+          </a:p>
+          <a:p>
+            <a:r>
+              <a:rPr lang="en-PH" sz="1050" dirty="0">
+                <a:solidFill>
+                  <a:schemeClr val="bg1"/>
+                </a:solidFill>
+                <a:latin typeface="Aptos Display" panose="020B0004020202020204" pitchFamily="34" charset="0"/>
+                <a:ea typeface="Lexend" pitchFamily="2" charset="0"/>
+                <a:cs typeface="Lexend" pitchFamily="2" charset="0"/>
+              </a:rPr>
+              <a:t>The Simulation Engine is the uppermost class that has all the necessary tools for the lower class to work. Alongside with the Debugging Engine which handles all error handling. Additionally, it also got the values from the Configuration Class to make sure that the values can be edited immediately.</a:t>
+            </a:r>
+            <a:endParaRPr lang="en-PH" sz="1050" dirty="0">
+              <a:solidFill>
+                <a:schemeClr val="bg1"/>
+              </a:solidFill>
+              <a:effectLst/>
+              <a:latin typeface="Aptos Display" panose="020B0004020202020204" pitchFamily="34" charset="0"/>
+              <a:ea typeface="Lexend" pitchFamily="2" charset="0"/>
+              <a:cs typeface="Lexend" pitchFamily="2" charset="0"/>
+            </a:endParaRPr>
+          </a:p>
+        </p:txBody>
+      </p:sp>
+      <p:sp>
+        <p:nvSpPr>
+          <p:cNvPr id="38" name="Rectangle 37">
+            <a:extLst>
+              <a:ext uri="{FF2B5EF4-FFF2-40B4-BE49-F238E27FC236}">
+                <a16:creationId xmlns:a16="http://schemas.microsoft.com/office/drawing/2014/main" id="{B9E480B0-B871-F551-DDD7-247D717193A0}"/>
+              </a:ext>
+            </a:extLst>
+          </p:cNvPr>
+          <p:cNvSpPr/>
+          <p:nvPr/>
+        </p:nvSpPr>
+        <p:spPr>
+          <a:xfrm>
+            <a:off x="3187703" y="2632659"/>
+            <a:ext cx="6248397" cy="2682462"/>
+          </a:xfrm>
+          <a:prstGeom prst="rect">
+            <a:avLst/>
+          </a:prstGeom>
+          <a:noFill/>
+          <a:ln>
+            <a:solidFill>
+              <a:schemeClr val="tx1"/>
+            </a:solidFill>
+            <a:prstDash val="dash"/>
+          </a:ln>
+        </p:spPr>
+        <p:style>
+          <a:lnRef idx="2">
+            <a:schemeClr val="accent1">
+              <a:shade val="15000"/>
+            </a:schemeClr>
+          </a:lnRef>
+          <a:fillRef idx="1">
+            <a:schemeClr val="accent1"/>
+          </a:fillRef>
+          <a:effectRef idx="0">
+            <a:schemeClr val="accent1"/>
+          </a:effectRef>
+          <a:fontRef idx="minor">
+            <a:schemeClr val="lt1"/>
+          </a:fontRef>
+        </p:style>
+        <p:txBody>
+          <a:bodyPr rtlCol="0" anchor="ctr"/>
+          <a:lstStyle/>
+          <a:p>
+            <a:pPr algn="ctr"/>
+            <a:endParaRPr lang="en-PH"/>
+          </a:p>
+        </p:txBody>
+      </p:sp>
+      <p:cxnSp>
+        <p:nvCxnSpPr>
+          <p:cNvPr id="42" name="Straight Connector 41">
+            <a:extLst>
+              <a:ext uri="{FF2B5EF4-FFF2-40B4-BE49-F238E27FC236}">
+                <a16:creationId xmlns:a16="http://schemas.microsoft.com/office/drawing/2014/main" id="{036801B2-DF9C-7463-DA14-19FD64BBF748}"/>
+              </a:ext>
+            </a:extLst>
+          </p:cNvPr>
+          <p:cNvCxnSpPr>
+            <a:stCxn id="10" idx="0"/>
+            <a:endCxn id="29" idx="2"/>
+          </p:cNvCxnSpPr>
+          <p:nvPr/>
+        </p:nvCxnSpPr>
+        <p:spPr>
+          <a:xfrm flipV="1">
+            <a:off x="3806916" y="1433960"/>
+            <a:ext cx="0" cy="289803"/>
+          </a:xfrm>
+          <a:prstGeom prst="line">
+            <a:avLst/>
+          </a:prstGeom>
+          <a:ln>
+            <a:prstDash val="dash"/>
+          </a:ln>
+        </p:spPr>
+        <p:style>
+          <a:lnRef idx="1">
+            <a:schemeClr val="dk1"/>
+          </a:lnRef>
+          <a:fillRef idx="0">
+            <a:schemeClr val="dk1"/>
+          </a:fillRef>
+          <a:effectRef idx="0">
+            <a:schemeClr val="dk1"/>
+          </a:effectRef>
+          <a:fontRef idx="minor">
+            <a:schemeClr val="tx1"/>
+          </a:fontRef>
+        </p:style>
+      </p:cxnSp>
+      <p:cxnSp>
+        <p:nvCxnSpPr>
+          <p:cNvPr id="43" name="Straight Connector 42">
+            <a:extLst>
+              <a:ext uri="{FF2B5EF4-FFF2-40B4-BE49-F238E27FC236}">
+                <a16:creationId xmlns:a16="http://schemas.microsoft.com/office/drawing/2014/main" id="{2C4E4C3E-990D-0968-3B8A-BCC245057D5A}"/>
+              </a:ext>
+            </a:extLst>
+          </p:cNvPr>
+          <p:cNvCxnSpPr>
+            <a:cxnSpLocks/>
+          </p:cNvCxnSpPr>
+          <p:nvPr/>
+        </p:nvCxnSpPr>
+        <p:spPr>
+          <a:xfrm flipV="1">
+            <a:off x="6239597" y="2371229"/>
+            <a:ext cx="0" cy="261430"/>
+          </a:xfrm>
+          <a:prstGeom prst="line">
+            <a:avLst/>
+          </a:prstGeom>
+          <a:ln>
+            <a:prstDash val="solid"/>
+          </a:ln>
+        </p:spPr>
+        <p:style>
+          <a:lnRef idx="1">
+            <a:schemeClr val="dk1"/>
+          </a:lnRef>
+          <a:fillRef idx="0">
+            <a:schemeClr val="dk1"/>
+          </a:fillRef>
+          <a:effectRef idx="0">
+            <a:schemeClr val="dk1"/>
+          </a:effectRef>
+          <a:fontRef idx="minor">
+            <a:schemeClr val="tx1"/>
+          </a:fontRef>
+        </p:style>
+      </p:cxnSp>
+      <p:cxnSp>
+        <p:nvCxnSpPr>
+          <p:cNvPr id="45" name="Straight Connector 44">
+            <a:extLst>
+              <a:ext uri="{FF2B5EF4-FFF2-40B4-BE49-F238E27FC236}">
+                <a16:creationId xmlns:a16="http://schemas.microsoft.com/office/drawing/2014/main" id="{3E5EB0FB-82F3-BDB3-4DAD-2F06B0D33AD1}"/>
+              </a:ext>
+            </a:extLst>
+          </p:cNvPr>
+          <p:cNvCxnSpPr>
+            <a:cxnSpLocks/>
+          </p:cNvCxnSpPr>
+          <p:nvPr/>
+        </p:nvCxnSpPr>
+        <p:spPr>
+          <a:xfrm flipV="1">
+            <a:off x="1458310" y="2378252"/>
+            <a:ext cx="0" cy="261430"/>
+          </a:xfrm>
+          <a:prstGeom prst="line">
+            <a:avLst/>
+          </a:prstGeom>
+          <a:ln>
+            <a:prstDash val="solid"/>
+          </a:ln>
+        </p:spPr>
+        <p:style>
+          <a:lnRef idx="1">
+            <a:schemeClr val="dk1"/>
+          </a:lnRef>
+          <a:fillRef idx="0">
+            <a:schemeClr val="dk1"/>
+          </a:fillRef>
+          <a:effectRef idx="0">
+            <a:schemeClr val="dk1"/>
+          </a:effectRef>
+          <a:fontRef idx="minor">
+            <a:schemeClr val="tx1"/>
+          </a:fontRef>
+        </p:style>
+      </p:cxnSp>
+      <p:cxnSp>
+        <p:nvCxnSpPr>
+          <p:cNvPr id="46" name="Straight Connector 45">
+            <a:extLst>
+              <a:ext uri="{FF2B5EF4-FFF2-40B4-BE49-F238E27FC236}">
+                <a16:creationId xmlns:a16="http://schemas.microsoft.com/office/drawing/2014/main" id="{2C647D45-8B8A-9EFB-FA7E-B0A6EE3BA01C}"/>
+              </a:ext>
+            </a:extLst>
+          </p:cNvPr>
+          <p:cNvCxnSpPr>
+            <a:cxnSpLocks/>
+            <a:endCxn id="10" idx="2"/>
+          </p:cNvCxnSpPr>
+          <p:nvPr/>
+        </p:nvCxnSpPr>
+        <p:spPr>
+          <a:xfrm flipV="1">
+            <a:off x="3806916" y="2173706"/>
+            <a:ext cx="0" cy="197523"/>
+          </a:xfrm>
+          <a:prstGeom prst="line">
+            <a:avLst/>
+          </a:prstGeom>
+          <a:ln>
+            <a:prstDash val="solid"/>
+          </a:ln>
+        </p:spPr>
+        <p:style>
+          <a:lnRef idx="1">
+            <a:schemeClr val="dk1"/>
+          </a:lnRef>
+          <a:fillRef idx="0">
+            <a:schemeClr val="dk1"/>
+          </a:fillRef>
+          <a:effectRef idx="0">
+            <a:schemeClr val="dk1"/>
+          </a:effectRef>
+          <a:fontRef idx="minor">
+            <a:schemeClr val="tx1"/>
+          </a:fontRef>
+        </p:style>
+      </p:cxnSp>
+      <p:cxnSp>
+        <p:nvCxnSpPr>
+          <p:cNvPr id="48" name="Straight Connector 47">
+            <a:extLst>
+              <a:ext uri="{FF2B5EF4-FFF2-40B4-BE49-F238E27FC236}">
+                <a16:creationId xmlns:a16="http://schemas.microsoft.com/office/drawing/2014/main" id="{53367A08-1930-6A50-FFB4-888226154A20}"/>
+              </a:ext>
+            </a:extLst>
+          </p:cNvPr>
+          <p:cNvCxnSpPr>
+            <a:cxnSpLocks/>
+            <a:stCxn id="83" idx="1"/>
+            <a:endCxn id="10" idx="3"/>
+          </p:cNvCxnSpPr>
+          <p:nvPr/>
+        </p:nvCxnSpPr>
+        <p:spPr>
+          <a:xfrm flipH="1">
+            <a:off x="4910002" y="1948735"/>
+            <a:ext cx="4741454" cy="0"/>
+          </a:xfrm>
+          <a:prstGeom prst="line">
+            <a:avLst/>
+          </a:prstGeom>
+          <a:ln>
+            <a:solidFill>
+              <a:srgbClr val="00B0F0"/>
+            </a:solidFill>
+            <a:prstDash val="solid"/>
+          </a:ln>
+        </p:spPr>
+        <p:style>
+          <a:lnRef idx="1">
+            <a:schemeClr val="dk1"/>
+          </a:lnRef>
+          <a:fillRef idx="0">
+            <a:schemeClr val="dk1"/>
+          </a:fillRef>
+          <a:effectRef idx="0">
+            <a:schemeClr val="dk1"/>
+          </a:effectRef>
+          <a:fontRef idx="minor">
+            <a:schemeClr val="tx1"/>
+          </a:fontRef>
+        </p:style>
+      </p:cxnSp>
+      <p:cxnSp>
+        <p:nvCxnSpPr>
+          <p:cNvPr id="51" name="Straight Connector 50">
+            <a:extLst>
+              <a:ext uri="{FF2B5EF4-FFF2-40B4-BE49-F238E27FC236}">
+                <a16:creationId xmlns:a16="http://schemas.microsoft.com/office/drawing/2014/main" id="{A09CCFD9-F114-9F3C-7940-0C30E95C1B1E}"/>
+              </a:ext>
+            </a:extLst>
+          </p:cNvPr>
+          <p:cNvCxnSpPr>
+            <a:cxnSpLocks/>
+            <a:stCxn id="71" idx="0"/>
+            <a:endCxn id="85" idx="2"/>
+          </p:cNvCxnSpPr>
+          <p:nvPr/>
+        </p:nvCxnSpPr>
+        <p:spPr>
+          <a:xfrm flipV="1">
+            <a:off x="10754542" y="2635371"/>
+            <a:ext cx="0" cy="227396"/>
+          </a:xfrm>
+          <a:prstGeom prst="line">
+            <a:avLst/>
+          </a:prstGeom>
+          <a:ln>
+            <a:prstDash val="solid"/>
+          </a:ln>
+        </p:spPr>
+        <p:style>
+          <a:lnRef idx="1">
+            <a:schemeClr val="dk1"/>
+          </a:lnRef>
+          <a:fillRef idx="0">
+            <a:schemeClr val="dk1"/>
+          </a:fillRef>
+          <a:effectRef idx="0">
+            <a:schemeClr val="dk1"/>
+          </a:effectRef>
+          <a:fontRef idx="minor">
+            <a:schemeClr val="tx1"/>
+          </a:fontRef>
+        </p:style>
+      </p:cxnSp>
+      <p:cxnSp>
+        <p:nvCxnSpPr>
+          <p:cNvPr id="54" name="Straight Connector 53">
+            <a:extLst>
+              <a:ext uri="{FF2B5EF4-FFF2-40B4-BE49-F238E27FC236}">
+                <a16:creationId xmlns:a16="http://schemas.microsoft.com/office/drawing/2014/main" id="{41DDEE8D-22EA-D3C3-E0B9-12648F877EF6}"/>
+              </a:ext>
+            </a:extLst>
+          </p:cNvPr>
+          <p:cNvCxnSpPr>
+            <a:cxnSpLocks/>
+            <a:stCxn id="31" idx="0"/>
+            <a:endCxn id="22" idx="2"/>
+          </p:cNvCxnSpPr>
+          <p:nvPr/>
+        </p:nvCxnSpPr>
+        <p:spPr>
+          <a:xfrm flipV="1">
+            <a:off x="1458310" y="3941975"/>
+            <a:ext cx="0" cy="286652"/>
+          </a:xfrm>
+          <a:prstGeom prst="line">
+            <a:avLst/>
+          </a:prstGeom>
+          <a:ln>
+            <a:prstDash val="solid"/>
+          </a:ln>
+        </p:spPr>
+        <p:style>
+          <a:lnRef idx="1">
+            <a:schemeClr val="dk1"/>
+          </a:lnRef>
+          <a:fillRef idx="0">
+            <a:schemeClr val="dk1"/>
+          </a:fillRef>
+          <a:effectRef idx="0">
+            <a:schemeClr val="dk1"/>
+          </a:effectRef>
+          <a:fontRef idx="minor">
+            <a:schemeClr val="tx1"/>
+          </a:fontRef>
+        </p:style>
+      </p:cxnSp>
+      <p:cxnSp>
+        <p:nvCxnSpPr>
+          <p:cNvPr id="55" name="Straight Connector 54">
+            <a:extLst>
+              <a:ext uri="{FF2B5EF4-FFF2-40B4-BE49-F238E27FC236}">
+                <a16:creationId xmlns:a16="http://schemas.microsoft.com/office/drawing/2014/main" id="{200D359C-4BA4-05EF-DF6A-88A268B8E4A1}"/>
+              </a:ext>
+            </a:extLst>
+          </p:cNvPr>
+          <p:cNvCxnSpPr>
+            <a:cxnSpLocks/>
+            <a:stCxn id="104" idx="0"/>
+          </p:cNvCxnSpPr>
+          <p:nvPr/>
+        </p:nvCxnSpPr>
+        <p:spPr>
+          <a:xfrm flipV="1">
+            <a:off x="4131991" y="3897762"/>
+            <a:ext cx="0" cy="328105"/>
+          </a:xfrm>
+          <a:prstGeom prst="line">
+            <a:avLst/>
+          </a:prstGeom>
+          <a:ln>
+            <a:prstDash val="solid"/>
+          </a:ln>
+        </p:spPr>
+        <p:style>
+          <a:lnRef idx="1">
+            <a:schemeClr val="dk1"/>
+          </a:lnRef>
+          <a:fillRef idx="0">
+            <a:schemeClr val="dk1"/>
+          </a:fillRef>
+          <a:effectRef idx="0">
+            <a:schemeClr val="dk1"/>
+          </a:effectRef>
+          <a:fontRef idx="minor">
+            <a:schemeClr val="tx1"/>
+          </a:fontRef>
+        </p:style>
+      </p:cxnSp>
+      <p:cxnSp>
+        <p:nvCxnSpPr>
+          <p:cNvPr id="58" name="Straight Connector 57">
+            <a:extLst>
+              <a:ext uri="{FF2B5EF4-FFF2-40B4-BE49-F238E27FC236}">
+                <a16:creationId xmlns:a16="http://schemas.microsoft.com/office/drawing/2014/main" id="{D7591EBA-3403-E5BD-1280-00D26CFDA967}"/>
+              </a:ext>
+            </a:extLst>
+          </p:cNvPr>
+          <p:cNvCxnSpPr>
+            <a:cxnSpLocks/>
+            <a:endCxn id="23" idx="2"/>
+          </p:cNvCxnSpPr>
+          <p:nvPr/>
+        </p:nvCxnSpPr>
+        <p:spPr>
+          <a:xfrm flipV="1">
+            <a:off x="6239597" y="3737586"/>
+            <a:ext cx="0" cy="160176"/>
+          </a:xfrm>
+          <a:prstGeom prst="line">
+            <a:avLst/>
+          </a:prstGeom>
+          <a:ln>
+            <a:prstDash val="solid"/>
+          </a:ln>
+        </p:spPr>
+        <p:style>
+          <a:lnRef idx="1">
+            <a:schemeClr val="dk1"/>
+          </a:lnRef>
+          <a:fillRef idx="0">
+            <a:schemeClr val="dk1"/>
+          </a:fillRef>
+          <a:effectRef idx="0">
+            <a:schemeClr val="dk1"/>
+          </a:effectRef>
+          <a:fontRef idx="minor">
+            <a:schemeClr val="tx1"/>
+          </a:fontRef>
+        </p:style>
+      </p:cxnSp>
+      <p:cxnSp>
+        <p:nvCxnSpPr>
+          <p:cNvPr id="64" name="Straight Connector 63">
+            <a:extLst>
+              <a:ext uri="{FF2B5EF4-FFF2-40B4-BE49-F238E27FC236}">
+                <a16:creationId xmlns:a16="http://schemas.microsoft.com/office/drawing/2014/main" id="{8DCE8CB4-B02B-1400-8F4A-35C8D5BA0826}"/>
+              </a:ext>
+            </a:extLst>
+          </p:cNvPr>
+          <p:cNvCxnSpPr>
+            <a:cxnSpLocks/>
+            <a:stCxn id="6" idx="0"/>
+          </p:cNvCxnSpPr>
+          <p:nvPr/>
+        </p:nvCxnSpPr>
+        <p:spPr>
+          <a:xfrm flipH="1" flipV="1">
+            <a:off x="8485147" y="3893885"/>
+            <a:ext cx="1" cy="336970"/>
+          </a:xfrm>
+          <a:prstGeom prst="line">
+            <a:avLst/>
+          </a:prstGeom>
+          <a:ln>
+            <a:prstDash val="solid"/>
+          </a:ln>
+        </p:spPr>
+        <p:style>
+          <a:lnRef idx="1">
+            <a:schemeClr val="dk1"/>
+          </a:lnRef>
+          <a:fillRef idx="0">
+            <a:schemeClr val="dk1"/>
+          </a:fillRef>
+          <a:effectRef idx="0">
+            <a:schemeClr val="dk1"/>
+          </a:effectRef>
+          <a:fontRef idx="minor">
+            <a:schemeClr val="tx1"/>
+          </a:fontRef>
+        </p:style>
+      </p:cxnSp>
     </p:spTree>
     <p:extLst>
       <p:ext uri="{BB962C8B-B14F-4D97-AF65-F5344CB8AC3E}">

</xml_diff>

<commit_message>
030523 | Added Block-Coding Feature
Added Documentation for BC
Edited Logos
Added Blocks
Improved code
Bug Fix
</commit_message>
<xml_diff>
--- a/assets/dev/documentation/vblox_documentation_figs.pptx
+++ b/assets/dev/documentation/vblox_documentation_figs.pptx
@@ -7,11 +7,14 @@
   <p:sldIdLst>
     <p:sldId id="258" r:id="rId2"/>
     <p:sldId id="260" r:id="rId3"/>
-    <p:sldId id="256" r:id="rId4"/>
-    <p:sldId id="257" r:id="rId5"/>
-    <p:sldId id="261" r:id="rId6"/>
-    <p:sldId id="262" r:id="rId7"/>
-    <p:sldId id="263" r:id="rId8"/>
+    <p:sldId id="264" r:id="rId4"/>
+    <p:sldId id="256" r:id="rId5"/>
+    <p:sldId id="257" r:id="rId6"/>
+    <p:sldId id="261" r:id="rId7"/>
+    <p:sldId id="262" r:id="rId8"/>
+    <p:sldId id="263" r:id="rId9"/>
+    <p:sldId id="265" r:id="rId10"/>
+    <p:sldId id="266" r:id="rId11"/>
   </p:sldIdLst>
   <p:sldSz cx="9144000" cy="6858000" type="letter"/>
   <p:notesSz cx="7102475" cy="9388475"/>
@@ -249,7 +252,7 @@
           <a:p>
             <a:fld id="{22286FE0-5F51-44A7-A7B7-365D56255C18}" type="datetimeFigureOut">
               <a:rPr lang="en-PH" smtClean="0"/>
-              <a:t>18/02/2024</a:t>
+              <a:t>05/03/2024</a:t>
             </a:fld>
             <a:endParaRPr lang="en-PH"/>
           </a:p>
@@ -419,7 +422,7 @@
           <a:p>
             <a:fld id="{22286FE0-5F51-44A7-A7B7-365D56255C18}" type="datetimeFigureOut">
               <a:rPr lang="en-PH" smtClean="0"/>
-              <a:t>18/02/2024</a:t>
+              <a:t>05/03/2024</a:t>
             </a:fld>
             <a:endParaRPr lang="en-PH"/>
           </a:p>
@@ -599,7 +602,7 @@
           <a:p>
             <a:fld id="{22286FE0-5F51-44A7-A7B7-365D56255C18}" type="datetimeFigureOut">
               <a:rPr lang="en-PH" smtClean="0"/>
-              <a:t>18/02/2024</a:t>
+              <a:t>05/03/2024</a:t>
             </a:fld>
             <a:endParaRPr lang="en-PH"/>
           </a:p>
@@ -769,7 +772,7 @@
           <a:p>
             <a:fld id="{22286FE0-5F51-44A7-A7B7-365D56255C18}" type="datetimeFigureOut">
               <a:rPr lang="en-PH" smtClean="0"/>
-              <a:t>18/02/2024</a:t>
+              <a:t>05/03/2024</a:t>
             </a:fld>
             <a:endParaRPr lang="en-PH"/>
           </a:p>
@@ -1013,7 +1016,7 @@
           <a:p>
             <a:fld id="{22286FE0-5F51-44A7-A7B7-365D56255C18}" type="datetimeFigureOut">
               <a:rPr lang="en-PH" smtClean="0"/>
-              <a:t>18/02/2024</a:t>
+              <a:t>05/03/2024</a:t>
             </a:fld>
             <a:endParaRPr lang="en-PH"/>
           </a:p>
@@ -1245,7 +1248,7 @@
           <a:p>
             <a:fld id="{22286FE0-5F51-44A7-A7B7-365D56255C18}" type="datetimeFigureOut">
               <a:rPr lang="en-PH" smtClean="0"/>
-              <a:t>18/02/2024</a:t>
+              <a:t>05/03/2024</a:t>
             </a:fld>
             <a:endParaRPr lang="en-PH"/>
           </a:p>
@@ -1612,7 +1615,7 @@
           <a:p>
             <a:fld id="{22286FE0-5F51-44A7-A7B7-365D56255C18}" type="datetimeFigureOut">
               <a:rPr lang="en-PH" smtClean="0"/>
-              <a:t>18/02/2024</a:t>
+              <a:t>05/03/2024</a:t>
             </a:fld>
             <a:endParaRPr lang="en-PH"/>
           </a:p>
@@ -1730,7 +1733,7 @@
           <a:p>
             <a:fld id="{22286FE0-5F51-44A7-A7B7-365D56255C18}" type="datetimeFigureOut">
               <a:rPr lang="en-PH" smtClean="0"/>
-              <a:t>18/02/2024</a:t>
+              <a:t>05/03/2024</a:t>
             </a:fld>
             <a:endParaRPr lang="en-PH"/>
           </a:p>
@@ -1825,7 +1828,7 @@
           <a:p>
             <a:fld id="{22286FE0-5F51-44A7-A7B7-365D56255C18}" type="datetimeFigureOut">
               <a:rPr lang="en-PH" smtClean="0"/>
-              <a:t>18/02/2024</a:t>
+              <a:t>05/03/2024</a:t>
             </a:fld>
             <a:endParaRPr lang="en-PH"/>
           </a:p>
@@ -2102,7 +2105,7 @@
           <a:p>
             <a:fld id="{22286FE0-5F51-44A7-A7B7-365D56255C18}" type="datetimeFigureOut">
               <a:rPr lang="en-PH" smtClean="0"/>
-              <a:t>18/02/2024</a:t>
+              <a:t>05/03/2024</a:t>
             </a:fld>
             <a:endParaRPr lang="en-PH"/>
           </a:p>
@@ -2359,7 +2362,7 @@
           <a:p>
             <a:fld id="{22286FE0-5F51-44A7-A7B7-365D56255C18}" type="datetimeFigureOut">
               <a:rPr lang="en-PH" smtClean="0"/>
-              <a:t>18/02/2024</a:t>
+              <a:t>05/03/2024</a:t>
             </a:fld>
             <a:endParaRPr lang="en-PH"/>
           </a:p>
@@ -2572,7 +2575,7 @@
           <a:p>
             <a:fld id="{22286FE0-5F51-44A7-A7B7-365D56255C18}" type="datetimeFigureOut">
               <a:rPr lang="en-PH" smtClean="0"/>
-              <a:t>18/02/2024</a:t>
+              <a:t>05/03/2024</a:t>
             </a:fld>
             <a:endParaRPr lang="en-PH"/>
           </a:p>
@@ -3011,6 +3014,3077 @@
     <p:extLst>
       <p:ext uri="{BB962C8B-B14F-4D97-AF65-F5344CB8AC3E}">
         <p14:creationId xmlns:p14="http://schemas.microsoft.com/office/powerpoint/2010/main" val="626954710"/>
+      </p:ext>
+    </p:extLst>
+  </p:cSld>
+  <p:clrMapOvr>
+    <a:masterClrMapping/>
+  </p:clrMapOvr>
+</p:sld>
+</file>
+
+<file path=ppt/slides/slide10.xml><?xml version="1.0" encoding="utf-8"?>
+<p:sld xmlns:a="http://schemas.openxmlformats.org/drawingml/2006/main" xmlns:r="http://schemas.openxmlformats.org/officeDocument/2006/relationships" xmlns:p="http://schemas.openxmlformats.org/presentationml/2006/main">
+  <p:cSld>
+    <p:spTree>
+      <p:nvGrpSpPr>
+        <p:cNvPr id="1" name="">
+          <a:extLst>
+            <a:ext uri="{FF2B5EF4-FFF2-40B4-BE49-F238E27FC236}">
+              <a16:creationId xmlns:a16="http://schemas.microsoft.com/office/drawing/2014/main" id="{58BFCED2-9DA2-DC1A-6283-30B13A57992B}"/>
+            </a:ext>
+          </a:extLst>
+        </p:cNvPr>
+        <p:cNvGrpSpPr/>
+        <p:nvPr/>
+      </p:nvGrpSpPr>
+      <p:grpSpPr>
+        <a:xfrm>
+          <a:off x="0" y="0"/>
+          <a:ext cx="0" cy="0"/>
+          <a:chOff x="0" y="0"/>
+          <a:chExt cx="0" cy="0"/>
+        </a:xfrm>
+      </p:grpSpPr>
+      <p:sp>
+        <p:nvSpPr>
+          <p:cNvPr id="21" name="Rectangle 20">
+            <a:extLst>
+              <a:ext uri="{FF2B5EF4-FFF2-40B4-BE49-F238E27FC236}">
+                <a16:creationId xmlns:a16="http://schemas.microsoft.com/office/drawing/2014/main" id="{6B2FAE18-2983-6F1A-DAA6-F8AB8AA50C56}"/>
+              </a:ext>
+            </a:extLst>
+          </p:cNvPr>
+          <p:cNvSpPr/>
+          <p:nvPr/>
+        </p:nvSpPr>
+        <p:spPr>
+          <a:xfrm>
+            <a:off x="0" y="4414322"/>
+            <a:ext cx="9144000" cy="857647"/>
+          </a:xfrm>
+          <a:prstGeom prst="rect">
+            <a:avLst/>
+          </a:prstGeom>
+          <a:solidFill>
+            <a:srgbClr val="00B0F0"/>
+          </a:solidFill>
+          <a:ln>
+            <a:noFill/>
+          </a:ln>
+        </p:spPr>
+        <p:style>
+          <a:lnRef idx="2">
+            <a:schemeClr val="accent1">
+              <a:shade val="15000"/>
+            </a:schemeClr>
+          </a:lnRef>
+          <a:fillRef idx="1">
+            <a:schemeClr val="accent1"/>
+          </a:fillRef>
+          <a:effectRef idx="0">
+            <a:schemeClr val="accent1"/>
+          </a:effectRef>
+          <a:fontRef idx="minor">
+            <a:schemeClr val="lt1"/>
+          </a:fontRef>
+        </p:style>
+        <p:txBody>
+          <a:bodyPr rtlCol="0" anchor="ctr"/>
+          <a:lstStyle/>
+          <a:p>
+            <a:pPr algn="ctr"/>
+            <a:endParaRPr lang="en-PH" sz="1311"/>
+          </a:p>
+        </p:txBody>
+      </p:sp>
+      <p:sp>
+        <p:nvSpPr>
+          <p:cNvPr id="8" name="TextBox 7">
+            <a:extLst>
+              <a:ext uri="{FF2B5EF4-FFF2-40B4-BE49-F238E27FC236}">
+                <a16:creationId xmlns:a16="http://schemas.microsoft.com/office/drawing/2014/main" id="{19F8CA5A-1160-C568-0C68-A24C6062FB90}"/>
+              </a:ext>
+            </a:extLst>
+          </p:cNvPr>
+          <p:cNvSpPr txBox="1"/>
+          <p:nvPr/>
+        </p:nvSpPr>
+        <p:spPr>
+          <a:xfrm>
+            <a:off x="6796558" y="4621657"/>
+            <a:ext cx="2213343" cy="495777"/>
+          </a:xfrm>
+          <a:prstGeom prst="rect">
+            <a:avLst/>
+          </a:prstGeom>
+          <a:noFill/>
+        </p:spPr>
+        <p:txBody>
+          <a:bodyPr wrap="square">
+            <a:spAutoFit/>
+          </a:bodyPr>
+          <a:lstStyle/>
+          <a:p>
+            <a:pPr algn="r"/>
+            <a:r>
+              <a:rPr lang="en-PH" sz="1311" b="1" dirty="0">
+                <a:solidFill>
+                  <a:schemeClr val="bg1"/>
+                </a:solidFill>
+                <a:latin typeface="Aptos Display" panose="020B0004020202020204" pitchFamily="34" charset="0"/>
+                <a:ea typeface="Lexend" pitchFamily="2" charset="0"/>
+                <a:cs typeface="Lexend" pitchFamily="2" charset="0"/>
+              </a:rPr>
+              <a:t>Block-Based Coding Mechanic</a:t>
+            </a:r>
+            <a:endParaRPr lang="en-PH" sz="1311" b="1" dirty="0">
+              <a:solidFill>
+                <a:schemeClr val="bg1"/>
+              </a:solidFill>
+            </a:endParaRPr>
+          </a:p>
+        </p:txBody>
+      </p:sp>
+      <p:sp>
+        <p:nvSpPr>
+          <p:cNvPr id="20" name="TextBox 19">
+            <a:extLst>
+              <a:ext uri="{FF2B5EF4-FFF2-40B4-BE49-F238E27FC236}">
+                <a16:creationId xmlns:a16="http://schemas.microsoft.com/office/drawing/2014/main" id="{DA0EACE0-0DAD-4A39-8CBC-40B1DE89944D}"/>
+              </a:ext>
+            </a:extLst>
+          </p:cNvPr>
+          <p:cNvSpPr txBox="1"/>
+          <p:nvPr/>
+        </p:nvSpPr>
+        <p:spPr>
+          <a:xfrm>
+            <a:off x="128315" y="4489678"/>
+            <a:ext cx="6151654" cy="327526"/>
+          </a:xfrm>
+          <a:prstGeom prst="rect">
+            <a:avLst/>
+          </a:prstGeom>
+          <a:noFill/>
+        </p:spPr>
+        <p:txBody>
+          <a:bodyPr wrap="square">
+            <a:spAutoFit/>
+          </a:bodyPr>
+          <a:lstStyle/>
+          <a:p>
+            <a:r>
+              <a:rPr lang="en-PH" sz="764" b="1" dirty="0">
+                <a:solidFill>
+                  <a:schemeClr val="bg1"/>
+                </a:solidFill>
+                <a:latin typeface="Aptos Display" panose="020B0004020202020204" pitchFamily="34" charset="0"/>
+                <a:ea typeface="Lexend" pitchFamily="2" charset="0"/>
+                <a:cs typeface="Lexend" pitchFamily="2" charset="0"/>
+              </a:rPr>
+              <a:t>Figure 1.  Block Based Coding Mechanic</a:t>
+            </a:r>
+          </a:p>
+          <a:p>
+            <a:r>
+              <a:rPr lang="en-PH" sz="764" dirty="0">
+                <a:solidFill>
+                  <a:schemeClr val="bg1"/>
+                </a:solidFill>
+                <a:latin typeface="Aptos Display" panose="020B0004020202020204" pitchFamily="34" charset="0"/>
+                <a:ea typeface="Lexend" pitchFamily="2" charset="0"/>
+                <a:cs typeface="Lexend" pitchFamily="2" charset="0"/>
+              </a:rPr>
+              <a:t>The figure above describes how the current block-based coding mechanics of Vblox works.</a:t>
+            </a:r>
+          </a:p>
+        </p:txBody>
+      </p:sp>
+      <p:sp>
+        <p:nvSpPr>
+          <p:cNvPr id="2" name="Rectangle 1">
+            <a:extLst>
+              <a:ext uri="{FF2B5EF4-FFF2-40B4-BE49-F238E27FC236}">
+                <a16:creationId xmlns:a16="http://schemas.microsoft.com/office/drawing/2014/main" id="{693D4464-A2E1-519B-841C-87938F61EE4F}"/>
+              </a:ext>
+            </a:extLst>
+          </p:cNvPr>
+          <p:cNvSpPr/>
+          <p:nvPr/>
+        </p:nvSpPr>
+        <p:spPr>
+          <a:xfrm>
+            <a:off x="150540" y="225921"/>
+            <a:ext cx="841253" cy="337457"/>
+          </a:xfrm>
+          <a:prstGeom prst="rect">
+            <a:avLst/>
+          </a:prstGeom>
+          <a:noFill/>
+          <a:ln w="6350">
+            <a:solidFill>
+              <a:srgbClr val="00B0F0"/>
+            </a:solidFill>
+          </a:ln>
+        </p:spPr>
+        <p:style>
+          <a:lnRef idx="2">
+            <a:schemeClr val="accent1">
+              <a:shade val="15000"/>
+            </a:schemeClr>
+          </a:lnRef>
+          <a:fillRef idx="1">
+            <a:schemeClr val="accent1"/>
+          </a:fillRef>
+          <a:effectRef idx="0">
+            <a:schemeClr val="accent1"/>
+          </a:effectRef>
+          <a:fontRef idx="minor">
+            <a:schemeClr val="lt1"/>
+          </a:fontRef>
+        </p:style>
+        <p:txBody>
+          <a:bodyPr rtlCol="0" anchor="ctr"/>
+          <a:lstStyle/>
+          <a:p>
+            <a:pPr algn="ctr"/>
+            <a:r>
+              <a:rPr lang="en-US" sz="1311" dirty="0">
+                <a:solidFill>
+                  <a:srgbClr val="00B0F0"/>
+                </a:solidFill>
+                <a:latin typeface="Aptos Display" panose="020B0004020202020204" pitchFamily="34" charset="0"/>
+              </a:rPr>
+              <a:t>Blocks</a:t>
+            </a:r>
+            <a:endParaRPr lang="en-PH" sz="1311" dirty="0">
+              <a:solidFill>
+                <a:srgbClr val="00B0F0"/>
+              </a:solidFill>
+              <a:latin typeface="Aptos Display" panose="020B0004020202020204" pitchFamily="34" charset="0"/>
+            </a:endParaRPr>
+          </a:p>
+        </p:txBody>
+      </p:sp>
+      <p:sp>
+        <p:nvSpPr>
+          <p:cNvPr id="3" name="TextBox 2">
+            <a:extLst>
+              <a:ext uri="{FF2B5EF4-FFF2-40B4-BE49-F238E27FC236}">
+                <a16:creationId xmlns:a16="http://schemas.microsoft.com/office/drawing/2014/main" id="{F529B2B4-B2B2-DD94-3DAD-64D3518DFEFF}"/>
+              </a:ext>
+            </a:extLst>
+          </p:cNvPr>
+          <p:cNvSpPr txBox="1"/>
+          <p:nvPr/>
+        </p:nvSpPr>
+        <p:spPr>
+          <a:xfrm>
+            <a:off x="9372223" y="672790"/>
+            <a:ext cx="1680273" cy="788133"/>
+          </a:xfrm>
+          <a:prstGeom prst="rect">
+            <a:avLst/>
+          </a:prstGeom>
+          <a:noFill/>
+        </p:spPr>
+        <p:txBody>
+          <a:bodyPr wrap="square">
+            <a:spAutoFit/>
+          </a:bodyPr>
+          <a:lstStyle/>
+          <a:p>
+            <a:r>
+              <a:rPr lang="en-US" sz="874" dirty="0">
+                <a:latin typeface="Aptos Display" panose="020B0004020202020204" pitchFamily="34" charset="0"/>
+                <a:ea typeface="Lexend" pitchFamily="2" charset="0"/>
+                <a:cs typeface="Lexend" pitchFamily="2" charset="0"/>
+              </a:rPr>
+              <a:t>It calculates the difference between the position of the first slot in the attaching bracket and the position of the detected slot in the current bracket. </a:t>
+            </a:r>
+            <a:endParaRPr lang="en-PH" sz="874" dirty="0"/>
+          </a:p>
+        </p:txBody>
+      </p:sp>
+      <p:sp>
+        <p:nvSpPr>
+          <p:cNvPr id="4" name="Rectangle 3">
+            <a:extLst>
+              <a:ext uri="{FF2B5EF4-FFF2-40B4-BE49-F238E27FC236}">
+                <a16:creationId xmlns:a16="http://schemas.microsoft.com/office/drawing/2014/main" id="{FE079409-04B9-B77F-C6DF-62AFD05CE8BB}"/>
+              </a:ext>
+            </a:extLst>
+          </p:cNvPr>
+          <p:cNvSpPr/>
+          <p:nvPr/>
+        </p:nvSpPr>
+        <p:spPr>
+          <a:xfrm>
+            <a:off x="82576" y="150564"/>
+            <a:ext cx="2822549" cy="4131780"/>
+          </a:xfrm>
+          <a:prstGeom prst="rect">
+            <a:avLst/>
+          </a:prstGeom>
+          <a:noFill/>
+          <a:ln w="6350">
+            <a:solidFill>
+              <a:schemeClr val="tx1"/>
+            </a:solidFill>
+            <a:prstDash val="dash"/>
+          </a:ln>
+        </p:spPr>
+        <p:style>
+          <a:lnRef idx="2">
+            <a:schemeClr val="accent1">
+              <a:shade val="15000"/>
+            </a:schemeClr>
+          </a:lnRef>
+          <a:fillRef idx="1">
+            <a:schemeClr val="accent1"/>
+          </a:fillRef>
+          <a:effectRef idx="0">
+            <a:schemeClr val="accent1"/>
+          </a:effectRef>
+          <a:fontRef idx="minor">
+            <a:schemeClr val="lt1"/>
+          </a:fontRef>
+        </p:style>
+        <p:txBody>
+          <a:bodyPr rtlCol="0" anchor="ctr"/>
+          <a:lstStyle/>
+          <a:p>
+            <a:pPr algn="ctr"/>
+            <a:endParaRPr lang="en-PH" sz="1311"/>
+          </a:p>
+        </p:txBody>
+      </p:sp>
+      <p:sp>
+        <p:nvSpPr>
+          <p:cNvPr id="19" name="TextBox 18">
+            <a:extLst>
+              <a:ext uri="{FF2B5EF4-FFF2-40B4-BE49-F238E27FC236}">
+                <a16:creationId xmlns:a16="http://schemas.microsoft.com/office/drawing/2014/main" id="{5A95286D-DA25-5C74-DB2B-A44328B5AAEA}"/>
+              </a:ext>
+            </a:extLst>
+          </p:cNvPr>
+          <p:cNvSpPr txBox="1"/>
+          <p:nvPr/>
+        </p:nvSpPr>
+        <p:spPr>
+          <a:xfrm>
+            <a:off x="1061962" y="1331628"/>
+            <a:ext cx="841253" cy="193258"/>
+          </a:xfrm>
+          <a:prstGeom prst="rect">
+            <a:avLst/>
+          </a:prstGeom>
+          <a:noFill/>
+        </p:spPr>
+        <p:txBody>
+          <a:bodyPr wrap="square">
+            <a:spAutoFit/>
+          </a:bodyPr>
+          <a:lstStyle/>
+          <a:p>
+            <a:pPr algn="ctr"/>
+            <a:r>
+              <a:rPr lang="en-US" sz="656" dirty="0">
+                <a:solidFill>
+                  <a:srgbClr val="00B0F0"/>
+                </a:solidFill>
+                <a:latin typeface="Aptos Display" panose="020B0004020202020204" pitchFamily="34" charset="0"/>
+              </a:rPr>
+              <a:t>Start Session Block</a:t>
+            </a:r>
+            <a:endParaRPr lang="en-PH" sz="656" dirty="0">
+              <a:solidFill>
+                <a:srgbClr val="00B0F0"/>
+              </a:solidFill>
+            </a:endParaRPr>
+          </a:p>
+        </p:txBody>
+      </p:sp>
+      <p:sp>
+        <p:nvSpPr>
+          <p:cNvPr id="23" name="TextBox 22">
+            <a:extLst>
+              <a:ext uri="{FF2B5EF4-FFF2-40B4-BE49-F238E27FC236}">
+                <a16:creationId xmlns:a16="http://schemas.microsoft.com/office/drawing/2014/main" id="{D6D8BA94-DAB5-3204-DB8C-3D348E15E77F}"/>
+              </a:ext>
+            </a:extLst>
+          </p:cNvPr>
+          <p:cNvSpPr txBox="1"/>
+          <p:nvPr/>
+        </p:nvSpPr>
+        <p:spPr>
+          <a:xfrm>
+            <a:off x="128314" y="587220"/>
+            <a:ext cx="2776811" cy="294183"/>
+          </a:xfrm>
+          <a:prstGeom prst="rect">
+            <a:avLst/>
+          </a:prstGeom>
+          <a:noFill/>
+        </p:spPr>
+        <p:txBody>
+          <a:bodyPr wrap="square">
+            <a:spAutoFit/>
+          </a:bodyPr>
+          <a:lstStyle/>
+          <a:p>
+            <a:r>
+              <a:rPr lang="en-US" sz="656" dirty="0">
+                <a:latin typeface="Aptos Display" panose="020B0004020202020204" pitchFamily="34" charset="0"/>
+              </a:rPr>
+              <a:t>As of version </a:t>
+            </a:r>
+            <a:r>
+              <a:rPr lang="en-US" sz="656" dirty="0">
+                <a:solidFill>
+                  <a:srgbClr val="00B0F0"/>
+                </a:solidFill>
+                <a:latin typeface="Aptos Display" panose="020B0004020202020204" pitchFamily="34" charset="0"/>
+              </a:rPr>
+              <a:t>0.1</a:t>
+            </a:r>
+            <a:r>
+              <a:rPr lang="en-US" sz="656" dirty="0">
+                <a:latin typeface="Aptos Display" panose="020B0004020202020204" pitchFamily="34" charset="0"/>
+              </a:rPr>
+              <a:t>, these are the basic block categories to be utilized by Vblox. They are subject to improving and upgrading as it the version continues.</a:t>
+            </a:r>
+            <a:endParaRPr lang="en-PH" sz="656" dirty="0"/>
+          </a:p>
+        </p:txBody>
+      </p:sp>
+      <p:grpSp>
+        <p:nvGrpSpPr>
+          <p:cNvPr id="25" name="Group 24">
+            <a:extLst>
+              <a:ext uri="{FF2B5EF4-FFF2-40B4-BE49-F238E27FC236}">
+                <a16:creationId xmlns:a16="http://schemas.microsoft.com/office/drawing/2014/main" id="{B7D4F358-3D42-169F-D1EA-F1AE41869C66}"/>
+              </a:ext>
+            </a:extLst>
+          </p:cNvPr>
+          <p:cNvGrpSpPr/>
+          <p:nvPr/>
+        </p:nvGrpSpPr>
+        <p:grpSpPr>
+          <a:xfrm>
+            <a:off x="11240386" y="2451443"/>
+            <a:ext cx="1496461" cy="444963"/>
+            <a:chOff x="171087" y="879907"/>
+            <a:chExt cx="1761854" cy="523875"/>
+          </a:xfrm>
+        </p:grpSpPr>
+        <p:sp>
+          <p:nvSpPr>
+            <p:cNvPr id="26" name="Flowchart: Terminator 25">
+              <a:extLst>
+                <a:ext uri="{FF2B5EF4-FFF2-40B4-BE49-F238E27FC236}">
+                  <a16:creationId xmlns:a16="http://schemas.microsoft.com/office/drawing/2014/main" id="{FC9A33D7-DDBE-EE71-D5D0-D1C12944B45B}"/>
+                </a:ext>
+              </a:extLst>
+            </p:cNvPr>
+            <p:cNvSpPr/>
+            <p:nvPr/>
+          </p:nvSpPr>
+          <p:spPr>
+            <a:xfrm rot="10800000">
+              <a:off x="171087" y="879907"/>
+              <a:ext cx="1761854" cy="523875"/>
+            </a:xfrm>
+            <a:prstGeom prst="flowChartTerminator">
+              <a:avLst/>
+            </a:prstGeom>
+            <a:noFill/>
+            <a:ln w="12700">
+              <a:solidFill>
+                <a:schemeClr val="tx1"/>
+              </a:solidFill>
+            </a:ln>
+          </p:spPr>
+          <p:style>
+            <a:lnRef idx="2">
+              <a:schemeClr val="accent1">
+                <a:shade val="15000"/>
+              </a:schemeClr>
+            </a:lnRef>
+            <a:fillRef idx="1">
+              <a:schemeClr val="accent1"/>
+            </a:fillRef>
+            <a:effectRef idx="0">
+              <a:schemeClr val="accent1"/>
+            </a:effectRef>
+            <a:fontRef idx="minor">
+              <a:schemeClr val="lt1"/>
+            </a:fontRef>
+          </p:style>
+          <p:txBody>
+            <a:bodyPr rtlCol="0" anchor="ctr"/>
+            <a:lstStyle/>
+            <a:p>
+              <a:pPr algn="ctr"/>
+              <a:endParaRPr lang="en-PH" sz="1311"/>
+            </a:p>
+          </p:txBody>
+        </p:sp>
+        <p:sp>
+          <p:nvSpPr>
+            <p:cNvPr id="27" name="Oval 26">
+              <a:extLst>
+                <a:ext uri="{FF2B5EF4-FFF2-40B4-BE49-F238E27FC236}">
+                  <a16:creationId xmlns:a16="http://schemas.microsoft.com/office/drawing/2014/main" id="{EFDE8FAD-EA61-D7EE-691B-47B536B2121B}"/>
+                </a:ext>
+              </a:extLst>
+            </p:cNvPr>
+            <p:cNvSpPr/>
+            <p:nvPr/>
+          </p:nvSpPr>
+          <p:spPr>
+            <a:xfrm rot="10800000">
+              <a:off x="1478557" y="960871"/>
+              <a:ext cx="361950" cy="361950"/>
+            </a:xfrm>
+            <a:prstGeom prst="ellipse">
+              <a:avLst/>
+            </a:prstGeom>
+            <a:noFill/>
+            <a:ln>
+              <a:solidFill>
+                <a:srgbClr val="00B0F0"/>
+              </a:solidFill>
+            </a:ln>
+          </p:spPr>
+          <p:style>
+            <a:lnRef idx="2">
+              <a:schemeClr val="accent1">
+                <a:shade val="15000"/>
+              </a:schemeClr>
+            </a:lnRef>
+            <a:fillRef idx="1">
+              <a:schemeClr val="accent1"/>
+            </a:fillRef>
+            <a:effectRef idx="0">
+              <a:schemeClr val="accent1"/>
+            </a:effectRef>
+            <a:fontRef idx="minor">
+              <a:schemeClr val="lt1"/>
+            </a:fontRef>
+          </p:style>
+          <p:txBody>
+            <a:bodyPr rtlCol="0" anchor="ctr"/>
+            <a:lstStyle/>
+            <a:p>
+              <a:pPr algn="ctr"/>
+              <a:endParaRPr lang="en-PH" sz="1311" dirty="0"/>
+            </a:p>
+          </p:txBody>
+        </p:sp>
+        <p:sp>
+          <p:nvSpPr>
+            <p:cNvPr id="28" name="Oval 27">
+              <a:extLst>
+                <a:ext uri="{FF2B5EF4-FFF2-40B4-BE49-F238E27FC236}">
+                  <a16:creationId xmlns:a16="http://schemas.microsoft.com/office/drawing/2014/main" id="{7D031C80-5B8B-7346-5008-24CBB4D4C695}"/>
+                </a:ext>
+              </a:extLst>
+            </p:cNvPr>
+            <p:cNvSpPr/>
+            <p:nvPr/>
+          </p:nvSpPr>
+          <p:spPr>
+            <a:xfrm rot="10800000">
+              <a:off x="266906" y="960871"/>
+              <a:ext cx="361950" cy="361950"/>
+            </a:xfrm>
+            <a:prstGeom prst="ellipse">
+              <a:avLst/>
+            </a:prstGeom>
+            <a:noFill/>
+            <a:ln>
+              <a:solidFill>
+                <a:schemeClr val="tx1"/>
+              </a:solidFill>
+            </a:ln>
+          </p:spPr>
+          <p:style>
+            <a:lnRef idx="2">
+              <a:schemeClr val="accent1">
+                <a:shade val="15000"/>
+              </a:schemeClr>
+            </a:lnRef>
+            <a:fillRef idx="1">
+              <a:schemeClr val="accent1"/>
+            </a:fillRef>
+            <a:effectRef idx="0">
+              <a:schemeClr val="accent1"/>
+            </a:effectRef>
+            <a:fontRef idx="minor">
+              <a:schemeClr val="lt1"/>
+            </a:fontRef>
+          </p:style>
+          <p:txBody>
+            <a:bodyPr rtlCol="0" anchor="ctr"/>
+            <a:lstStyle/>
+            <a:p>
+              <a:pPr algn="ctr"/>
+              <a:endParaRPr lang="en-PH" sz="1311"/>
+            </a:p>
+          </p:txBody>
+        </p:sp>
+        <p:sp>
+          <p:nvSpPr>
+            <p:cNvPr id="29" name="Oval 28">
+              <a:extLst>
+                <a:ext uri="{FF2B5EF4-FFF2-40B4-BE49-F238E27FC236}">
+                  <a16:creationId xmlns:a16="http://schemas.microsoft.com/office/drawing/2014/main" id="{FBD44430-5070-79ED-DDA5-BB186872E4D6}"/>
+                </a:ext>
+              </a:extLst>
+            </p:cNvPr>
+            <p:cNvSpPr/>
+            <p:nvPr/>
+          </p:nvSpPr>
+          <p:spPr>
+            <a:xfrm>
+              <a:off x="871039" y="960871"/>
+              <a:ext cx="361950" cy="361950"/>
+            </a:xfrm>
+            <a:prstGeom prst="ellipse">
+              <a:avLst/>
+            </a:prstGeom>
+            <a:noFill/>
+            <a:ln>
+              <a:solidFill>
+                <a:schemeClr val="tx1"/>
+              </a:solidFill>
+            </a:ln>
+          </p:spPr>
+          <p:style>
+            <a:lnRef idx="2">
+              <a:schemeClr val="accent1">
+                <a:shade val="15000"/>
+              </a:schemeClr>
+            </a:lnRef>
+            <a:fillRef idx="1">
+              <a:schemeClr val="accent1"/>
+            </a:fillRef>
+            <a:effectRef idx="0">
+              <a:schemeClr val="accent1"/>
+            </a:effectRef>
+            <a:fontRef idx="minor">
+              <a:schemeClr val="lt1"/>
+            </a:fontRef>
+          </p:style>
+          <p:txBody>
+            <a:bodyPr rtlCol="0" anchor="ctr"/>
+            <a:lstStyle/>
+            <a:p>
+              <a:pPr algn="ctr"/>
+              <a:endParaRPr lang="en-PH" sz="1311"/>
+            </a:p>
+          </p:txBody>
+        </p:sp>
+      </p:grpSp>
+      <p:grpSp>
+        <p:nvGrpSpPr>
+          <p:cNvPr id="31" name="Group 30">
+            <a:extLst>
+              <a:ext uri="{FF2B5EF4-FFF2-40B4-BE49-F238E27FC236}">
+                <a16:creationId xmlns:a16="http://schemas.microsoft.com/office/drawing/2014/main" id="{BCFD42FB-6332-133A-92C4-C7A91E62FC08}"/>
+              </a:ext>
+            </a:extLst>
+          </p:cNvPr>
+          <p:cNvGrpSpPr/>
+          <p:nvPr/>
+        </p:nvGrpSpPr>
+        <p:grpSpPr>
+          <a:xfrm>
+            <a:off x="12260747" y="1915626"/>
+            <a:ext cx="1016114" cy="444963"/>
+            <a:chOff x="442564" y="2186619"/>
+            <a:chExt cx="1934876" cy="847294"/>
+          </a:xfrm>
+        </p:grpSpPr>
+        <p:sp>
+          <p:nvSpPr>
+            <p:cNvPr id="32" name="Flowchart: Terminator 31">
+              <a:extLst>
+                <a:ext uri="{FF2B5EF4-FFF2-40B4-BE49-F238E27FC236}">
+                  <a16:creationId xmlns:a16="http://schemas.microsoft.com/office/drawing/2014/main" id="{44641529-8D1D-597F-8F83-BCC5F0F04518}"/>
+                </a:ext>
+              </a:extLst>
+            </p:cNvPr>
+            <p:cNvSpPr/>
+            <p:nvPr/>
+          </p:nvSpPr>
+          <p:spPr>
+            <a:xfrm>
+              <a:off x="442564" y="2186619"/>
+              <a:ext cx="1934876" cy="847294"/>
+            </a:xfrm>
+            <a:prstGeom prst="flowChartTerminator">
+              <a:avLst/>
+            </a:prstGeom>
+            <a:noFill/>
+            <a:ln w="12700">
+              <a:solidFill>
+                <a:srgbClr val="00B0F0"/>
+              </a:solidFill>
+            </a:ln>
+          </p:spPr>
+          <p:style>
+            <a:lnRef idx="2">
+              <a:schemeClr val="accent1">
+                <a:shade val="15000"/>
+              </a:schemeClr>
+            </a:lnRef>
+            <a:fillRef idx="1">
+              <a:schemeClr val="accent1"/>
+            </a:fillRef>
+            <a:effectRef idx="0">
+              <a:schemeClr val="accent1"/>
+            </a:effectRef>
+            <a:fontRef idx="minor">
+              <a:schemeClr val="lt1"/>
+            </a:fontRef>
+          </p:style>
+          <p:txBody>
+            <a:bodyPr rtlCol="0" anchor="ctr"/>
+            <a:lstStyle/>
+            <a:p>
+              <a:pPr algn="ctr"/>
+              <a:endParaRPr lang="en-PH" sz="1311"/>
+            </a:p>
+          </p:txBody>
+        </p:sp>
+        <p:sp>
+          <p:nvSpPr>
+            <p:cNvPr id="34" name="Oval 33">
+              <a:extLst>
+                <a:ext uri="{FF2B5EF4-FFF2-40B4-BE49-F238E27FC236}">
+                  <a16:creationId xmlns:a16="http://schemas.microsoft.com/office/drawing/2014/main" id="{AC0B4A00-AE0A-92A7-4935-8373D26C21C6}"/>
+                </a:ext>
+              </a:extLst>
+            </p:cNvPr>
+            <p:cNvSpPr/>
+            <p:nvPr/>
+          </p:nvSpPr>
+          <p:spPr>
+            <a:xfrm rot="10800000">
+              <a:off x="1574636" y="2317564"/>
+              <a:ext cx="585403" cy="585403"/>
+            </a:xfrm>
+            <a:prstGeom prst="ellipse">
+              <a:avLst/>
+            </a:prstGeom>
+            <a:noFill/>
+            <a:ln>
+              <a:solidFill>
+                <a:srgbClr val="00B0F0"/>
+              </a:solidFill>
+            </a:ln>
+          </p:spPr>
+          <p:style>
+            <a:lnRef idx="2">
+              <a:schemeClr val="accent1">
+                <a:shade val="15000"/>
+              </a:schemeClr>
+            </a:lnRef>
+            <a:fillRef idx="1">
+              <a:schemeClr val="accent1"/>
+            </a:fillRef>
+            <a:effectRef idx="0">
+              <a:schemeClr val="accent1"/>
+            </a:effectRef>
+            <a:fontRef idx="minor">
+              <a:schemeClr val="lt1"/>
+            </a:fontRef>
+          </p:style>
+          <p:txBody>
+            <a:bodyPr rtlCol="0" anchor="ctr"/>
+            <a:lstStyle/>
+            <a:p>
+              <a:pPr algn="ctr"/>
+              <a:endParaRPr lang="en-PH" sz="1311"/>
+            </a:p>
+          </p:txBody>
+        </p:sp>
+        <p:sp>
+          <p:nvSpPr>
+            <p:cNvPr id="37" name="Oval 36">
+              <a:extLst>
+                <a:ext uri="{FF2B5EF4-FFF2-40B4-BE49-F238E27FC236}">
+                  <a16:creationId xmlns:a16="http://schemas.microsoft.com/office/drawing/2014/main" id="{9285B726-E166-6259-CF36-133EA33198C7}"/>
+                </a:ext>
+              </a:extLst>
+            </p:cNvPr>
+            <p:cNvSpPr/>
+            <p:nvPr/>
+          </p:nvSpPr>
+          <p:spPr>
+            <a:xfrm>
+              <a:off x="607616" y="2322674"/>
+              <a:ext cx="585403" cy="585403"/>
+            </a:xfrm>
+            <a:prstGeom prst="ellipse">
+              <a:avLst/>
+            </a:prstGeom>
+            <a:noFill/>
+            <a:ln>
+              <a:solidFill>
+                <a:srgbClr val="00B0F0"/>
+              </a:solidFill>
+            </a:ln>
+          </p:spPr>
+          <p:style>
+            <a:lnRef idx="2">
+              <a:schemeClr val="accent1">
+                <a:shade val="15000"/>
+              </a:schemeClr>
+            </a:lnRef>
+            <a:fillRef idx="1">
+              <a:schemeClr val="accent1"/>
+            </a:fillRef>
+            <a:effectRef idx="0">
+              <a:schemeClr val="accent1"/>
+            </a:effectRef>
+            <a:fontRef idx="minor">
+              <a:schemeClr val="lt1"/>
+            </a:fontRef>
+          </p:style>
+          <p:txBody>
+            <a:bodyPr rtlCol="0" anchor="ctr"/>
+            <a:lstStyle/>
+            <a:p>
+              <a:pPr algn="ctr"/>
+              <a:endParaRPr lang="en-PH" sz="1311"/>
+            </a:p>
+          </p:txBody>
+        </p:sp>
+      </p:grpSp>
+      <p:cxnSp>
+        <p:nvCxnSpPr>
+          <p:cNvPr id="41" name="Straight Connector 40">
+            <a:extLst>
+              <a:ext uri="{FF2B5EF4-FFF2-40B4-BE49-F238E27FC236}">
+                <a16:creationId xmlns:a16="http://schemas.microsoft.com/office/drawing/2014/main" id="{2E0BD740-3C22-F8EE-2429-F3EB66B4F9DF}"/>
+              </a:ext>
+            </a:extLst>
+          </p:cNvPr>
+          <p:cNvCxnSpPr>
+            <a:cxnSpLocks/>
+          </p:cNvCxnSpPr>
+          <p:nvPr/>
+        </p:nvCxnSpPr>
+        <p:spPr>
+          <a:xfrm flipV="1">
+            <a:off x="12493809" y="1907820"/>
+            <a:ext cx="0" cy="1144683"/>
+          </a:xfrm>
+          <a:prstGeom prst="line">
+            <a:avLst/>
+          </a:prstGeom>
+          <a:ln>
+            <a:solidFill>
+              <a:srgbClr val="00B0F0"/>
+            </a:solidFill>
+            <a:prstDash val="dash"/>
+          </a:ln>
+        </p:spPr>
+        <p:style>
+          <a:lnRef idx="1">
+            <a:schemeClr val="dk1"/>
+          </a:lnRef>
+          <a:fillRef idx="0">
+            <a:schemeClr val="dk1"/>
+          </a:fillRef>
+          <a:effectRef idx="0">
+            <a:schemeClr val="dk1"/>
+          </a:effectRef>
+          <a:fontRef idx="minor">
+            <a:schemeClr val="tx1"/>
+          </a:fontRef>
+        </p:style>
+      </p:cxnSp>
+      <p:cxnSp>
+        <p:nvCxnSpPr>
+          <p:cNvPr id="42" name="Straight Connector 41">
+            <a:extLst>
+              <a:ext uri="{FF2B5EF4-FFF2-40B4-BE49-F238E27FC236}">
+                <a16:creationId xmlns:a16="http://schemas.microsoft.com/office/drawing/2014/main" id="{F78AC1D4-1E7F-4076-CA7B-6F4EA1D9ABD9}"/>
+              </a:ext>
+            </a:extLst>
+          </p:cNvPr>
+          <p:cNvCxnSpPr>
+            <a:cxnSpLocks/>
+          </p:cNvCxnSpPr>
+          <p:nvPr/>
+        </p:nvCxnSpPr>
+        <p:spPr>
+          <a:xfrm flipV="1">
+            <a:off x="12246081" y="2472854"/>
+            <a:ext cx="0" cy="420739"/>
+          </a:xfrm>
+          <a:prstGeom prst="line">
+            <a:avLst/>
+          </a:prstGeom>
+          <a:ln>
+            <a:prstDash val="dash"/>
+          </a:ln>
+        </p:spPr>
+        <p:style>
+          <a:lnRef idx="1">
+            <a:schemeClr val="dk1"/>
+          </a:lnRef>
+          <a:fillRef idx="0">
+            <a:schemeClr val="dk1"/>
+          </a:fillRef>
+          <a:effectRef idx="0">
+            <a:schemeClr val="dk1"/>
+          </a:effectRef>
+          <a:fontRef idx="minor">
+            <a:schemeClr val="tx1"/>
+          </a:fontRef>
+        </p:style>
+      </p:cxnSp>
+      <p:cxnSp>
+        <p:nvCxnSpPr>
+          <p:cNvPr id="44" name="Straight Connector 43">
+            <a:extLst>
+              <a:ext uri="{FF2B5EF4-FFF2-40B4-BE49-F238E27FC236}">
+                <a16:creationId xmlns:a16="http://schemas.microsoft.com/office/drawing/2014/main" id="{05255867-4B44-6B24-649F-907D8F6B02CC}"/>
+              </a:ext>
+            </a:extLst>
+          </p:cNvPr>
+          <p:cNvCxnSpPr>
+            <a:cxnSpLocks/>
+          </p:cNvCxnSpPr>
+          <p:nvPr/>
+        </p:nvCxnSpPr>
+        <p:spPr>
+          <a:xfrm flipV="1">
+            <a:off x="11724426" y="2448631"/>
+            <a:ext cx="0" cy="444963"/>
+          </a:xfrm>
+          <a:prstGeom prst="line">
+            <a:avLst/>
+          </a:prstGeom>
+          <a:ln>
+            <a:prstDash val="dash"/>
+          </a:ln>
+        </p:spPr>
+        <p:style>
+          <a:lnRef idx="1">
+            <a:schemeClr val="dk1"/>
+          </a:lnRef>
+          <a:fillRef idx="0">
+            <a:schemeClr val="dk1"/>
+          </a:fillRef>
+          <a:effectRef idx="0">
+            <a:schemeClr val="dk1"/>
+          </a:effectRef>
+          <a:fontRef idx="minor">
+            <a:schemeClr val="tx1"/>
+          </a:fontRef>
+        </p:style>
+      </p:cxnSp>
+      <p:cxnSp>
+        <p:nvCxnSpPr>
+          <p:cNvPr id="47" name="Straight Connector 46">
+            <a:extLst>
+              <a:ext uri="{FF2B5EF4-FFF2-40B4-BE49-F238E27FC236}">
+                <a16:creationId xmlns:a16="http://schemas.microsoft.com/office/drawing/2014/main" id="{7CFEEC72-67A7-CC58-4625-054D5D78049A}"/>
+              </a:ext>
+            </a:extLst>
+          </p:cNvPr>
+          <p:cNvCxnSpPr>
+            <a:cxnSpLocks/>
+          </p:cNvCxnSpPr>
+          <p:nvPr/>
+        </p:nvCxnSpPr>
+        <p:spPr>
+          <a:xfrm flipV="1">
+            <a:off x="11466501" y="2448631"/>
+            <a:ext cx="0" cy="603872"/>
+          </a:xfrm>
+          <a:prstGeom prst="line">
+            <a:avLst/>
+          </a:prstGeom>
+          <a:ln>
+            <a:prstDash val="dash"/>
+          </a:ln>
+        </p:spPr>
+        <p:style>
+          <a:lnRef idx="1">
+            <a:schemeClr val="dk1"/>
+          </a:lnRef>
+          <a:fillRef idx="0">
+            <a:schemeClr val="dk1"/>
+          </a:fillRef>
+          <a:effectRef idx="0">
+            <a:schemeClr val="dk1"/>
+          </a:effectRef>
+          <a:fontRef idx="minor">
+            <a:schemeClr val="tx1"/>
+          </a:fontRef>
+        </p:style>
+      </p:cxnSp>
+      <p:sp>
+        <p:nvSpPr>
+          <p:cNvPr id="49" name="TextBox 48">
+            <a:extLst>
+              <a:ext uri="{FF2B5EF4-FFF2-40B4-BE49-F238E27FC236}">
+                <a16:creationId xmlns:a16="http://schemas.microsoft.com/office/drawing/2014/main" id="{A396B548-03A9-AED0-C467-7C83E5699591}"/>
+              </a:ext>
+            </a:extLst>
+          </p:cNvPr>
+          <p:cNvSpPr txBox="1"/>
+          <p:nvPr/>
+        </p:nvSpPr>
+        <p:spPr>
+          <a:xfrm>
+            <a:off x="12034535" y="2901345"/>
+            <a:ext cx="423093" cy="199114"/>
+          </a:xfrm>
+          <a:prstGeom prst="rect">
+            <a:avLst/>
+          </a:prstGeom>
+          <a:noFill/>
+        </p:spPr>
+        <p:txBody>
+          <a:bodyPr wrap="square">
+            <a:spAutoFit/>
+          </a:bodyPr>
+          <a:lstStyle/>
+          <a:p>
+            <a:pPr algn="ctr"/>
+            <a:r>
+              <a:rPr lang="en-US" sz="656" dirty="0">
+                <a:latin typeface="Aptos Display" panose="020B0004020202020204" pitchFamily="34" charset="0"/>
+              </a:rPr>
+              <a:t>0.187</a:t>
+            </a:r>
+            <a:endParaRPr lang="en-PH" sz="656" dirty="0"/>
+          </a:p>
+        </p:txBody>
+      </p:sp>
+      <p:sp>
+        <p:nvSpPr>
+          <p:cNvPr id="50" name="TextBox 49">
+            <a:extLst>
+              <a:ext uri="{FF2B5EF4-FFF2-40B4-BE49-F238E27FC236}">
+                <a16:creationId xmlns:a16="http://schemas.microsoft.com/office/drawing/2014/main" id="{CBBDDA32-2423-77BF-2B06-ADFC68A843CD}"/>
+              </a:ext>
+            </a:extLst>
+          </p:cNvPr>
+          <p:cNvSpPr txBox="1"/>
+          <p:nvPr/>
+        </p:nvSpPr>
+        <p:spPr>
+          <a:xfrm>
+            <a:off x="11501241" y="2901345"/>
+            <a:ext cx="433326" cy="199114"/>
+          </a:xfrm>
+          <a:prstGeom prst="rect">
+            <a:avLst/>
+          </a:prstGeom>
+          <a:noFill/>
+        </p:spPr>
+        <p:txBody>
+          <a:bodyPr wrap="square">
+            <a:spAutoFit/>
+          </a:bodyPr>
+          <a:lstStyle/>
+          <a:p>
+            <a:pPr algn="ctr"/>
+            <a:r>
+              <a:rPr lang="en-US" sz="656" dirty="0">
+                <a:latin typeface="Aptos Display" panose="020B0004020202020204" pitchFamily="34" charset="0"/>
+              </a:rPr>
+              <a:t>-0.187</a:t>
+            </a:r>
+            <a:endParaRPr lang="en-PH" sz="656" dirty="0"/>
+          </a:p>
+        </p:txBody>
+      </p:sp>
+      <p:sp>
+        <p:nvSpPr>
+          <p:cNvPr id="56" name="TextBox 55">
+            <a:extLst>
+              <a:ext uri="{FF2B5EF4-FFF2-40B4-BE49-F238E27FC236}">
+                <a16:creationId xmlns:a16="http://schemas.microsoft.com/office/drawing/2014/main" id="{4EE34123-67B5-2B20-3C64-58CE982316DA}"/>
+              </a:ext>
+            </a:extLst>
+          </p:cNvPr>
+          <p:cNvSpPr txBox="1"/>
+          <p:nvPr/>
+        </p:nvSpPr>
+        <p:spPr>
+          <a:xfrm>
+            <a:off x="12316674" y="3054225"/>
+            <a:ext cx="455773" cy="193258"/>
+          </a:xfrm>
+          <a:prstGeom prst="rect">
+            <a:avLst/>
+          </a:prstGeom>
+          <a:noFill/>
+        </p:spPr>
+        <p:txBody>
+          <a:bodyPr wrap="square">
+            <a:spAutoFit/>
+          </a:bodyPr>
+          <a:lstStyle/>
+          <a:p>
+            <a:pPr algn="ctr"/>
+            <a:r>
+              <a:rPr lang="en-US" sz="656" dirty="0">
+                <a:solidFill>
+                  <a:srgbClr val="00B0F0"/>
+                </a:solidFill>
+                <a:latin typeface="Aptos Display" panose="020B0004020202020204" pitchFamily="34" charset="0"/>
+              </a:rPr>
+              <a:t>0.374</a:t>
+            </a:r>
+            <a:endParaRPr lang="en-PH" sz="656" dirty="0">
+              <a:solidFill>
+                <a:srgbClr val="00B0F0"/>
+              </a:solidFill>
+            </a:endParaRPr>
+          </a:p>
+        </p:txBody>
+      </p:sp>
+      <p:sp>
+        <p:nvSpPr>
+          <p:cNvPr id="57" name="TextBox 56">
+            <a:extLst>
+              <a:ext uri="{FF2B5EF4-FFF2-40B4-BE49-F238E27FC236}">
+                <a16:creationId xmlns:a16="http://schemas.microsoft.com/office/drawing/2014/main" id="{27122AF0-744E-724B-86D1-D036841C29B0}"/>
+              </a:ext>
+            </a:extLst>
+          </p:cNvPr>
+          <p:cNvSpPr txBox="1"/>
+          <p:nvPr/>
+        </p:nvSpPr>
+        <p:spPr>
+          <a:xfrm>
+            <a:off x="11287925" y="3054226"/>
+            <a:ext cx="422009" cy="193258"/>
+          </a:xfrm>
+          <a:prstGeom prst="rect">
+            <a:avLst/>
+          </a:prstGeom>
+          <a:noFill/>
+        </p:spPr>
+        <p:txBody>
+          <a:bodyPr wrap="square">
+            <a:spAutoFit/>
+          </a:bodyPr>
+          <a:lstStyle/>
+          <a:p>
+            <a:pPr algn="ctr"/>
+            <a:r>
+              <a:rPr lang="en-US" sz="656" dirty="0">
+                <a:latin typeface="Aptos Display" panose="020B0004020202020204" pitchFamily="34" charset="0"/>
+              </a:rPr>
+              <a:t>-0.374</a:t>
+            </a:r>
+            <a:endParaRPr lang="en-PH" sz="656" dirty="0"/>
+          </a:p>
+        </p:txBody>
+      </p:sp>
+      <p:sp>
+        <p:nvSpPr>
+          <p:cNvPr id="58" name="TextBox 57">
+            <a:extLst>
+              <a:ext uri="{FF2B5EF4-FFF2-40B4-BE49-F238E27FC236}">
+                <a16:creationId xmlns:a16="http://schemas.microsoft.com/office/drawing/2014/main" id="{FF6F18D1-3A22-890A-2B3F-19ECBDA9CCB0}"/>
+              </a:ext>
+            </a:extLst>
+          </p:cNvPr>
+          <p:cNvSpPr txBox="1"/>
+          <p:nvPr/>
+        </p:nvSpPr>
+        <p:spPr>
+          <a:xfrm>
+            <a:off x="12789613" y="2543563"/>
+            <a:ext cx="598616" cy="407081"/>
+          </a:xfrm>
+          <a:prstGeom prst="rect">
+            <a:avLst/>
+          </a:prstGeom>
+          <a:noFill/>
+        </p:spPr>
+        <p:txBody>
+          <a:bodyPr wrap="square">
+            <a:spAutoFit/>
+          </a:bodyPr>
+          <a:lstStyle/>
+          <a:p>
+            <a:r>
+              <a:rPr lang="en-US" sz="656" dirty="0">
+                <a:latin typeface="Aptos Display" panose="020B0004020202020204" pitchFamily="34" charset="0"/>
+              </a:rPr>
+              <a:t>The attaching </a:t>
+            </a:r>
+          </a:p>
+          <a:p>
+            <a:r>
+              <a:rPr lang="en-US" sz="656" dirty="0">
+                <a:latin typeface="Aptos Display" panose="020B0004020202020204" pitchFamily="34" charset="0"/>
+              </a:rPr>
+              <a:t>bracket. </a:t>
+            </a:r>
+            <a:endParaRPr lang="en-PH" sz="656" dirty="0"/>
+          </a:p>
+        </p:txBody>
+      </p:sp>
+      <p:sp>
+        <p:nvSpPr>
+          <p:cNvPr id="60" name="TextBox 59">
+            <a:extLst>
+              <a:ext uri="{FF2B5EF4-FFF2-40B4-BE49-F238E27FC236}">
+                <a16:creationId xmlns:a16="http://schemas.microsoft.com/office/drawing/2014/main" id="{19A0536D-05D2-02CD-5C62-D4FB197E9199}"/>
+              </a:ext>
+            </a:extLst>
+          </p:cNvPr>
+          <p:cNvSpPr txBox="1"/>
+          <p:nvPr/>
+        </p:nvSpPr>
+        <p:spPr>
+          <a:xfrm>
+            <a:off x="11737647" y="2014527"/>
+            <a:ext cx="671902" cy="303098"/>
+          </a:xfrm>
+          <a:prstGeom prst="rect">
+            <a:avLst/>
+          </a:prstGeom>
+          <a:noFill/>
+        </p:spPr>
+        <p:txBody>
+          <a:bodyPr wrap="square">
+            <a:spAutoFit/>
+          </a:bodyPr>
+          <a:lstStyle/>
+          <a:p>
+            <a:r>
+              <a:rPr lang="en-US" sz="656" dirty="0">
+                <a:solidFill>
+                  <a:srgbClr val="00B0F0"/>
+                </a:solidFill>
+                <a:latin typeface="Aptos Display" panose="020B0004020202020204" pitchFamily="34" charset="0"/>
+              </a:rPr>
+              <a:t>The current </a:t>
+            </a:r>
+          </a:p>
+          <a:p>
+            <a:r>
+              <a:rPr lang="en-US" sz="656" dirty="0">
+                <a:solidFill>
+                  <a:srgbClr val="00B0F0"/>
+                </a:solidFill>
+                <a:latin typeface="Aptos Display" panose="020B0004020202020204" pitchFamily="34" charset="0"/>
+              </a:rPr>
+              <a:t>bracket. </a:t>
+            </a:r>
+            <a:endParaRPr lang="en-PH" sz="656" dirty="0">
+              <a:solidFill>
+                <a:srgbClr val="00B0F0"/>
+              </a:solidFill>
+            </a:endParaRPr>
+          </a:p>
+        </p:txBody>
+      </p:sp>
+      <p:sp>
+        <p:nvSpPr>
+          <p:cNvPr id="61" name="TextBox 60">
+            <a:extLst>
+              <a:ext uri="{FF2B5EF4-FFF2-40B4-BE49-F238E27FC236}">
+                <a16:creationId xmlns:a16="http://schemas.microsoft.com/office/drawing/2014/main" id="{4F3631B0-4D80-A700-BA36-351612C86BA7}"/>
+              </a:ext>
+            </a:extLst>
+          </p:cNvPr>
+          <p:cNvSpPr txBox="1"/>
+          <p:nvPr/>
+        </p:nvSpPr>
+        <p:spPr>
+          <a:xfrm>
+            <a:off x="9496260" y="1685541"/>
+            <a:ext cx="1585733" cy="407081"/>
+          </a:xfrm>
+          <a:prstGeom prst="rect">
+            <a:avLst/>
+          </a:prstGeom>
+          <a:noFill/>
+        </p:spPr>
+        <p:txBody>
+          <a:bodyPr wrap="square">
+            <a:spAutoFit/>
+          </a:bodyPr>
+          <a:lstStyle/>
+          <a:p>
+            <a:r>
+              <a:rPr lang="en-US" sz="656" dirty="0">
+                <a:latin typeface="Aptos Display" panose="020B0004020202020204" pitchFamily="34" charset="0"/>
+              </a:rPr>
+              <a:t>The attaching bracket will have its slots be detected by the current bracket. Passing its locations to be computed.</a:t>
+            </a:r>
+            <a:endParaRPr lang="en-PH" sz="656" dirty="0"/>
+          </a:p>
+        </p:txBody>
+      </p:sp>
+      <p:sp>
+        <p:nvSpPr>
+          <p:cNvPr id="70" name="TextBox 69">
+            <a:extLst>
+              <a:ext uri="{FF2B5EF4-FFF2-40B4-BE49-F238E27FC236}">
+                <a16:creationId xmlns:a16="http://schemas.microsoft.com/office/drawing/2014/main" id="{AD8883E2-8478-F428-955D-AEDE11B974A3}"/>
+              </a:ext>
+            </a:extLst>
+          </p:cNvPr>
+          <p:cNvSpPr txBox="1"/>
+          <p:nvPr/>
+        </p:nvSpPr>
+        <p:spPr>
+          <a:xfrm>
+            <a:off x="9496260" y="2075866"/>
+            <a:ext cx="1585736" cy="303098"/>
+          </a:xfrm>
+          <a:prstGeom prst="rect">
+            <a:avLst/>
+          </a:prstGeom>
+          <a:noFill/>
+        </p:spPr>
+        <p:txBody>
+          <a:bodyPr wrap="square">
+            <a:spAutoFit/>
+          </a:bodyPr>
+          <a:lstStyle/>
+          <a:p>
+            <a:r>
+              <a:rPr lang="en-US" sz="656" dirty="0">
+                <a:solidFill>
+                  <a:srgbClr val="00B0F0"/>
+                </a:solidFill>
+                <a:latin typeface="Aptos Display" panose="020B0004020202020204" pitchFamily="34" charset="0"/>
+              </a:rPr>
+              <a:t>Using a simple subtraction formula, the attaching bracket can find its offset.</a:t>
+            </a:r>
+            <a:endParaRPr lang="en-PH" sz="656" dirty="0">
+              <a:solidFill>
+                <a:srgbClr val="00B0F0"/>
+              </a:solidFill>
+            </a:endParaRPr>
+          </a:p>
+        </p:txBody>
+      </p:sp>
+      <mc:AlternateContent xmlns:mc="http://schemas.openxmlformats.org/markup-compatibility/2006">
+        <mc:Choice xmlns:a14="http://schemas.microsoft.com/office/drawing/2010/main" Requires="a14">
+          <p:sp>
+            <p:nvSpPr>
+              <p:cNvPr id="72" name="TextBox 71">
+                <a:extLst>
+                  <a:ext uri="{FF2B5EF4-FFF2-40B4-BE49-F238E27FC236}">
+                    <a16:creationId xmlns:a16="http://schemas.microsoft.com/office/drawing/2014/main" id="{4F2E96D6-70A3-561C-56FB-FF492A657F3E}"/>
+                  </a:ext>
+                </a:extLst>
+              </p:cNvPr>
+              <p:cNvSpPr txBox="1"/>
+              <p:nvPr/>
+            </p:nvSpPr>
+            <p:spPr>
+              <a:xfrm>
+                <a:off x="9479339" y="2496813"/>
+                <a:ext cx="1345370" cy="199114"/>
+              </a:xfrm>
+              <a:prstGeom prst="rect">
+                <a:avLst/>
+              </a:prstGeom>
+              <a:noFill/>
+            </p:spPr>
+            <p:txBody>
+              <a:bodyPr wrap="square">
+                <a:spAutoFit/>
+              </a:bodyPr>
+              <a:lstStyle/>
+              <a:p>
+                <a:pPr/>
+                <a14:m>
+                  <m:oMathPara xmlns:m="http://schemas.openxmlformats.org/officeDocument/2006/math">
+                    <m:oMathParaPr>
+                      <m:jc m:val="centerGroup"/>
+                    </m:oMathParaPr>
+                    <m:oMath xmlns:m="http://schemas.openxmlformats.org/officeDocument/2006/math">
+                      <m:r>
+                        <a:rPr lang="en-US" sz="656" i="1" dirty="0">
+                          <a:solidFill>
+                            <a:srgbClr val="00B0F0"/>
+                          </a:solidFill>
+                          <a:latin typeface="Cambria Math" panose="02040503050406030204" pitchFamily="18" charset="0"/>
+                        </a:rPr>
+                        <m:t>𝑜𝑓𝑓𝑠𝑒𝑡</m:t>
+                      </m:r>
+                      <m:r>
+                        <a:rPr lang="en-US" sz="656" i="1" dirty="0">
+                          <a:solidFill>
+                            <a:srgbClr val="00B0F0"/>
+                          </a:solidFill>
+                          <a:latin typeface="Cambria Math" panose="02040503050406030204" pitchFamily="18" charset="0"/>
+                        </a:rPr>
+                        <m:t> =</m:t>
+                      </m:r>
+                      <m:r>
+                        <a:rPr lang="en-US" sz="656" i="1" dirty="0">
+                          <a:solidFill>
+                            <a:srgbClr val="00B0F0"/>
+                          </a:solidFill>
+                          <a:latin typeface="Cambria Math" panose="02040503050406030204" pitchFamily="18" charset="0"/>
+                        </a:rPr>
+                        <m:t>𝑎𝑆𝑙𝑜𝑡</m:t>
+                      </m:r>
+                      <m:r>
+                        <a:rPr lang="en-US" sz="656" i="1" dirty="0">
+                          <a:solidFill>
+                            <a:srgbClr val="00B0F0"/>
+                          </a:solidFill>
+                          <a:latin typeface="Cambria Math" panose="02040503050406030204" pitchFamily="18" charset="0"/>
+                        </a:rPr>
+                        <m:t> −</m:t>
+                      </m:r>
+                      <m:r>
+                        <a:rPr lang="en-US" sz="656" i="1" dirty="0">
+                          <a:solidFill>
+                            <a:srgbClr val="00B0F0"/>
+                          </a:solidFill>
+                          <a:latin typeface="Cambria Math" panose="02040503050406030204" pitchFamily="18" charset="0"/>
+                        </a:rPr>
+                        <m:t>𝑐𝑆𝑙𝑜𝑡</m:t>
+                      </m:r>
+                      <m:r>
+                        <a:rPr lang="en-US" sz="656" i="1" dirty="0">
+                          <a:solidFill>
+                            <a:srgbClr val="00B0F0"/>
+                          </a:solidFill>
+                          <a:latin typeface="Cambria Math" panose="02040503050406030204" pitchFamily="18" charset="0"/>
+                        </a:rPr>
+                        <m:t>[</m:t>
+                      </m:r>
+                      <m:r>
+                        <a:rPr lang="en-US" sz="656" i="1" dirty="0">
+                          <a:solidFill>
+                            <a:srgbClr val="00B0F0"/>
+                          </a:solidFill>
+                          <a:latin typeface="Cambria Math" panose="02040503050406030204" pitchFamily="18" charset="0"/>
+                        </a:rPr>
+                        <m:t>𝐼𝑑𝑥</m:t>
+                      </m:r>
+                      <m:r>
+                        <a:rPr lang="en-US" sz="656" i="1" dirty="0">
+                          <a:solidFill>
+                            <a:srgbClr val="00B0F0"/>
+                          </a:solidFill>
+                          <a:latin typeface="Cambria Math" panose="02040503050406030204" pitchFamily="18" charset="0"/>
+                        </a:rPr>
+                        <m:t>]</m:t>
+                      </m:r>
+                    </m:oMath>
+                  </m:oMathPara>
+                </a14:m>
+                <a:endParaRPr lang="en-PH" sz="656" i="1" dirty="0">
+                  <a:solidFill>
+                    <a:srgbClr val="00B0F0"/>
+                  </a:solidFill>
+                </a:endParaRPr>
+              </a:p>
+            </p:txBody>
+          </p:sp>
+        </mc:Choice>
+        <mc:Fallback>
+          <p:sp>
+            <p:nvSpPr>
+              <p:cNvPr id="72" name="TextBox 71">
+                <a:extLst>
+                  <a:ext uri="{FF2B5EF4-FFF2-40B4-BE49-F238E27FC236}">
+                    <a16:creationId xmlns:a16="http://schemas.microsoft.com/office/drawing/2014/main" id="{4F2E96D6-70A3-561C-56FB-FF492A657F3E}"/>
+                  </a:ext>
+                </a:extLst>
+              </p:cNvPr>
+              <p:cNvSpPr txBox="1">
+                <a:spLocks noRot="1" noChangeAspect="1" noMove="1" noResize="1" noEditPoints="1" noAdjustHandles="1" noChangeArrowheads="1" noChangeShapeType="1" noTextEdit="1"/>
+              </p:cNvSpPr>
+              <p:nvPr/>
+            </p:nvSpPr>
+            <p:spPr>
+              <a:xfrm>
+                <a:off x="9479339" y="2496813"/>
+                <a:ext cx="1345370" cy="199114"/>
+              </a:xfrm>
+              <a:prstGeom prst="rect">
+                <a:avLst/>
+              </a:prstGeom>
+              <a:blipFill>
+                <a:blip r:embed="rId2"/>
+                <a:stretch>
+                  <a:fillRect/>
+                </a:stretch>
+              </a:blipFill>
+            </p:spPr>
+            <p:txBody>
+              <a:bodyPr/>
+              <a:lstStyle/>
+              <a:p>
+                <a:r>
+                  <a:rPr lang="en-US">
+                    <a:noFill/>
+                  </a:rPr>
+                  <a:t> </a:t>
+                </a:r>
+              </a:p>
+            </p:txBody>
+          </p:sp>
+        </mc:Fallback>
+      </mc:AlternateContent>
+      <p:sp>
+        <p:nvSpPr>
+          <p:cNvPr id="73" name="Rectangle 72">
+            <a:extLst>
+              <a:ext uri="{FF2B5EF4-FFF2-40B4-BE49-F238E27FC236}">
+                <a16:creationId xmlns:a16="http://schemas.microsoft.com/office/drawing/2014/main" id="{F6C864F5-3492-283A-3F0E-DE983DD4F3F5}"/>
+              </a:ext>
+            </a:extLst>
+          </p:cNvPr>
+          <p:cNvSpPr/>
+          <p:nvPr/>
+        </p:nvSpPr>
+        <p:spPr>
+          <a:xfrm>
+            <a:off x="9231409" y="1868618"/>
+            <a:ext cx="1496459" cy="199113"/>
+          </a:xfrm>
+          <a:prstGeom prst="rect">
+            <a:avLst/>
+          </a:prstGeom>
+          <a:noFill/>
+          <a:ln>
+            <a:solidFill>
+              <a:srgbClr val="00B0F0"/>
+            </a:solidFill>
+            <a:prstDash val="dash"/>
+          </a:ln>
+        </p:spPr>
+        <p:style>
+          <a:lnRef idx="2">
+            <a:schemeClr val="accent1">
+              <a:shade val="15000"/>
+            </a:schemeClr>
+          </a:lnRef>
+          <a:fillRef idx="1">
+            <a:schemeClr val="accent1"/>
+          </a:fillRef>
+          <a:effectRef idx="0">
+            <a:schemeClr val="accent1"/>
+          </a:effectRef>
+          <a:fontRef idx="minor">
+            <a:schemeClr val="lt1"/>
+          </a:fontRef>
+        </p:style>
+        <p:txBody>
+          <a:bodyPr rtlCol="0" anchor="ctr"/>
+          <a:lstStyle/>
+          <a:p>
+            <a:pPr algn="ctr"/>
+            <a:endParaRPr lang="en-PH" sz="1311"/>
+          </a:p>
+        </p:txBody>
+      </p:sp>
+      <mc:AlternateContent xmlns:mc="http://schemas.openxmlformats.org/markup-compatibility/2006">
+        <mc:Choice xmlns:a14="http://schemas.microsoft.com/office/drawing/2010/main" Requires="a14">
+          <p:sp>
+            <p:nvSpPr>
+              <p:cNvPr id="227" name="TextBox 226">
+                <a:extLst>
+                  <a:ext uri="{FF2B5EF4-FFF2-40B4-BE49-F238E27FC236}">
+                    <a16:creationId xmlns:a16="http://schemas.microsoft.com/office/drawing/2014/main" id="{63E20871-F740-32FA-D0A0-CB5DDBA1A15B}"/>
+                  </a:ext>
+                </a:extLst>
+              </p:cNvPr>
+              <p:cNvSpPr txBox="1"/>
+              <p:nvPr/>
+            </p:nvSpPr>
+            <p:spPr>
+              <a:xfrm>
+                <a:off x="9370058" y="2813776"/>
+                <a:ext cx="1585733" cy="823014"/>
+              </a:xfrm>
+              <a:prstGeom prst="rect">
+                <a:avLst/>
+              </a:prstGeom>
+              <a:noFill/>
+            </p:spPr>
+            <p:txBody>
+              <a:bodyPr wrap="square">
+                <a:spAutoFit/>
+              </a:bodyPr>
+              <a:lstStyle/>
+              <a:p>
+                <a14:m>
+                  <m:oMath xmlns:m="http://schemas.openxmlformats.org/officeDocument/2006/math">
+                    <m:r>
+                      <a:rPr lang="en-US" sz="656" i="1" dirty="0">
+                        <a:solidFill>
+                          <a:srgbClr val="00B0F0"/>
+                        </a:solidFill>
+                        <a:latin typeface="Cambria Math" panose="02040503050406030204" pitchFamily="18" charset="0"/>
+                      </a:rPr>
+                      <m:t>𝑎𝑆𝑙𝑜𝑡</m:t>
+                    </m:r>
+                    <m:r>
+                      <a:rPr lang="en-US" sz="656" i="1" dirty="0">
+                        <a:solidFill>
+                          <a:srgbClr val="00B0F0"/>
+                        </a:solidFill>
+                        <a:latin typeface="Cambria Math" panose="02040503050406030204" pitchFamily="18" charset="0"/>
+                      </a:rPr>
+                      <m:t> </m:t>
+                    </m:r>
+                  </m:oMath>
+                </a14:m>
+                <a:r>
+                  <a:rPr lang="en-US" sz="656" dirty="0">
+                    <a:latin typeface="Aptos Display" panose="020B0004020202020204" pitchFamily="34" charset="0"/>
+                  </a:rPr>
+                  <a:t>is the attaching bracket’s first slot that detected the current bracket </a:t>
+                </a:r>
+                <a14:m>
+                  <m:oMath xmlns:m="http://schemas.openxmlformats.org/officeDocument/2006/math">
+                    <m:r>
+                      <a:rPr lang="en-US" sz="656" i="1" dirty="0">
+                        <a:solidFill>
+                          <a:srgbClr val="00B0F0"/>
+                        </a:solidFill>
+                        <a:latin typeface="Cambria Math" panose="02040503050406030204" pitchFamily="18" charset="0"/>
+                      </a:rPr>
+                      <m:t>𝑐𝑆𝑙𝑜𝑡</m:t>
+                    </m:r>
+                  </m:oMath>
+                </a14:m>
+                <a:r>
+                  <a:rPr lang="en-PH" sz="656" dirty="0"/>
+                  <a:t>.</a:t>
+                </a:r>
+              </a:p>
+              <a:p>
+                <a:endParaRPr lang="en-PH" sz="656" dirty="0"/>
+              </a:p>
+              <a:p>
+                <a14:m>
+                  <m:oMath xmlns:m="http://schemas.openxmlformats.org/officeDocument/2006/math">
+                    <m:r>
+                      <a:rPr lang="en-US" sz="656" i="1" dirty="0">
+                        <a:solidFill>
+                          <a:srgbClr val="00B0F0"/>
+                        </a:solidFill>
+                        <a:latin typeface="Cambria Math" panose="02040503050406030204" pitchFamily="18" charset="0"/>
+                      </a:rPr>
+                      <m:t>𝐼𝑑𝑥</m:t>
+                    </m:r>
+                  </m:oMath>
+                </a14:m>
+                <a:r>
+                  <a:rPr lang="en-PH" sz="656" dirty="0"/>
+                  <a:t> </a:t>
+                </a:r>
+                <a:r>
+                  <a:rPr lang="en-PH" sz="656" dirty="0">
+                    <a:latin typeface="Aptos Display" panose="020B0004020202020204" pitchFamily="34" charset="0"/>
+                  </a:rPr>
+                  <a:t>is the current bracket’s slots that detected </a:t>
+                </a:r>
+                <a14:m>
+                  <m:oMath xmlns:m="http://schemas.openxmlformats.org/officeDocument/2006/math">
+                    <m:r>
+                      <a:rPr lang="en-US" sz="656" i="1" dirty="0">
+                        <a:solidFill>
+                          <a:srgbClr val="00B0F0"/>
+                        </a:solidFill>
+                        <a:latin typeface="Cambria Math" panose="02040503050406030204" pitchFamily="18" charset="0"/>
+                      </a:rPr>
+                      <m:t>𝑎𝑆𝑙𝑜𝑡</m:t>
+                    </m:r>
+                  </m:oMath>
+                </a14:m>
+                <a:r>
+                  <a:rPr lang="en-PH" sz="656" dirty="0">
+                    <a:latin typeface="Aptos Display" panose="020B0004020202020204" pitchFamily="34" charset="0"/>
+                  </a:rPr>
+                  <a:t>. When multiple current bracket slots have detection, it will take note the 1</a:t>
+                </a:r>
+                <a:r>
+                  <a:rPr lang="en-PH" sz="656" baseline="30000" dirty="0">
+                    <a:latin typeface="Aptos Display" panose="020B0004020202020204" pitchFamily="34" charset="0"/>
+                  </a:rPr>
+                  <a:t>st</a:t>
+                </a:r>
+                <a:r>
+                  <a:rPr lang="en-PH" sz="656" dirty="0">
+                    <a:latin typeface="Aptos Display" panose="020B0004020202020204" pitchFamily="34" charset="0"/>
+                  </a:rPr>
+                  <a:t> one.</a:t>
+                </a:r>
+              </a:p>
+            </p:txBody>
+          </p:sp>
+        </mc:Choice>
+        <mc:Fallback>
+          <p:sp>
+            <p:nvSpPr>
+              <p:cNvPr id="227" name="TextBox 226">
+                <a:extLst>
+                  <a:ext uri="{FF2B5EF4-FFF2-40B4-BE49-F238E27FC236}">
+                    <a16:creationId xmlns:a16="http://schemas.microsoft.com/office/drawing/2014/main" id="{63E20871-F740-32FA-D0A0-CB5DDBA1A15B}"/>
+                  </a:ext>
+                </a:extLst>
+              </p:cNvPr>
+              <p:cNvSpPr txBox="1">
+                <a:spLocks noRot="1" noChangeAspect="1" noMove="1" noResize="1" noEditPoints="1" noAdjustHandles="1" noChangeArrowheads="1" noChangeShapeType="1" noTextEdit="1"/>
+              </p:cNvSpPr>
+              <p:nvPr/>
+            </p:nvSpPr>
+            <p:spPr>
+              <a:xfrm>
+                <a:off x="9370058" y="2813776"/>
+                <a:ext cx="1585733" cy="823014"/>
+              </a:xfrm>
+              <a:prstGeom prst="rect">
+                <a:avLst/>
+              </a:prstGeom>
+              <a:blipFill>
+                <a:blip r:embed="rId3"/>
+                <a:stretch>
+                  <a:fillRect/>
+                </a:stretch>
+              </a:blipFill>
+            </p:spPr>
+            <p:txBody>
+              <a:bodyPr/>
+              <a:lstStyle/>
+              <a:p>
+                <a:r>
+                  <a:rPr lang="en-US">
+                    <a:noFill/>
+                  </a:rPr>
+                  <a:t> </a:t>
+                </a:r>
+              </a:p>
+            </p:txBody>
+          </p:sp>
+        </mc:Fallback>
+      </mc:AlternateContent>
+      <p:sp>
+        <p:nvSpPr>
+          <p:cNvPr id="229" name="TextBox 228">
+            <a:extLst>
+              <a:ext uri="{FF2B5EF4-FFF2-40B4-BE49-F238E27FC236}">
+                <a16:creationId xmlns:a16="http://schemas.microsoft.com/office/drawing/2014/main" id="{8E561398-CAF7-1CB8-5016-EB1CAAB1CFF8}"/>
+              </a:ext>
+            </a:extLst>
+          </p:cNvPr>
+          <p:cNvSpPr txBox="1"/>
+          <p:nvPr/>
+        </p:nvSpPr>
+        <p:spPr>
+          <a:xfrm>
+            <a:off x="11240178" y="3250856"/>
+            <a:ext cx="2085318" cy="303098"/>
+          </a:xfrm>
+          <a:prstGeom prst="rect">
+            <a:avLst/>
+          </a:prstGeom>
+          <a:noFill/>
+        </p:spPr>
+        <p:txBody>
+          <a:bodyPr wrap="square">
+            <a:spAutoFit/>
+          </a:bodyPr>
+          <a:lstStyle/>
+          <a:p>
+            <a:r>
+              <a:rPr lang="en-US" sz="656" dirty="0">
+                <a:latin typeface="Aptos Display" panose="020B0004020202020204" pitchFamily="34" charset="0"/>
+              </a:rPr>
+              <a:t>This applies to the Edge slot to Edge slot snapping, Partial to Partial Snapping, and Full to Partial Snapping.</a:t>
+            </a:r>
+            <a:endParaRPr lang="en-PH" sz="656" dirty="0"/>
+          </a:p>
+        </p:txBody>
+      </p:sp>
+      <p:cxnSp>
+        <p:nvCxnSpPr>
+          <p:cNvPr id="230" name="Straight Connector 229">
+            <a:extLst>
+              <a:ext uri="{FF2B5EF4-FFF2-40B4-BE49-F238E27FC236}">
+                <a16:creationId xmlns:a16="http://schemas.microsoft.com/office/drawing/2014/main" id="{6AC5D9C6-5150-7060-96CD-9F5364E88656}"/>
+              </a:ext>
+            </a:extLst>
+          </p:cNvPr>
+          <p:cNvCxnSpPr>
+            <a:cxnSpLocks/>
+          </p:cNvCxnSpPr>
+          <p:nvPr/>
+        </p:nvCxnSpPr>
+        <p:spPr>
+          <a:xfrm flipV="1">
+            <a:off x="12749552" y="1925925"/>
+            <a:ext cx="0" cy="420739"/>
+          </a:xfrm>
+          <a:prstGeom prst="line">
+            <a:avLst/>
+          </a:prstGeom>
+          <a:ln>
+            <a:prstDash val="dash"/>
+          </a:ln>
+        </p:spPr>
+        <p:style>
+          <a:lnRef idx="1">
+            <a:schemeClr val="dk1"/>
+          </a:lnRef>
+          <a:fillRef idx="0">
+            <a:schemeClr val="dk1"/>
+          </a:fillRef>
+          <a:effectRef idx="0">
+            <a:schemeClr val="dk1"/>
+          </a:effectRef>
+          <a:fontRef idx="minor">
+            <a:schemeClr val="tx1"/>
+          </a:fontRef>
+        </p:style>
+      </p:cxnSp>
+      <p:cxnSp>
+        <p:nvCxnSpPr>
+          <p:cNvPr id="245" name="Straight Connector 244">
+            <a:extLst>
+              <a:ext uri="{FF2B5EF4-FFF2-40B4-BE49-F238E27FC236}">
+                <a16:creationId xmlns:a16="http://schemas.microsoft.com/office/drawing/2014/main" id="{0D7377D4-37D4-176C-4AD3-5A6E271366AE}"/>
+              </a:ext>
+            </a:extLst>
+          </p:cNvPr>
+          <p:cNvCxnSpPr>
+            <a:cxnSpLocks/>
+          </p:cNvCxnSpPr>
+          <p:nvPr/>
+        </p:nvCxnSpPr>
+        <p:spPr>
+          <a:xfrm flipV="1">
+            <a:off x="13007340" y="1925925"/>
+            <a:ext cx="0" cy="420739"/>
+          </a:xfrm>
+          <a:prstGeom prst="line">
+            <a:avLst/>
+          </a:prstGeom>
+          <a:ln>
+            <a:prstDash val="dash"/>
+          </a:ln>
+        </p:spPr>
+        <p:style>
+          <a:lnRef idx="1">
+            <a:schemeClr val="dk1"/>
+          </a:lnRef>
+          <a:fillRef idx="0">
+            <a:schemeClr val="dk1"/>
+          </a:fillRef>
+          <a:effectRef idx="0">
+            <a:schemeClr val="dk1"/>
+          </a:effectRef>
+          <a:fontRef idx="minor">
+            <a:schemeClr val="tx1"/>
+          </a:fontRef>
+        </p:style>
+      </p:cxnSp>
+      <p:sp>
+        <p:nvSpPr>
+          <p:cNvPr id="252" name="TextBox 251">
+            <a:extLst>
+              <a:ext uri="{FF2B5EF4-FFF2-40B4-BE49-F238E27FC236}">
+                <a16:creationId xmlns:a16="http://schemas.microsoft.com/office/drawing/2014/main" id="{DB173515-392F-B452-369F-9EDA145577B3}"/>
+              </a:ext>
+            </a:extLst>
+          </p:cNvPr>
+          <p:cNvSpPr txBox="1"/>
+          <p:nvPr/>
+        </p:nvSpPr>
+        <p:spPr>
+          <a:xfrm>
+            <a:off x="12793275" y="1761773"/>
+            <a:ext cx="423093" cy="199114"/>
+          </a:xfrm>
+          <a:prstGeom prst="rect">
+            <a:avLst/>
+          </a:prstGeom>
+          <a:noFill/>
+        </p:spPr>
+        <p:txBody>
+          <a:bodyPr wrap="square">
+            <a:spAutoFit/>
+          </a:bodyPr>
+          <a:lstStyle/>
+          <a:p>
+            <a:pPr algn="ctr"/>
+            <a:r>
+              <a:rPr lang="en-US" sz="656" dirty="0">
+                <a:latin typeface="Aptos Display" panose="020B0004020202020204" pitchFamily="34" charset="0"/>
+              </a:rPr>
+              <a:t>0.187</a:t>
+            </a:r>
+            <a:endParaRPr lang="en-PH" sz="656" dirty="0"/>
+          </a:p>
+        </p:txBody>
+      </p:sp>
+      <p:sp>
+        <p:nvSpPr>
+          <p:cNvPr id="254" name="TextBox 253">
+            <a:extLst>
+              <a:ext uri="{FF2B5EF4-FFF2-40B4-BE49-F238E27FC236}">
+                <a16:creationId xmlns:a16="http://schemas.microsoft.com/office/drawing/2014/main" id="{45D2EAB6-EE11-2AAD-ED11-4A7B0E2BD45F}"/>
+              </a:ext>
+            </a:extLst>
+          </p:cNvPr>
+          <p:cNvSpPr txBox="1"/>
+          <p:nvPr/>
+        </p:nvSpPr>
+        <p:spPr>
+          <a:xfrm>
+            <a:off x="12540033" y="1765398"/>
+            <a:ext cx="423093" cy="199114"/>
+          </a:xfrm>
+          <a:prstGeom prst="rect">
+            <a:avLst/>
+          </a:prstGeom>
+          <a:noFill/>
+        </p:spPr>
+        <p:txBody>
+          <a:bodyPr wrap="square">
+            <a:spAutoFit/>
+          </a:bodyPr>
+          <a:lstStyle/>
+          <a:p>
+            <a:pPr algn="ctr"/>
+            <a:r>
+              <a:rPr lang="en-US" sz="656" dirty="0">
+                <a:latin typeface="Aptos Display" panose="020B0004020202020204" pitchFamily="34" charset="0"/>
+              </a:rPr>
+              <a:t>0</a:t>
+            </a:r>
+            <a:endParaRPr lang="en-PH" sz="656" dirty="0"/>
+          </a:p>
+        </p:txBody>
+      </p:sp>
+      <p:sp>
+        <p:nvSpPr>
+          <p:cNvPr id="255" name="TextBox 254">
+            <a:extLst>
+              <a:ext uri="{FF2B5EF4-FFF2-40B4-BE49-F238E27FC236}">
+                <a16:creationId xmlns:a16="http://schemas.microsoft.com/office/drawing/2014/main" id="{8FDF6C1F-5DA7-A29C-C6E8-55BF9F125DE5}"/>
+              </a:ext>
+            </a:extLst>
+          </p:cNvPr>
+          <p:cNvSpPr txBox="1"/>
+          <p:nvPr/>
+        </p:nvSpPr>
+        <p:spPr>
+          <a:xfrm>
+            <a:off x="12259555" y="1761774"/>
+            <a:ext cx="411388" cy="193258"/>
+          </a:xfrm>
+          <a:prstGeom prst="rect">
+            <a:avLst/>
+          </a:prstGeom>
+          <a:noFill/>
+        </p:spPr>
+        <p:txBody>
+          <a:bodyPr wrap="square">
+            <a:spAutoFit/>
+          </a:bodyPr>
+          <a:lstStyle/>
+          <a:p>
+            <a:pPr algn="ctr"/>
+            <a:r>
+              <a:rPr lang="en-US" sz="656" dirty="0">
+                <a:solidFill>
+                  <a:srgbClr val="00B0F0"/>
+                </a:solidFill>
+                <a:latin typeface="Aptos Display" panose="020B0004020202020204" pitchFamily="34" charset="0"/>
+              </a:rPr>
+              <a:t>-0.187</a:t>
+            </a:r>
+            <a:endParaRPr lang="en-PH" sz="656" dirty="0">
+              <a:solidFill>
+                <a:srgbClr val="00B0F0"/>
+              </a:solidFill>
+            </a:endParaRPr>
+          </a:p>
+        </p:txBody>
+      </p:sp>
+      <p:sp>
+        <p:nvSpPr>
+          <p:cNvPr id="413" name="TextBox 412">
+            <a:extLst>
+              <a:ext uri="{FF2B5EF4-FFF2-40B4-BE49-F238E27FC236}">
+                <a16:creationId xmlns:a16="http://schemas.microsoft.com/office/drawing/2014/main" id="{837A0866-594B-DECA-99FB-2843DF8ABF20}"/>
+              </a:ext>
+            </a:extLst>
+          </p:cNvPr>
+          <p:cNvSpPr txBox="1"/>
+          <p:nvPr/>
+        </p:nvSpPr>
+        <p:spPr>
+          <a:xfrm>
+            <a:off x="128791" y="5340447"/>
+            <a:ext cx="2221560" cy="304090"/>
+          </a:xfrm>
+          <a:prstGeom prst="rect">
+            <a:avLst/>
+          </a:prstGeom>
+          <a:noFill/>
+        </p:spPr>
+        <p:txBody>
+          <a:bodyPr wrap="square">
+            <a:spAutoFit/>
+          </a:bodyPr>
+          <a:lstStyle/>
+          <a:p>
+            <a:r>
+              <a:rPr lang="en-PH" sz="1311" b="1" dirty="0">
+                <a:solidFill>
+                  <a:srgbClr val="00B0F0"/>
+                </a:solidFill>
+                <a:latin typeface="Aptos Display" panose="020B0004020202020204" pitchFamily="34" charset="0"/>
+                <a:ea typeface="Lexend" pitchFamily="2" charset="0"/>
+                <a:cs typeface="Lexend" pitchFamily="2" charset="0"/>
+              </a:rPr>
+              <a:t>NOTES</a:t>
+            </a:r>
+            <a:endParaRPr lang="en-PH" sz="1311" b="1" dirty="0">
+              <a:solidFill>
+                <a:srgbClr val="00B0F0"/>
+              </a:solidFill>
+            </a:endParaRPr>
+          </a:p>
+        </p:txBody>
+      </p:sp>
+      <p:cxnSp>
+        <p:nvCxnSpPr>
+          <p:cNvPr id="68" name="Straight Connector 67">
+            <a:extLst>
+              <a:ext uri="{FF2B5EF4-FFF2-40B4-BE49-F238E27FC236}">
+                <a16:creationId xmlns:a16="http://schemas.microsoft.com/office/drawing/2014/main" id="{8169A43B-96E1-2D0D-9AAE-97F28137A158}"/>
+              </a:ext>
+            </a:extLst>
+          </p:cNvPr>
+          <p:cNvCxnSpPr>
+            <a:cxnSpLocks/>
+          </p:cNvCxnSpPr>
+          <p:nvPr/>
+        </p:nvCxnSpPr>
+        <p:spPr>
+          <a:xfrm flipV="1">
+            <a:off x="11046718" y="2596370"/>
+            <a:ext cx="0" cy="1406564"/>
+          </a:xfrm>
+          <a:prstGeom prst="line">
+            <a:avLst/>
+          </a:prstGeom>
+          <a:ln>
+            <a:solidFill>
+              <a:schemeClr val="tx1"/>
+            </a:solidFill>
+            <a:prstDash val="dash"/>
+          </a:ln>
+        </p:spPr>
+        <p:style>
+          <a:lnRef idx="1">
+            <a:schemeClr val="dk1"/>
+          </a:lnRef>
+          <a:fillRef idx="0">
+            <a:schemeClr val="dk1"/>
+          </a:fillRef>
+          <a:effectRef idx="0">
+            <a:schemeClr val="dk1"/>
+          </a:effectRef>
+          <a:fontRef idx="minor">
+            <a:schemeClr val="tx1"/>
+          </a:fontRef>
+        </p:style>
+      </p:cxnSp>
+      <p:sp>
+        <p:nvSpPr>
+          <p:cNvPr id="65" name="Rectangle 64">
+            <a:extLst>
+              <a:ext uri="{FF2B5EF4-FFF2-40B4-BE49-F238E27FC236}">
+                <a16:creationId xmlns:a16="http://schemas.microsoft.com/office/drawing/2014/main" id="{8D365822-E744-9CB4-DBD1-85A07E96F70A}"/>
+              </a:ext>
+            </a:extLst>
+          </p:cNvPr>
+          <p:cNvSpPr/>
+          <p:nvPr/>
+        </p:nvSpPr>
+        <p:spPr>
+          <a:xfrm>
+            <a:off x="11172923" y="2174198"/>
+            <a:ext cx="2354218" cy="4131780"/>
+          </a:xfrm>
+          <a:prstGeom prst="rect">
+            <a:avLst/>
+          </a:prstGeom>
+          <a:noFill/>
+          <a:ln w="6350">
+            <a:solidFill>
+              <a:schemeClr val="tx1"/>
+            </a:solidFill>
+            <a:prstDash val="dash"/>
+          </a:ln>
+        </p:spPr>
+        <p:style>
+          <a:lnRef idx="2">
+            <a:schemeClr val="accent1">
+              <a:shade val="15000"/>
+            </a:schemeClr>
+          </a:lnRef>
+          <a:fillRef idx="1">
+            <a:schemeClr val="accent1"/>
+          </a:fillRef>
+          <a:effectRef idx="0">
+            <a:schemeClr val="accent1"/>
+          </a:effectRef>
+          <a:fontRef idx="minor">
+            <a:schemeClr val="lt1"/>
+          </a:fontRef>
+        </p:style>
+        <p:txBody>
+          <a:bodyPr rtlCol="0" anchor="ctr"/>
+          <a:lstStyle/>
+          <a:p>
+            <a:pPr algn="ctr"/>
+            <a:endParaRPr lang="en-PH" sz="1311"/>
+          </a:p>
+        </p:txBody>
+      </p:sp>
+      <p:sp>
+        <p:nvSpPr>
+          <p:cNvPr id="55" name="Rectangle 54">
+            <a:extLst>
+              <a:ext uri="{FF2B5EF4-FFF2-40B4-BE49-F238E27FC236}">
+                <a16:creationId xmlns:a16="http://schemas.microsoft.com/office/drawing/2014/main" id="{D6C3F91A-1033-634C-7476-7E4ED4D885CD}"/>
+              </a:ext>
+            </a:extLst>
+          </p:cNvPr>
+          <p:cNvSpPr/>
+          <p:nvPr/>
+        </p:nvSpPr>
+        <p:spPr>
+          <a:xfrm>
+            <a:off x="11248088" y="2237686"/>
+            <a:ext cx="591156" cy="337457"/>
+          </a:xfrm>
+          <a:prstGeom prst="rect">
+            <a:avLst/>
+          </a:prstGeom>
+          <a:noFill/>
+          <a:ln w="6350">
+            <a:solidFill>
+              <a:srgbClr val="00B0F0"/>
+            </a:solidFill>
+          </a:ln>
+        </p:spPr>
+        <p:style>
+          <a:lnRef idx="2">
+            <a:schemeClr val="accent1">
+              <a:shade val="15000"/>
+            </a:schemeClr>
+          </a:lnRef>
+          <a:fillRef idx="1">
+            <a:schemeClr val="accent1"/>
+          </a:fillRef>
+          <a:effectRef idx="0">
+            <a:schemeClr val="accent1"/>
+          </a:effectRef>
+          <a:fontRef idx="minor">
+            <a:schemeClr val="lt1"/>
+          </a:fontRef>
+        </p:style>
+        <p:txBody>
+          <a:bodyPr rtlCol="0" anchor="ctr"/>
+          <a:lstStyle/>
+          <a:p>
+            <a:pPr algn="ctr"/>
+            <a:r>
+              <a:rPr lang="en-US" sz="1311" dirty="0">
+                <a:solidFill>
+                  <a:srgbClr val="00B0F0"/>
+                </a:solidFill>
+                <a:latin typeface="Aptos Display" panose="020B0004020202020204" pitchFamily="34" charset="0"/>
+              </a:rPr>
+              <a:t>Steps</a:t>
+            </a:r>
+            <a:endParaRPr lang="en-PH" sz="1311" dirty="0">
+              <a:solidFill>
+                <a:srgbClr val="00B0F0"/>
+              </a:solidFill>
+              <a:latin typeface="Aptos Display" panose="020B0004020202020204" pitchFamily="34" charset="0"/>
+            </a:endParaRPr>
+          </a:p>
+        </p:txBody>
+      </p:sp>
+      <p:sp>
+        <p:nvSpPr>
+          <p:cNvPr id="59" name="Rectangle 58">
+            <a:extLst>
+              <a:ext uri="{FF2B5EF4-FFF2-40B4-BE49-F238E27FC236}">
+                <a16:creationId xmlns:a16="http://schemas.microsoft.com/office/drawing/2014/main" id="{773A65D5-D68F-298A-7FCA-A4C5807455FA}"/>
+              </a:ext>
+            </a:extLst>
+          </p:cNvPr>
+          <p:cNvSpPr/>
+          <p:nvPr/>
+        </p:nvSpPr>
+        <p:spPr>
+          <a:xfrm>
+            <a:off x="11248088" y="2638632"/>
+            <a:ext cx="2225187" cy="959166"/>
+          </a:xfrm>
+          <a:prstGeom prst="rect">
+            <a:avLst/>
+          </a:prstGeom>
+          <a:noFill/>
+          <a:ln w="6350">
+            <a:solidFill>
+              <a:schemeClr val="tx1"/>
+            </a:solidFill>
+            <a:prstDash val="dash"/>
+          </a:ln>
+        </p:spPr>
+        <p:style>
+          <a:lnRef idx="2">
+            <a:schemeClr val="accent1">
+              <a:shade val="15000"/>
+            </a:schemeClr>
+          </a:lnRef>
+          <a:fillRef idx="1">
+            <a:schemeClr val="accent1"/>
+          </a:fillRef>
+          <a:effectRef idx="0">
+            <a:schemeClr val="accent1"/>
+          </a:effectRef>
+          <a:fontRef idx="minor">
+            <a:schemeClr val="lt1"/>
+          </a:fontRef>
+        </p:style>
+        <p:txBody>
+          <a:bodyPr rtlCol="0" anchor="ctr"/>
+          <a:lstStyle/>
+          <a:p>
+            <a:pPr algn="ctr"/>
+            <a:endParaRPr lang="en-PH" sz="1311"/>
+          </a:p>
+        </p:txBody>
+      </p:sp>
+      <p:sp>
+        <p:nvSpPr>
+          <p:cNvPr id="62" name="TextBox 61">
+            <a:extLst>
+              <a:ext uri="{FF2B5EF4-FFF2-40B4-BE49-F238E27FC236}">
+                <a16:creationId xmlns:a16="http://schemas.microsoft.com/office/drawing/2014/main" id="{9B17C059-1123-697E-39E2-BD0ED5A8C730}"/>
+              </a:ext>
+            </a:extLst>
+          </p:cNvPr>
+          <p:cNvSpPr txBox="1"/>
+          <p:nvPr/>
+        </p:nvSpPr>
+        <p:spPr>
+          <a:xfrm>
+            <a:off x="11828328" y="2209164"/>
+            <a:ext cx="1644947" cy="395108"/>
+          </a:xfrm>
+          <a:prstGeom prst="rect">
+            <a:avLst/>
+          </a:prstGeom>
+          <a:noFill/>
+        </p:spPr>
+        <p:txBody>
+          <a:bodyPr wrap="square">
+            <a:spAutoFit/>
+          </a:bodyPr>
+          <a:lstStyle/>
+          <a:p>
+            <a:r>
+              <a:rPr lang="en-US" sz="656" dirty="0">
+                <a:latin typeface="Aptos Display" panose="020B0004020202020204" pitchFamily="34" charset="0"/>
+              </a:rPr>
+              <a:t>Process of achieving the rotated bracket. The process will undergo three</a:t>
+            </a:r>
+            <a:r>
+              <a:rPr lang="en-PH" sz="656" dirty="0">
+                <a:latin typeface="Aptos Display" panose="020B0004020202020204" pitchFamily="34" charset="0"/>
+              </a:rPr>
+              <a:t> steps.</a:t>
+            </a:r>
+          </a:p>
+          <a:p>
+            <a:r>
+              <a:rPr lang="en-PH" sz="656" dirty="0">
+                <a:latin typeface="Aptos Display" panose="020B0004020202020204" pitchFamily="34" charset="0"/>
+              </a:rPr>
+              <a:t>Origin | Apply rotation | Transform </a:t>
+            </a:r>
+            <a:endParaRPr lang="en-US" sz="656" dirty="0">
+              <a:latin typeface="Aptos Display" panose="020B0004020202020204" pitchFamily="34" charset="0"/>
+            </a:endParaRPr>
+          </a:p>
+        </p:txBody>
+      </p:sp>
+      <p:sp>
+        <p:nvSpPr>
+          <p:cNvPr id="63" name="Rectangle 62">
+            <a:extLst>
+              <a:ext uri="{FF2B5EF4-FFF2-40B4-BE49-F238E27FC236}">
+                <a16:creationId xmlns:a16="http://schemas.microsoft.com/office/drawing/2014/main" id="{716DB148-FDA2-9E85-00FC-93CF4E47E411}"/>
+              </a:ext>
+            </a:extLst>
+          </p:cNvPr>
+          <p:cNvSpPr/>
+          <p:nvPr/>
+        </p:nvSpPr>
+        <p:spPr>
+          <a:xfrm>
+            <a:off x="11327993" y="2701048"/>
+            <a:ext cx="591156" cy="337457"/>
+          </a:xfrm>
+          <a:prstGeom prst="rect">
+            <a:avLst/>
+          </a:prstGeom>
+          <a:noFill/>
+          <a:ln w="6350">
+            <a:solidFill>
+              <a:srgbClr val="00B0F0"/>
+            </a:solidFill>
+          </a:ln>
+        </p:spPr>
+        <p:style>
+          <a:lnRef idx="2">
+            <a:schemeClr val="accent1">
+              <a:shade val="15000"/>
+            </a:schemeClr>
+          </a:lnRef>
+          <a:fillRef idx="1">
+            <a:schemeClr val="accent1"/>
+          </a:fillRef>
+          <a:effectRef idx="0">
+            <a:schemeClr val="accent1"/>
+          </a:effectRef>
+          <a:fontRef idx="minor">
+            <a:schemeClr val="lt1"/>
+          </a:fontRef>
+        </p:style>
+        <p:txBody>
+          <a:bodyPr rtlCol="0" anchor="ctr"/>
+          <a:lstStyle/>
+          <a:p>
+            <a:pPr algn="ctr"/>
+            <a:r>
+              <a:rPr lang="en-US" sz="1311" dirty="0">
+                <a:solidFill>
+                  <a:srgbClr val="00B0F0"/>
+                </a:solidFill>
+                <a:latin typeface="Aptos Display" panose="020B0004020202020204" pitchFamily="34" charset="0"/>
+              </a:rPr>
+              <a:t>Origin</a:t>
+            </a:r>
+            <a:endParaRPr lang="en-PH" sz="1311" dirty="0">
+              <a:solidFill>
+                <a:srgbClr val="00B0F0"/>
+              </a:solidFill>
+              <a:latin typeface="Aptos Display" panose="020B0004020202020204" pitchFamily="34" charset="0"/>
+            </a:endParaRPr>
+          </a:p>
+        </p:txBody>
+      </p:sp>
+      <p:grpSp>
+        <p:nvGrpSpPr>
+          <p:cNvPr id="93" name="Group 92">
+            <a:extLst>
+              <a:ext uri="{FF2B5EF4-FFF2-40B4-BE49-F238E27FC236}">
+                <a16:creationId xmlns:a16="http://schemas.microsoft.com/office/drawing/2014/main" id="{04C311E5-908A-35A9-41DA-C648247A0EB8}"/>
+              </a:ext>
+            </a:extLst>
+          </p:cNvPr>
+          <p:cNvGrpSpPr/>
+          <p:nvPr/>
+        </p:nvGrpSpPr>
+        <p:grpSpPr>
+          <a:xfrm>
+            <a:off x="12378671" y="2672623"/>
+            <a:ext cx="871833" cy="871833"/>
+            <a:chOff x="5485235" y="714198"/>
+            <a:chExt cx="611722" cy="611722"/>
+          </a:xfrm>
+        </p:grpSpPr>
+        <p:grpSp>
+          <p:nvGrpSpPr>
+            <p:cNvPr id="80" name="Group 79">
+              <a:extLst>
+                <a:ext uri="{FF2B5EF4-FFF2-40B4-BE49-F238E27FC236}">
+                  <a16:creationId xmlns:a16="http://schemas.microsoft.com/office/drawing/2014/main" id="{8ADC7AA7-4997-DEB8-AD6C-7862C4ED1267}"/>
+                </a:ext>
+              </a:extLst>
+            </p:cNvPr>
+            <p:cNvGrpSpPr/>
+            <p:nvPr/>
+          </p:nvGrpSpPr>
+          <p:grpSpPr>
+            <a:xfrm>
+              <a:off x="5485235" y="886121"/>
+              <a:ext cx="611722" cy="267877"/>
+              <a:chOff x="442564" y="2186619"/>
+              <a:chExt cx="1934876" cy="847294"/>
+            </a:xfrm>
+          </p:grpSpPr>
+          <p:sp>
+            <p:nvSpPr>
+              <p:cNvPr id="81" name="Flowchart: Terminator 80">
+                <a:extLst>
+                  <a:ext uri="{FF2B5EF4-FFF2-40B4-BE49-F238E27FC236}">
+                    <a16:creationId xmlns:a16="http://schemas.microsoft.com/office/drawing/2014/main" id="{5328F123-6915-2357-BC2E-53E7C6AC9A74}"/>
+                  </a:ext>
+                </a:extLst>
+              </p:cNvPr>
+              <p:cNvSpPr/>
+              <p:nvPr/>
+            </p:nvSpPr>
+            <p:spPr>
+              <a:xfrm>
+                <a:off x="442564" y="2186619"/>
+                <a:ext cx="1934876" cy="847294"/>
+              </a:xfrm>
+              <a:prstGeom prst="flowChartTerminator">
+                <a:avLst/>
+              </a:prstGeom>
+              <a:noFill/>
+              <a:ln w="12700">
+                <a:solidFill>
+                  <a:schemeClr val="tx1"/>
+                </a:solidFill>
+              </a:ln>
+            </p:spPr>
+            <p:style>
+              <a:lnRef idx="2">
+                <a:schemeClr val="accent1">
+                  <a:shade val="15000"/>
+                </a:schemeClr>
+              </a:lnRef>
+              <a:fillRef idx="1">
+                <a:schemeClr val="accent1"/>
+              </a:fillRef>
+              <a:effectRef idx="0">
+                <a:schemeClr val="accent1"/>
+              </a:effectRef>
+              <a:fontRef idx="minor">
+                <a:schemeClr val="lt1"/>
+              </a:fontRef>
+            </p:style>
+            <p:txBody>
+              <a:bodyPr rtlCol="0" anchor="ctr"/>
+              <a:lstStyle/>
+              <a:p>
+                <a:pPr algn="ctr"/>
+                <a:endParaRPr lang="en-PH" sz="1311"/>
+              </a:p>
+            </p:txBody>
+          </p:sp>
+          <p:sp>
+            <p:nvSpPr>
+              <p:cNvPr id="83" name="Oval 82">
+                <a:extLst>
+                  <a:ext uri="{FF2B5EF4-FFF2-40B4-BE49-F238E27FC236}">
+                    <a16:creationId xmlns:a16="http://schemas.microsoft.com/office/drawing/2014/main" id="{0886A6A4-F44A-D7D5-5865-9169C517C318}"/>
+                  </a:ext>
+                </a:extLst>
+              </p:cNvPr>
+              <p:cNvSpPr/>
+              <p:nvPr/>
+            </p:nvSpPr>
+            <p:spPr>
+              <a:xfrm rot="10800000">
+                <a:off x="1574636" y="2317564"/>
+                <a:ext cx="585403" cy="585403"/>
+              </a:xfrm>
+              <a:prstGeom prst="ellipse">
+                <a:avLst/>
+              </a:prstGeom>
+              <a:noFill/>
+              <a:ln>
+                <a:solidFill>
+                  <a:srgbClr val="00B0F0"/>
+                </a:solidFill>
+              </a:ln>
+            </p:spPr>
+            <p:style>
+              <a:lnRef idx="2">
+                <a:schemeClr val="accent1">
+                  <a:shade val="15000"/>
+                </a:schemeClr>
+              </a:lnRef>
+              <a:fillRef idx="1">
+                <a:schemeClr val="accent1"/>
+              </a:fillRef>
+              <a:effectRef idx="0">
+                <a:schemeClr val="accent1"/>
+              </a:effectRef>
+              <a:fontRef idx="minor">
+                <a:schemeClr val="lt1"/>
+              </a:fontRef>
+            </p:style>
+            <p:txBody>
+              <a:bodyPr rtlCol="0" anchor="ctr"/>
+              <a:lstStyle/>
+              <a:p>
+                <a:pPr algn="ctr"/>
+                <a:endParaRPr lang="en-PH" sz="1311" dirty="0"/>
+              </a:p>
+            </p:txBody>
+          </p:sp>
+          <p:sp>
+            <p:nvSpPr>
+              <p:cNvPr id="84" name="Oval 83">
+                <a:extLst>
+                  <a:ext uri="{FF2B5EF4-FFF2-40B4-BE49-F238E27FC236}">
+                    <a16:creationId xmlns:a16="http://schemas.microsoft.com/office/drawing/2014/main" id="{4958722E-043D-8109-BFCC-8EFDD548FD59}"/>
+                  </a:ext>
+                </a:extLst>
+              </p:cNvPr>
+              <p:cNvSpPr/>
+              <p:nvPr/>
+            </p:nvSpPr>
+            <p:spPr>
+              <a:xfrm>
+                <a:off x="607616" y="2322674"/>
+                <a:ext cx="585403" cy="585403"/>
+              </a:xfrm>
+              <a:prstGeom prst="ellipse">
+                <a:avLst/>
+              </a:prstGeom>
+              <a:noFill/>
+              <a:ln>
+                <a:solidFill>
+                  <a:schemeClr val="tx1"/>
+                </a:solidFill>
+              </a:ln>
+            </p:spPr>
+            <p:style>
+              <a:lnRef idx="2">
+                <a:schemeClr val="accent1">
+                  <a:shade val="15000"/>
+                </a:schemeClr>
+              </a:lnRef>
+              <a:fillRef idx="1">
+                <a:schemeClr val="accent1"/>
+              </a:fillRef>
+              <a:effectRef idx="0">
+                <a:schemeClr val="accent1"/>
+              </a:effectRef>
+              <a:fontRef idx="minor">
+                <a:schemeClr val="lt1"/>
+              </a:fontRef>
+            </p:style>
+            <p:txBody>
+              <a:bodyPr rtlCol="0" anchor="ctr"/>
+              <a:lstStyle/>
+              <a:p>
+                <a:pPr algn="ctr"/>
+                <a:endParaRPr lang="en-PH" sz="1311"/>
+              </a:p>
+            </p:txBody>
+          </p:sp>
+        </p:grpSp>
+        <p:grpSp>
+          <p:nvGrpSpPr>
+            <p:cNvPr id="87" name="Group 86">
+              <a:extLst>
+                <a:ext uri="{FF2B5EF4-FFF2-40B4-BE49-F238E27FC236}">
+                  <a16:creationId xmlns:a16="http://schemas.microsoft.com/office/drawing/2014/main" id="{FA67C341-552A-C3DF-B362-6644CEB2F088}"/>
+                </a:ext>
+              </a:extLst>
+            </p:cNvPr>
+            <p:cNvGrpSpPr/>
+            <p:nvPr/>
+          </p:nvGrpSpPr>
+          <p:grpSpPr>
+            <a:xfrm rot="18839582">
+              <a:off x="5625172" y="886120"/>
+              <a:ext cx="611722" cy="267877"/>
+              <a:chOff x="4829328" y="2592825"/>
+              <a:chExt cx="1016114" cy="444963"/>
+            </a:xfrm>
+          </p:grpSpPr>
+          <p:grpSp>
+            <p:nvGrpSpPr>
+              <p:cNvPr id="88" name="Group 87">
+                <a:extLst>
+                  <a:ext uri="{FF2B5EF4-FFF2-40B4-BE49-F238E27FC236}">
+                    <a16:creationId xmlns:a16="http://schemas.microsoft.com/office/drawing/2014/main" id="{AA19E616-727C-CFF0-B109-9A7E9BDF1FE6}"/>
+                  </a:ext>
+                </a:extLst>
+              </p:cNvPr>
+              <p:cNvGrpSpPr/>
+              <p:nvPr/>
+            </p:nvGrpSpPr>
+            <p:grpSpPr>
+              <a:xfrm>
+                <a:off x="4829328" y="2592825"/>
+                <a:ext cx="1016114" cy="444963"/>
+                <a:chOff x="442564" y="2186619"/>
+                <a:chExt cx="1934876" cy="847294"/>
+              </a:xfrm>
+            </p:grpSpPr>
+            <p:sp>
+              <p:nvSpPr>
+                <p:cNvPr id="90" name="Flowchart: Terminator 89">
+                  <a:extLst>
+                    <a:ext uri="{FF2B5EF4-FFF2-40B4-BE49-F238E27FC236}">
+                      <a16:creationId xmlns:a16="http://schemas.microsoft.com/office/drawing/2014/main" id="{16A727BB-FA0B-7C8F-B02B-058153ED6B8B}"/>
+                    </a:ext>
+                  </a:extLst>
+                </p:cNvPr>
+                <p:cNvSpPr/>
+                <p:nvPr/>
+              </p:nvSpPr>
+              <p:spPr>
+                <a:xfrm>
+                  <a:off x="442564" y="2186619"/>
+                  <a:ext cx="1934876" cy="847294"/>
+                </a:xfrm>
+                <a:prstGeom prst="flowChartTerminator">
+                  <a:avLst/>
+                </a:prstGeom>
+                <a:noFill/>
+                <a:ln w="12700">
+                  <a:solidFill>
+                    <a:srgbClr val="00B0F0"/>
+                  </a:solidFill>
+                </a:ln>
+              </p:spPr>
+              <p:style>
+                <a:lnRef idx="2">
+                  <a:schemeClr val="accent1">
+                    <a:shade val="15000"/>
+                  </a:schemeClr>
+                </a:lnRef>
+                <a:fillRef idx="1">
+                  <a:schemeClr val="accent1"/>
+                </a:fillRef>
+                <a:effectRef idx="0">
+                  <a:schemeClr val="accent1"/>
+                </a:effectRef>
+                <a:fontRef idx="minor">
+                  <a:schemeClr val="lt1"/>
+                </a:fontRef>
+              </p:style>
+              <p:txBody>
+                <a:bodyPr rtlCol="0" anchor="ctr"/>
+                <a:lstStyle/>
+                <a:p>
+                  <a:pPr algn="ctr"/>
+                  <a:endParaRPr lang="en-PH" sz="1311"/>
+                </a:p>
+              </p:txBody>
+            </p:sp>
+            <p:sp>
+              <p:nvSpPr>
+                <p:cNvPr id="91" name="Oval 90">
+                  <a:extLst>
+                    <a:ext uri="{FF2B5EF4-FFF2-40B4-BE49-F238E27FC236}">
+                      <a16:creationId xmlns:a16="http://schemas.microsoft.com/office/drawing/2014/main" id="{7CC69126-DCCD-8C96-180A-6E0AEFD9B8F7}"/>
+                    </a:ext>
+                  </a:extLst>
+                </p:cNvPr>
+                <p:cNvSpPr/>
+                <p:nvPr/>
+              </p:nvSpPr>
+              <p:spPr>
+                <a:xfrm rot="10800000">
+                  <a:off x="1624511" y="2317564"/>
+                  <a:ext cx="585404" cy="585403"/>
+                </a:xfrm>
+                <a:prstGeom prst="ellipse">
+                  <a:avLst/>
+                </a:prstGeom>
+                <a:noFill/>
+                <a:ln>
+                  <a:solidFill>
+                    <a:srgbClr val="00B0F0"/>
+                  </a:solidFill>
+                </a:ln>
+              </p:spPr>
+              <p:style>
+                <a:lnRef idx="2">
+                  <a:schemeClr val="accent1">
+                    <a:shade val="15000"/>
+                  </a:schemeClr>
+                </a:lnRef>
+                <a:fillRef idx="1">
+                  <a:schemeClr val="accent1"/>
+                </a:fillRef>
+                <a:effectRef idx="0">
+                  <a:schemeClr val="accent1"/>
+                </a:effectRef>
+                <a:fontRef idx="minor">
+                  <a:schemeClr val="lt1"/>
+                </a:fontRef>
+              </p:style>
+              <p:txBody>
+                <a:bodyPr rtlCol="0" anchor="ctr"/>
+                <a:lstStyle/>
+                <a:p>
+                  <a:pPr algn="ctr"/>
+                  <a:endParaRPr lang="en-PH" sz="1311"/>
+                </a:p>
+              </p:txBody>
+            </p:sp>
+            <p:sp>
+              <p:nvSpPr>
+                <p:cNvPr id="92" name="Oval 91">
+                  <a:extLst>
+                    <a:ext uri="{FF2B5EF4-FFF2-40B4-BE49-F238E27FC236}">
+                      <a16:creationId xmlns:a16="http://schemas.microsoft.com/office/drawing/2014/main" id="{438DA685-241D-A791-EAE3-FB68BD91D575}"/>
+                    </a:ext>
+                  </a:extLst>
+                </p:cNvPr>
+                <p:cNvSpPr/>
+                <p:nvPr/>
+              </p:nvSpPr>
+              <p:spPr>
+                <a:xfrm>
+                  <a:off x="607616" y="2322674"/>
+                  <a:ext cx="585403" cy="585403"/>
+                </a:xfrm>
+                <a:prstGeom prst="ellipse">
+                  <a:avLst/>
+                </a:prstGeom>
+                <a:noFill/>
+                <a:ln>
+                  <a:solidFill>
+                    <a:srgbClr val="00B0F0"/>
+                  </a:solidFill>
+                </a:ln>
+              </p:spPr>
+              <p:style>
+                <a:lnRef idx="2">
+                  <a:schemeClr val="accent1">
+                    <a:shade val="15000"/>
+                  </a:schemeClr>
+                </a:lnRef>
+                <a:fillRef idx="1">
+                  <a:schemeClr val="accent1"/>
+                </a:fillRef>
+                <a:effectRef idx="0">
+                  <a:schemeClr val="accent1"/>
+                </a:effectRef>
+                <a:fontRef idx="minor">
+                  <a:schemeClr val="lt1"/>
+                </a:fontRef>
+              </p:style>
+              <p:txBody>
+                <a:bodyPr rtlCol="0" anchor="ctr"/>
+                <a:lstStyle/>
+                <a:p>
+                  <a:pPr algn="ctr"/>
+                  <a:endParaRPr lang="en-PH" sz="1311"/>
+                </a:p>
+              </p:txBody>
+            </p:sp>
+          </p:grpSp>
+          <p:sp>
+            <p:nvSpPr>
+              <p:cNvPr id="89" name="Oval 88">
+                <a:extLst>
+                  <a:ext uri="{FF2B5EF4-FFF2-40B4-BE49-F238E27FC236}">
+                    <a16:creationId xmlns:a16="http://schemas.microsoft.com/office/drawing/2014/main" id="{1F6E4871-121A-FD3C-C291-F17A0B030DB9}"/>
+                  </a:ext>
+                </a:extLst>
+              </p:cNvPr>
+              <p:cNvSpPr/>
+              <p:nvPr/>
+            </p:nvSpPr>
+            <p:spPr>
+              <a:xfrm>
+                <a:off x="5311181" y="2796420"/>
+                <a:ext cx="55155" cy="55155"/>
+              </a:xfrm>
+              <a:prstGeom prst="ellipse">
+                <a:avLst/>
+              </a:prstGeom>
+              <a:solidFill>
+                <a:srgbClr val="00B0F0"/>
+              </a:solidFill>
+              <a:ln>
+                <a:noFill/>
+              </a:ln>
+            </p:spPr>
+            <p:style>
+              <a:lnRef idx="2">
+                <a:schemeClr val="accent1">
+                  <a:shade val="15000"/>
+                </a:schemeClr>
+              </a:lnRef>
+              <a:fillRef idx="1">
+                <a:schemeClr val="accent1"/>
+              </a:fillRef>
+              <a:effectRef idx="0">
+                <a:schemeClr val="accent1"/>
+              </a:effectRef>
+              <a:fontRef idx="minor">
+                <a:schemeClr val="lt1"/>
+              </a:fontRef>
+            </p:style>
+            <p:txBody>
+              <a:bodyPr rtlCol="0" anchor="ctr"/>
+              <a:lstStyle/>
+              <a:p>
+                <a:pPr algn="ctr"/>
+                <a:endParaRPr lang="en-PH" sz="1311" dirty="0"/>
+              </a:p>
+            </p:txBody>
+          </p:sp>
+        </p:grpSp>
+      </p:grpSp>
+      <p:sp>
+        <p:nvSpPr>
+          <p:cNvPr id="94" name="Rectangle 93">
+            <a:extLst>
+              <a:ext uri="{FF2B5EF4-FFF2-40B4-BE49-F238E27FC236}">
+                <a16:creationId xmlns:a16="http://schemas.microsoft.com/office/drawing/2014/main" id="{4F59EE1A-130E-62E7-FA32-76E903603BD7}"/>
+              </a:ext>
+            </a:extLst>
+          </p:cNvPr>
+          <p:cNvSpPr/>
+          <p:nvPr/>
+        </p:nvSpPr>
+        <p:spPr>
+          <a:xfrm>
+            <a:off x="150540" y="940057"/>
+            <a:ext cx="2664098" cy="337457"/>
+          </a:xfrm>
+          <a:prstGeom prst="rect">
+            <a:avLst/>
+          </a:prstGeom>
+          <a:noFill/>
+          <a:ln w="6350">
+            <a:solidFill>
+              <a:srgbClr val="00B0F0"/>
+            </a:solidFill>
+          </a:ln>
+        </p:spPr>
+        <p:style>
+          <a:lnRef idx="2">
+            <a:schemeClr val="accent1">
+              <a:shade val="15000"/>
+            </a:schemeClr>
+          </a:lnRef>
+          <a:fillRef idx="1">
+            <a:schemeClr val="accent1"/>
+          </a:fillRef>
+          <a:effectRef idx="0">
+            <a:schemeClr val="accent1"/>
+          </a:effectRef>
+          <a:fontRef idx="minor">
+            <a:schemeClr val="lt1"/>
+          </a:fontRef>
+        </p:style>
+        <p:txBody>
+          <a:bodyPr rtlCol="0" anchor="ctr"/>
+          <a:lstStyle/>
+          <a:p>
+            <a:pPr algn="ctr"/>
+            <a:r>
+              <a:rPr lang="en-US" sz="1311" dirty="0">
+                <a:solidFill>
+                  <a:srgbClr val="00B0F0"/>
+                </a:solidFill>
+                <a:latin typeface="Aptos Display" panose="020B0004020202020204" pitchFamily="34" charset="0"/>
+              </a:rPr>
+              <a:t>Event Blocks</a:t>
+            </a:r>
+            <a:endParaRPr lang="en-PH" sz="1311" dirty="0">
+              <a:solidFill>
+                <a:srgbClr val="00B0F0"/>
+              </a:solidFill>
+              <a:latin typeface="Aptos Display" panose="020B0004020202020204" pitchFamily="34" charset="0"/>
+            </a:endParaRPr>
+          </a:p>
+        </p:txBody>
+      </p:sp>
+      <p:sp>
+        <p:nvSpPr>
+          <p:cNvPr id="98" name="Rectangle 97">
+            <a:extLst>
+              <a:ext uri="{FF2B5EF4-FFF2-40B4-BE49-F238E27FC236}">
+                <a16:creationId xmlns:a16="http://schemas.microsoft.com/office/drawing/2014/main" id="{910FA54E-2F7B-7064-A82A-3C4E451B58F8}"/>
+              </a:ext>
+            </a:extLst>
+          </p:cNvPr>
+          <p:cNvSpPr/>
+          <p:nvPr/>
+        </p:nvSpPr>
+        <p:spPr>
+          <a:xfrm>
+            <a:off x="150540" y="1599811"/>
+            <a:ext cx="2664098" cy="337457"/>
+          </a:xfrm>
+          <a:prstGeom prst="rect">
+            <a:avLst/>
+          </a:prstGeom>
+          <a:noFill/>
+          <a:ln w="6350">
+            <a:solidFill>
+              <a:srgbClr val="00B0F0"/>
+            </a:solidFill>
+          </a:ln>
+        </p:spPr>
+        <p:style>
+          <a:lnRef idx="2">
+            <a:schemeClr val="accent1">
+              <a:shade val="15000"/>
+            </a:schemeClr>
+          </a:lnRef>
+          <a:fillRef idx="1">
+            <a:schemeClr val="accent1"/>
+          </a:fillRef>
+          <a:effectRef idx="0">
+            <a:schemeClr val="accent1"/>
+          </a:effectRef>
+          <a:fontRef idx="minor">
+            <a:schemeClr val="lt1"/>
+          </a:fontRef>
+        </p:style>
+        <p:txBody>
+          <a:bodyPr rtlCol="0" anchor="ctr"/>
+          <a:lstStyle/>
+          <a:p>
+            <a:pPr algn="ctr"/>
+            <a:r>
+              <a:rPr lang="en-US" sz="1311" dirty="0">
+                <a:solidFill>
+                  <a:srgbClr val="00B0F0"/>
+                </a:solidFill>
+                <a:latin typeface="Aptos Display" panose="020B0004020202020204" pitchFamily="34" charset="0"/>
+              </a:rPr>
+              <a:t>Variable Blocks</a:t>
+            </a:r>
+            <a:endParaRPr lang="en-PH" sz="1311" dirty="0">
+              <a:solidFill>
+                <a:srgbClr val="00B0F0"/>
+              </a:solidFill>
+              <a:latin typeface="Aptos Display" panose="020B0004020202020204" pitchFamily="34" charset="0"/>
+            </a:endParaRPr>
+          </a:p>
+        </p:txBody>
+      </p:sp>
+      <p:sp>
+        <p:nvSpPr>
+          <p:cNvPr id="99" name="TextBox 98">
+            <a:extLst>
+              <a:ext uri="{FF2B5EF4-FFF2-40B4-BE49-F238E27FC236}">
+                <a16:creationId xmlns:a16="http://schemas.microsoft.com/office/drawing/2014/main" id="{F9D57A07-9D00-CBD5-F5CE-519F58E8F099}"/>
+              </a:ext>
+            </a:extLst>
+          </p:cNvPr>
+          <p:cNvSpPr txBox="1"/>
+          <p:nvPr/>
+        </p:nvSpPr>
+        <p:spPr>
+          <a:xfrm>
+            <a:off x="600706" y="1995993"/>
+            <a:ext cx="841253" cy="193258"/>
+          </a:xfrm>
+          <a:prstGeom prst="rect">
+            <a:avLst/>
+          </a:prstGeom>
+          <a:noFill/>
+        </p:spPr>
+        <p:txBody>
+          <a:bodyPr wrap="square">
+            <a:spAutoFit/>
+          </a:bodyPr>
+          <a:lstStyle/>
+          <a:p>
+            <a:pPr algn="ctr"/>
+            <a:r>
+              <a:rPr lang="en-US" sz="656" dirty="0">
+                <a:solidFill>
+                  <a:srgbClr val="00B0F0"/>
+                </a:solidFill>
+                <a:latin typeface="Aptos Display" panose="020B0004020202020204" pitchFamily="34" charset="0"/>
+              </a:rPr>
+              <a:t>Set Variable</a:t>
+            </a:r>
+            <a:endParaRPr lang="en-PH" sz="656" dirty="0">
+              <a:solidFill>
+                <a:srgbClr val="00B0F0"/>
+              </a:solidFill>
+            </a:endParaRPr>
+          </a:p>
+        </p:txBody>
+      </p:sp>
+      <p:sp>
+        <p:nvSpPr>
+          <p:cNvPr id="100" name="TextBox 99">
+            <a:extLst>
+              <a:ext uri="{FF2B5EF4-FFF2-40B4-BE49-F238E27FC236}">
+                <a16:creationId xmlns:a16="http://schemas.microsoft.com/office/drawing/2014/main" id="{D42BE23A-DE17-FD04-7854-C9BD4775B203}"/>
+              </a:ext>
+            </a:extLst>
+          </p:cNvPr>
+          <p:cNvSpPr txBox="1"/>
+          <p:nvPr/>
+        </p:nvSpPr>
+        <p:spPr>
+          <a:xfrm>
+            <a:off x="1509098" y="1995993"/>
+            <a:ext cx="841253" cy="193258"/>
+          </a:xfrm>
+          <a:prstGeom prst="rect">
+            <a:avLst/>
+          </a:prstGeom>
+          <a:noFill/>
+        </p:spPr>
+        <p:txBody>
+          <a:bodyPr wrap="square">
+            <a:spAutoFit/>
+          </a:bodyPr>
+          <a:lstStyle/>
+          <a:p>
+            <a:pPr algn="ctr"/>
+            <a:r>
+              <a:rPr lang="en-US" sz="656" dirty="0">
+                <a:solidFill>
+                  <a:srgbClr val="00B0F0"/>
+                </a:solidFill>
+                <a:latin typeface="Aptos Display" panose="020B0004020202020204" pitchFamily="34" charset="0"/>
+              </a:rPr>
+              <a:t>Change Variable</a:t>
+            </a:r>
+            <a:endParaRPr lang="en-PH" sz="656" dirty="0">
+              <a:solidFill>
+                <a:srgbClr val="00B0F0"/>
+              </a:solidFill>
+            </a:endParaRPr>
+          </a:p>
+        </p:txBody>
+      </p:sp>
+    </p:spTree>
+    <p:extLst>
+      <p:ext uri="{BB962C8B-B14F-4D97-AF65-F5344CB8AC3E}">
+        <p14:creationId xmlns:p14="http://schemas.microsoft.com/office/powerpoint/2010/main" val="2227286957"/>
       </p:ext>
     </p:extLst>
   </p:cSld>
@@ -4029,6 +7103,106 @@
 </file>
 
 <file path=ppt/slides/slide3.xml><?xml version="1.0" encoding="utf-8"?>
+<p:sld xmlns:a="http://schemas.openxmlformats.org/drawingml/2006/main" xmlns:r="http://schemas.openxmlformats.org/officeDocument/2006/relationships" xmlns:p="http://schemas.openxmlformats.org/presentationml/2006/main">
+  <p:cSld>
+    <p:spTree>
+      <p:nvGrpSpPr>
+        <p:cNvPr id="1" name="">
+          <a:extLst>
+            <a:ext uri="{FF2B5EF4-FFF2-40B4-BE49-F238E27FC236}">
+              <a16:creationId xmlns:a16="http://schemas.microsoft.com/office/drawing/2014/main" id="{239069D1-EEB5-063B-EC0B-FD02425BD60F}"/>
+            </a:ext>
+          </a:extLst>
+        </p:cNvPr>
+        <p:cNvGrpSpPr/>
+        <p:nvPr/>
+      </p:nvGrpSpPr>
+      <p:grpSpPr>
+        <a:xfrm>
+          <a:off x="0" y="0"/>
+          <a:ext cx="0" cy="0"/>
+          <a:chOff x="0" y="0"/>
+          <a:chExt cx="0" cy="0"/>
+        </a:xfrm>
+      </p:grpSpPr>
+      <p:sp>
+        <p:nvSpPr>
+          <p:cNvPr id="3" name="Rectangle 2">
+            <a:extLst>
+              <a:ext uri="{FF2B5EF4-FFF2-40B4-BE49-F238E27FC236}">
+                <a16:creationId xmlns:a16="http://schemas.microsoft.com/office/drawing/2014/main" id="{1F5C8378-7FC5-4244-AE5F-D58F902D3B1E}"/>
+              </a:ext>
+            </a:extLst>
+          </p:cNvPr>
+          <p:cNvSpPr/>
+          <p:nvPr/>
+        </p:nvSpPr>
+        <p:spPr>
+          <a:xfrm>
+            <a:off x="3163993" y="3221884"/>
+            <a:ext cx="2816014" cy="414231"/>
+          </a:xfrm>
+          <a:prstGeom prst="rect">
+            <a:avLst/>
+          </a:prstGeom>
+          <a:noFill/>
+          <a:ln>
+            <a:noFill/>
+          </a:ln>
+        </p:spPr>
+        <p:style>
+          <a:lnRef idx="2">
+            <a:schemeClr val="accent1">
+              <a:shade val="15000"/>
+            </a:schemeClr>
+          </a:lnRef>
+          <a:fillRef idx="1">
+            <a:schemeClr val="accent1"/>
+          </a:fillRef>
+          <a:effectRef idx="0">
+            <a:schemeClr val="accent1"/>
+          </a:effectRef>
+          <a:fontRef idx="minor">
+            <a:schemeClr val="lt1"/>
+          </a:fontRef>
+        </p:style>
+        <p:txBody>
+          <a:bodyPr rtlCol="0" anchor="ctr"/>
+          <a:lstStyle/>
+          <a:p>
+            <a:pPr algn="ctr"/>
+            <a:r>
+              <a:rPr lang="en-US" sz="2118" dirty="0">
+                <a:solidFill>
+                  <a:srgbClr val="00B0F0"/>
+                </a:solidFill>
+                <a:latin typeface="Aptos Display" panose="020B0004020202020204" pitchFamily="34" charset="0"/>
+              </a:rPr>
+              <a:t>Simulation Mechanic</a:t>
+            </a:r>
+            <a:endParaRPr lang="en-PH" sz="2118" dirty="0">
+              <a:solidFill>
+                <a:srgbClr val="00B0F0"/>
+              </a:solidFill>
+              <a:latin typeface="Aptos Display" panose="020B0004020202020204" pitchFamily="34" charset="0"/>
+            </a:endParaRPr>
+          </a:p>
+        </p:txBody>
+      </p:sp>
+    </p:spTree>
+    <p:extLst>
+      <p:ext uri="{BB962C8B-B14F-4D97-AF65-F5344CB8AC3E}">
+        <p14:creationId xmlns:p14="http://schemas.microsoft.com/office/powerpoint/2010/main" val="2104330160"/>
+      </p:ext>
+    </p:extLst>
+  </p:cSld>
+  <p:clrMapOvr>
+    <a:masterClrMapping/>
+  </p:clrMapOvr>
+</p:sld>
+</file>
+
+<file path=ppt/slides/slide4.xml><?xml version="1.0" encoding="utf-8"?>
 <p:sld xmlns:a="http://schemas.openxmlformats.org/drawingml/2006/main" xmlns:r="http://schemas.openxmlformats.org/officeDocument/2006/relationships" xmlns:p="http://schemas.openxmlformats.org/presentationml/2006/main">
   <p:cSld>
     <p:spTree>
@@ -5801,7 +8975,7 @@
 </p:sld>
 </file>
 
-<file path=ppt/slides/slide4.xml><?xml version="1.0" encoding="utf-8"?>
+<file path=ppt/slides/slide5.xml><?xml version="1.0" encoding="utf-8"?>
 <p:sld xmlns:a="http://schemas.openxmlformats.org/drawingml/2006/main" xmlns:r="http://schemas.openxmlformats.org/officeDocument/2006/relationships" xmlns:p="http://schemas.openxmlformats.org/presentationml/2006/main">
   <p:cSld>
     <p:spTree>
@@ -9281,7 +12455,7 @@
 </p:sld>
 </file>
 
-<file path=ppt/slides/slide5.xml><?xml version="1.0" encoding="utf-8"?>
+<file path=ppt/slides/slide6.xml><?xml version="1.0" encoding="utf-8"?>
 <p:sld xmlns:a="http://schemas.openxmlformats.org/drawingml/2006/main" xmlns:r="http://schemas.openxmlformats.org/officeDocument/2006/relationships" xmlns:p="http://schemas.openxmlformats.org/presentationml/2006/main">
   <p:cSld>
     <p:spTree>
@@ -20150,7 +23324,7 @@
 </p:sld>
 </file>
 
-<file path=ppt/slides/slide6.xml><?xml version="1.0" encoding="utf-8"?>
+<file path=ppt/slides/slide7.xml><?xml version="1.0" encoding="utf-8"?>
 <p:sld xmlns:a="http://schemas.openxmlformats.org/drawingml/2006/main" xmlns:r="http://schemas.openxmlformats.org/officeDocument/2006/relationships" xmlns:p="http://schemas.openxmlformats.org/presentationml/2006/main">
   <p:cSld>
     <p:spTree>
@@ -31468,7 +34642,7 @@
 </p:sld>
 </file>
 
-<file path=ppt/slides/slide7.xml><?xml version="1.0" encoding="utf-8"?>
+<file path=ppt/slides/slide8.xml><?xml version="1.0" encoding="utf-8"?>
 <p:sld xmlns:a="http://schemas.openxmlformats.org/drawingml/2006/main" xmlns:r="http://schemas.openxmlformats.org/officeDocument/2006/relationships" xmlns:p="http://schemas.openxmlformats.org/presentationml/2006/main">
   <p:cSld>
     <p:spTree>
@@ -36351,6 +39525,106 @@
 </p:sld>
 </file>
 
+<file path=ppt/slides/slide9.xml><?xml version="1.0" encoding="utf-8"?>
+<p:sld xmlns:a="http://schemas.openxmlformats.org/drawingml/2006/main" xmlns:r="http://schemas.openxmlformats.org/officeDocument/2006/relationships" xmlns:p="http://schemas.openxmlformats.org/presentationml/2006/main">
+  <p:cSld>
+    <p:spTree>
+      <p:nvGrpSpPr>
+        <p:cNvPr id="1" name="">
+          <a:extLst>
+            <a:ext uri="{FF2B5EF4-FFF2-40B4-BE49-F238E27FC236}">
+              <a16:creationId xmlns:a16="http://schemas.microsoft.com/office/drawing/2014/main" id="{FC41437E-E75B-1056-1744-0E0FE4818476}"/>
+            </a:ext>
+          </a:extLst>
+        </p:cNvPr>
+        <p:cNvGrpSpPr/>
+        <p:nvPr/>
+      </p:nvGrpSpPr>
+      <p:grpSpPr>
+        <a:xfrm>
+          <a:off x="0" y="0"/>
+          <a:ext cx="0" cy="0"/>
+          <a:chOff x="0" y="0"/>
+          <a:chExt cx="0" cy="0"/>
+        </a:xfrm>
+      </p:grpSpPr>
+      <p:sp>
+        <p:nvSpPr>
+          <p:cNvPr id="3" name="Rectangle 2">
+            <a:extLst>
+              <a:ext uri="{FF2B5EF4-FFF2-40B4-BE49-F238E27FC236}">
+                <a16:creationId xmlns:a16="http://schemas.microsoft.com/office/drawing/2014/main" id="{D3B6405E-44C5-CB6E-FBFE-D4AFCF77AE76}"/>
+              </a:ext>
+            </a:extLst>
+          </p:cNvPr>
+          <p:cNvSpPr/>
+          <p:nvPr/>
+        </p:nvSpPr>
+        <p:spPr>
+          <a:xfrm>
+            <a:off x="2777384" y="3221884"/>
+            <a:ext cx="3589232" cy="414231"/>
+          </a:xfrm>
+          <a:prstGeom prst="rect">
+            <a:avLst/>
+          </a:prstGeom>
+          <a:noFill/>
+          <a:ln>
+            <a:noFill/>
+          </a:ln>
+        </p:spPr>
+        <p:style>
+          <a:lnRef idx="2">
+            <a:schemeClr val="accent1">
+              <a:shade val="15000"/>
+            </a:schemeClr>
+          </a:lnRef>
+          <a:fillRef idx="1">
+            <a:schemeClr val="accent1"/>
+          </a:fillRef>
+          <a:effectRef idx="0">
+            <a:schemeClr val="accent1"/>
+          </a:effectRef>
+          <a:fontRef idx="minor">
+            <a:schemeClr val="lt1"/>
+          </a:fontRef>
+        </p:style>
+        <p:txBody>
+          <a:bodyPr rtlCol="0" anchor="ctr"/>
+          <a:lstStyle/>
+          <a:p>
+            <a:pPr algn="ctr"/>
+            <a:r>
+              <a:rPr lang="en-US" sz="2118" dirty="0">
+                <a:solidFill>
+                  <a:srgbClr val="00B0F0"/>
+                </a:solidFill>
+                <a:latin typeface="Aptos Display" panose="020B0004020202020204" pitchFamily="34" charset="0"/>
+              </a:rPr>
+              <a:t>Block-Based Coding Mechanic</a:t>
+            </a:r>
+            <a:endParaRPr lang="en-PH" sz="2118" dirty="0">
+              <a:solidFill>
+                <a:srgbClr val="00B0F0"/>
+              </a:solidFill>
+              <a:latin typeface="Aptos Display" panose="020B0004020202020204" pitchFamily="34" charset="0"/>
+            </a:endParaRPr>
+          </a:p>
+        </p:txBody>
+      </p:sp>
+    </p:spTree>
+    <p:extLst>
+      <p:ext uri="{BB962C8B-B14F-4D97-AF65-F5344CB8AC3E}">
+        <p14:creationId xmlns:p14="http://schemas.microsoft.com/office/powerpoint/2010/main" val="740762203"/>
+      </p:ext>
+    </p:extLst>
+  </p:cSld>
+  <p:clrMapOvr>
+    <a:masterClrMapping/>
+  </p:clrMapOvr>
+</p:sld>
+</file>
+
 <file path=ppt/theme/theme1.xml><?xml version="1.0" encoding="utf-8"?>
 <a:theme xmlns:a="http://schemas.openxmlformats.org/drawingml/2006/main" name="Office Theme">
   <a:themeElements>

</xml_diff>